<commit_message>
Cập nhật báo và slide phần Storage.
</commit_message>
<xml_diff>
--- a/Serminar Html5/1. Slide/HTML5.pptx
+++ b/Serminar Html5/1. Slide/HTML5.pptx
@@ -5,14 +5,19 @@
     <p:sldMasterId id="2147483648" r:id="rId1"/>
   </p:sldMasterIdLst>
   <p:notesMasterIdLst>
-    <p:notesMasterId r:id="rId7"/>
+    <p:notesMasterId r:id="rId12"/>
   </p:notesMasterIdLst>
   <p:sldIdLst>
     <p:sldId id="256" r:id="rId2"/>
     <p:sldId id="319" r:id="rId3"/>
-    <p:sldId id="320" r:id="rId4"/>
-    <p:sldId id="312" r:id="rId5"/>
-    <p:sldId id="276" r:id="rId6"/>
+    <p:sldId id="326" r:id="rId4"/>
+    <p:sldId id="320" r:id="rId5"/>
+    <p:sldId id="321" r:id="rId6"/>
+    <p:sldId id="323" r:id="rId7"/>
+    <p:sldId id="324" r:id="rId8"/>
+    <p:sldId id="325" r:id="rId9"/>
+    <p:sldId id="312" r:id="rId10"/>
+    <p:sldId id="276" r:id="rId11"/>
   </p:sldIdLst>
   <p:sldSz cx="9144000" cy="6858000" type="screen4x3"/>
   <p:notesSz cx="6858000" cy="9144000"/>
@@ -145,6 +150,753 @@
 </file>
 
 <file path=ppt/diagrams/colors1.xml><?xml version="1.0" encoding="utf-8"?>
+<dgm:colorsDef xmlns:dgm="http://schemas.openxmlformats.org/drawingml/2006/diagram" xmlns:a="http://schemas.openxmlformats.org/drawingml/2006/main" uniqueId="urn:microsoft.com/office/officeart/2005/8/colors/accent2_2">
+  <dgm:title val=""/>
+  <dgm:desc val=""/>
+  <dgm:catLst>
+    <dgm:cat type="accent2" pri="11200"/>
+  </dgm:catLst>
+  <dgm:styleLbl name="node0">
+    <dgm:fillClrLst meth="repeat">
+      <a:schemeClr val="accent2"/>
+    </dgm:fillClrLst>
+    <dgm:linClrLst meth="repeat">
+      <a:schemeClr val="lt1"/>
+    </dgm:linClrLst>
+    <dgm:effectClrLst/>
+    <dgm:txLinClrLst/>
+    <dgm:txFillClrLst/>
+    <dgm:txEffectClrLst/>
+  </dgm:styleLbl>
+  <dgm:styleLbl name="node1">
+    <dgm:fillClrLst meth="repeat">
+      <a:schemeClr val="accent2"/>
+    </dgm:fillClrLst>
+    <dgm:linClrLst meth="repeat">
+      <a:schemeClr val="lt1"/>
+    </dgm:linClrLst>
+    <dgm:effectClrLst/>
+    <dgm:txLinClrLst/>
+    <dgm:txFillClrLst/>
+    <dgm:txEffectClrLst/>
+  </dgm:styleLbl>
+  <dgm:styleLbl name="alignNode1">
+    <dgm:fillClrLst meth="repeat">
+      <a:schemeClr val="accent2"/>
+    </dgm:fillClrLst>
+    <dgm:linClrLst meth="repeat">
+      <a:schemeClr val="accent2"/>
+    </dgm:linClrLst>
+    <dgm:effectClrLst/>
+    <dgm:txLinClrLst/>
+    <dgm:txFillClrLst/>
+    <dgm:txEffectClrLst/>
+  </dgm:styleLbl>
+  <dgm:styleLbl name="lnNode1">
+    <dgm:fillClrLst meth="repeat">
+      <a:schemeClr val="accent2"/>
+    </dgm:fillClrLst>
+    <dgm:linClrLst meth="repeat">
+      <a:schemeClr val="lt1"/>
+    </dgm:linClrLst>
+    <dgm:effectClrLst/>
+    <dgm:txLinClrLst/>
+    <dgm:txFillClrLst/>
+    <dgm:txEffectClrLst/>
+  </dgm:styleLbl>
+  <dgm:styleLbl name="vennNode1">
+    <dgm:fillClrLst meth="repeat">
+      <a:schemeClr val="accent2">
+        <a:alpha val="50000"/>
+      </a:schemeClr>
+    </dgm:fillClrLst>
+    <dgm:linClrLst meth="repeat">
+      <a:schemeClr val="lt1"/>
+    </dgm:linClrLst>
+    <dgm:effectClrLst/>
+    <dgm:txLinClrLst/>
+    <dgm:txFillClrLst/>
+    <dgm:txEffectClrLst/>
+  </dgm:styleLbl>
+  <dgm:styleLbl name="node2">
+    <dgm:fillClrLst meth="repeat">
+      <a:schemeClr val="accent2"/>
+    </dgm:fillClrLst>
+    <dgm:linClrLst meth="repeat">
+      <a:schemeClr val="lt1"/>
+    </dgm:linClrLst>
+    <dgm:effectClrLst/>
+    <dgm:txLinClrLst/>
+    <dgm:txFillClrLst/>
+    <dgm:txEffectClrLst/>
+  </dgm:styleLbl>
+  <dgm:styleLbl name="node3">
+    <dgm:fillClrLst meth="repeat">
+      <a:schemeClr val="accent2"/>
+    </dgm:fillClrLst>
+    <dgm:linClrLst meth="repeat">
+      <a:schemeClr val="lt1"/>
+    </dgm:linClrLst>
+    <dgm:effectClrLst/>
+    <dgm:txLinClrLst/>
+    <dgm:txFillClrLst/>
+    <dgm:txEffectClrLst/>
+  </dgm:styleLbl>
+  <dgm:styleLbl name="node4">
+    <dgm:fillClrLst meth="repeat">
+      <a:schemeClr val="accent2"/>
+    </dgm:fillClrLst>
+    <dgm:linClrLst meth="repeat">
+      <a:schemeClr val="lt1"/>
+    </dgm:linClrLst>
+    <dgm:effectClrLst/>
+    <dgm:txLinClrLst/>
+    <dgm:txFillClrLst/>
+    <dgm:txEffectClrLst/>
+  </dgm:styleLbl>
+  <dgm:styleLbl name="fgImgPlace1">
+    <dgm:fillClrLst meth="repeat">
+      <a:schemeClr val="accent2">
+        <a:tint val="50000"/>
+      </a:schemeClr>
+    </dgm:fillClrLst>
+    <dgm:linClrLst meth="repeat">
+      <a:schemeClr val="lt1"/>
+    </dgm:linClrLst>
+    <dgm:effectClrLst/>
+    <dgm:txLinClrLst/>
+    <dgm:txFillClrLst meth="repeat">
+      <a:schemeClr val="lt1"/>
+    </dgm:txFillClrLst>
+    <dgm:txEffectClrLst/>
+  </dgm:styleLbl>
+  <dgm:styleLbl name="alignImgPlace1">
+    <dgm:fillClrLst meth="repeat">
+      <a:schemeClr val="accent2">
+        <a:tint val="50000"/>
+      </a:schemeClr>
+    </dgm:fillClrLst>
+    <dgm:linClrLst meth="repeat">
+      <a:schemeClr val="lt1"/>
+    </dgm:linClrLst>
+    <dgm:effectClrLst/>
+    <dgm:txLinClrLst/>
+    <dgm:txFillClrLst meth="repeat">
+      <a:schemeClr val="lt1"/>
+    </dgm:txFillClrLst>
+    <dgm:txEffectClrLst/>
+  </dgm:styleLbl>
+  <dgm:styleLbl name="bgImgPlace1">
+    <dgm:fillClrLst meth="repeat">
+      <a:schemeClr val="accent2">
+        <a:tint val="50000"/>
+      </a:schemeClr>
+    </dgm:fillClrLst>
+    <dgm:linClrLst meth="repeat">
+      <a:schemeClr val="lt1"/>
+    </dgm:linClrLst>
+    <dgm:effectClrLst/>
+    <dgm:txLinClrLst/>
+    <dgm:txFillClrLst meth="repeat">
+      <a:schemeClr val="lt1"/>
+    </dgm:txFillClrLst>
+    <dgm:txEffectClrLst/>
+  </dgm:styleLbl>
+  <dgm:styleLbl name="sibTrans2D1">
+    <dgm:fillClrLst meth="repeat">
+      <a:schemeClr val="accent2">
+        <a:tint val="60000"/>
+      </a:schemeClr>
+    </dgm:fillClrLst>
+    <dgm:linClrLst meth="repeat">
+      <a:schemeClr val="accent2">
+        <a:tint val="60000"/>
+      </a:schemeClr>
+    </dgm:linClrLst>
+    <dgm:effectClrLst/>
+    <dgm:txLinClrLst/>
+    <dgm:txFillClrLst/>
+    <dgm:txEffectClrLst/>
+  </dgm:styleLbl>
+  <dgm:styleLbl name="fgSibTrans2D1">
+    <dgm:fillClrLst meth="repeat">
+      <a:schemeClr val="accent2">
+        <a:tint val="60000"/>
+      </a:schemeClr>
+    </dgm:fillClrLst>
+    <dgm:linClrLst meth="repeat">
+      <a:schemeClr val="accent2">
+        <a:tint val="60000"/>
+      </a:schemeClr>
+    </dgm:linClrLst>
+    <dgm:effectClrLst/>
+    <dgm:txLinClrLst/>
+    <dgm:txFillClrLst/>
+    <dgm:txEffectClrLst/>
+  </dgm:styleLbl>
+  <dgm:styleLbl name="bgSibTrans2D1">
+    <dgm:fillClrLst meth="repeat">
+      <a:schemeClr val="accent2">
+        <a:tint val="60000"/>
+      </a:schemeClr>
+    </dgm:fillClrLst>
+    <dgm:linClrLst meth="repeat">
+      <a:schemeClr val="accent2">
+        <a:tint val="60000"/>
+      </a:schemeClr>
+    </dgm:linClrLst>
+    <dgm:effectClrLst/>
+    <dgm:txLinClrLst/>
+    <dgm:txFillClrLst/>
+    <dgm:txEffectClrLst/>
+  </dgm:styleLbl>
+  <dgm:styleLbl name="sibTrans1D1">
+    <dgm:fillClrLst meth="repeat">
+      <a:schemeClr val="accent2"/>
+    </dgm:fillClrLst>
+    <dgm:linClrLst meth="repeat">
+      <a:schemeClr val="accent2"/>
+    </dgm:linClrLst>
+    <dgm:effectClrLst/>
+    <dgm:txLinClrLst/>
+    <dgm:txFillClrLst meth="repeat">
+      <a:schemeClr val="tx1"/>
+    </dgm:txFillClrLst>
+    <dgm:txEffectClrLst/>
+  </dgm:styleLbl>
+  <dgm:styleLbl name="callout">
+    <dgm:fillClrLst meth="repeat">
+      <a:schemeClr val="accent2"/>
+    </dgm:fillClrLst>
+    <dgm:linClrLst meth="repeat">
+      <a:schemeClr val="accent2">
+        <a:tint val="50000"/>
+      </a:schemeClr>
+    </dgm:linClrLst>
+    <dgm:effectClrLst/>
+    <dgm:txLinClrLst/>
+    <dgm:txFillClrLst meth="repeat">
+      <a:schemeClr val="tx1"/>
+    </dgm:txFillClrLst>
+    <dgm:txEffectClrLst/>
+  </dgm:styleLbl>
+  <dgm:styleLbl name="asst0">
+    <dgm:fillClrLst meth="repeat">
+      <a:schemeClr val="accent2"/>
+    </dgm:fillClrLst>
+    <dgm:linClrLst meth="repeat">
+      <a:schemeClr val="lt1"/>
+    </dgm:linClrLst>
+    <dgm:effectClrLst/>
+    <dgm:txLinClrLst/>
+    <dgm:txFillClrLst/>
+    <dgm:txEffectClrLst/>
+  </dgm:styleLbl>
+  <dgm:styleLbl name="asst1">
+    <dgm:fillClrLst meth="repeat">
+      <a:schemeClr val="accent2"/>
+    </dgm:fillClrLst>
+    <dgm:linClrLst meth="repeat">
+      <a:schemeClr val="lt1"/>
+    </dgm:linClrLst>
+    <dgm:effectClrLst/>
+    <dgm:txLinClrLst/>
+    <dgm:txFillClrLst/>
+    <dgm:txEffectClrLst/>
+  </dgm:styleLbl>
+  <dgm:styleLbl name="asst2">
+    <dgm:fillClrLst meth="repeat">
+      <a:schemeClr val="accent2"/>
+    </dgm:fillClrLst>
+    <dgm:linClrLst meth="repeat">
+      <a:schemeClr val="lt1"/>
+    </dgm:linClrLst>
+    <dgm:effectClrLst/>
+    <dgm:txLinClrLst/>
+    <dgm:txFillClrLst/>
+    <dgm:txEffectClrLst/>
+  </dgm:styleLbl>
+  <dgm:styleLbl name="asst3">
+    <dgm:fillClrLst meth="repeat">
+      <a:schemeClr val="accent2"/>
+    </dgm:fillClrLst>
+    <dgm:linClrLst meth="repeat">
+      <a:schemeClr val="lt1"/>
+    </dgm:linClrLst>
+    <dgm:effectClrLst/>
+    <dgm:txLinClrLst/>
+    <dgm:txFillClrLst/>
+    <dgm:txEffectClrLst/>
+  </dgm:styleLbl>
+  <dgm:styleLbl name="asst4">
+    <dgm:fillClrLst meth="repeat">
+      <a:schemeClr val="accent2"/>
+    </dgm:fillClrLst>
+    <dgm:linClrLst meth="repeat">
+      <a:schemeClr val="lt1"/>
+    </dgm:linClrLst>
+    <dgm:effectClrLst/>
+    <dgm:txLinClrLst/>
+    <dgm:txFillClrLst/>
+    <dgm:txEffectClrLst/>
+  </dgm:styleLbl>
+  <dgm:styleLbl name="parChTrans2D1">
+    <dgm:fillClrLst meth="repeat">
+      <a:schemeClr val="accent2">
+        <a:tint val="60000"/>
+      </a:schemeClr>
+    </dgm:fillClrLst>
+    <dgm:linClrLst meth="repeat">
+      <a:schemeClr val="accent2">
+        <a:tint val="60000"/>
+      </a:schemeClr>
+    </dgm:linClrLst>
+    <dgm:effectClrLst/>
+    <dgm:txLinClrLst/>
+    <dgm:txFillClrLst meth="repeat">
+      <a:schemeClr val="lt1"/>
+    </dgm:txFillClrLst>
+    <dgm:txEffectClrLst/>
+  </dgm:styleLbl>
+  <dgm:styleLbl name="parChTrans2D2">
+    <dgm:fillClrLst meth="repeat">
+      <a:schemeClr val="accent2"/>
+    </dgm:fillClrLst>
+    <dgm:linClrLst meth="repeat">
+      <a:schemeClr val="accent2"/>
+    </dgm:linClrLst>
+    <dgm:effectClrLst/>
+    <dgm:txLinClrLst/>
+    <dgm:txFillClrLst meth="repeat">
+      <a:schemeClr val="lt1"/>
+    </dgm:txFillClrLst>
+    <dgm:txEffectClrLst/>
+  </dgm:styleLbl>
+  <dgm:styleLbl name="parChTrans2D3">
+    <dgm:fillClrLst meth="repeat">
+      <a:schemeClr val="accent2"/>
+    </dgm:fillClrLst>
+    <dgm:linClrLst meth="repeat">
+      <a:schemeClr val="accent2"/>
+    </dgm:linClrLst>
+    <dgm:effectClrLst/>
+    <dgm:txLinClrLst/>
+    <dgm:txFillClrLst meth="repeat">
+      <a:schemeClr val="lt1"/>
+    </dgm:txFillClrLst>
+    <dgm:txEffectClrLst/>
+  </dgm:styleLbl>
+  <dgm:styleLbl name="parChTrans2D4">
+    <dgm:fillClrLst meth="repeat">
+      <a:schemeClr val="accent2"/>
+    </dgm:fillClrLst>
+    <dgm:linClrLst meth="repeat">
+      <a:schemeClr val="accent2"/>
+    </dgm:linClrLst>
+    <dgm:effectClrLst/>
+    <dgm:txLinClrLst/>
+    <dgm:txFillClrLst meth="repeat">
+      <a:schemeClr val="lt1"/>
+    </dgm:txFillClrLst>
+    <dgm:txEffectClrLst/>
+  </dgm:styleLbl>
+  <dgm:styleLbl name="parChTrans1D1">
+    <dgm:fillClrLst meth="repeat">
+      <a:schemeClr val="accent2"/>
+    </dgm:fillClrLst>
+    <dgm:linClrLst meth="repeat">
+      <a:schemeClr val="accent2">
+        <a:shade val="60000"/>
+      </a:schemeClr>
+    </dgm:linClrLst>
+    <dgm:effectClrLst/>
+    <dgm:txLinClrLst/>
+    <dgm:txFillClrLst meth="repeat">
+      <a:schemeClr val="tx1"/>
+    </dgm:txFillClrLst>
+    <dgm:txEffectClrLst/>
+  </dgm:styleLbl>
+  <dgm:styleLbl name="parChTrans1D2">
+    <dgm:fillClrLst meth="repeat">
+      <a:schemeClr val="accent2"/>
+    </dgm:fillClrLst>
+    <dgm:linClrLst meth="repeat">
+      <a:schemeClr val="accent2">
+        <a:shade val="60000"/>
+      </a:schemeClr>
+    </dgm:linClrLst>
+    <dgm:effectClrLst/>
+    <dgm:txLinClrLst/>
+    <dgm:txFillClrLst meth="repeat">
+      <a:schemeClr val="tx1"/>
+    </dgm:txFillClrLst>
+    <dgm:txEffectClrLst/>
+  </dgm:styleLbl>
+  <dgm:styleLbl name="parChTrans1D3">
+    <dgm:fillClrLst meth="repeat">
+      <a:schemeClr val="accent2"/>
+    </dgm:fillClrLst>
+    <dgm:linClrLst meth="repeat">
+      <a:schemeClr val="accent2">
+        <a:shade val="80000"/>
+      </a:schemeClr>
+    </dgm:linClrLst>
+    <dgm:effectClrLst/>
+    <dgm:txLinClrLst/>
+    <dgm:txFillClrLst meth="repeat">
+      <a:schemeClr val="tx1"/>
+    </dgm:txFillClrLst>
+    <dgm:txEffectClrLst/>
+  </dgm:styleLbl>
+  <dgm:styleLbl name="parChTrans1D4">
+    <dgm:fillClrLst meth="repeat">
+      <a:schemeClr val="accent2"/>
+    </dgm:fillClrLst>
+    <dgm:linClrLst meth="repeat">
+      <a:schemeClr val="accent2">
+        <a:shade val="80000"/>
+      </a:schemeClr>
+    </dgm:linClrLst>
+    <dgm:effectClrLst/>
+    <dgm:txLinClrLst/>
+    <dgm:txFillClrLst meth="repeat">
+      <a:schemeClr val="tx1"/>
+    </dgm:txFillClrLst>
+    <dgm:txEffectClrLst/>
+  </dgm:styleLbl>
+  <dgm:styleLbl name="fgAcc1">
+    <dgm:fillClrLst meth="repeat">
+      <a:schemeClr val="lt1">
+        <a:alpha val="90000"/>
+      </a:schemeClr>
+    </dgm:fillClrLst>
+    <dgm:linClrLst meth="repeat">
+      <a:schemeClr val="accent2"/>
+    </dgm:linClrLst>
+    <dgm:effectClrLst/>
+    <dgm:txLinClrLst/>
+    <dgm:txFillClrLst meth="repeat">
+      <a:schemeClr val="dk1"/>
+    </dgm:txFillClrLst>
+    <dgm:txEffectClrLst/>
+  </dgm:styleLbl>
+  <dgm:styleLbl name="conFgAcc1">
+    <dgm:fillClrLst meth="repeat">
+      <a:schemeClr val="lt1">
+        <a:alpha val="90000"/>
+      </a:schemeClr>
+    </dgm:fillClrLst>
+    <dgm:linClrLst meth="repeat">
+      <a:schemeClr val="accent2"/>
+    </dgm:linClrLst>
+    <dgm:effectClrLst/>
+    <dgm:txLinClrLst/>
+    <dgm:txFillClrLst meth="repeat">
+      <a:schemeClr val="dk1"/>
+    </dgm:txFillClrLst>
+    <dgm:txEffectClrLst/>
+  </dgm:styleLbl>
+  <dgm:styleLbl name="alignAcc1">
+    <dgm:fillClrLst meth="repeat">
+      <a:schemeClr val="lt1">
+        <a:alpha val="90000"/>
+      </a:schemeClr>
+    </dgm:fillClrLst>
+    <dgm:linClrLst meth="repeat">
+      <a:schemeClr val="accent2"/>
+    </dgm:linClrLst>
+    <dgm:effectClrLst/>
+    <dgm:txLinClrLst/>
+    <dgm:txFillClrLst meth="repeat">
+      <a:schemeClr val="dk1"/>
+    </dgm:txFillClrLst>
+    <dgm:txEffectClrLst/>
+  </dgm:styleLbl>
+  <dgm:styleLbl name="trAlignAcc1">
+    <dgm:fillClrLst meth="repeat">
+      <a:schemeClr val="lt1">
+        <a:alpha val="40000"/>
+      </a:schemeClr>
+    </dgm:fillClrLst>
+    <dgm:linClrLst meth="repeat">
+      <a:schemeClr val="accent2"/>
+    </dgm:linClrLst>
+    <dgm:effectClrLst/>
+    <dgm:txLinClrLst/>
+    <dgm:txFillClrLst meth="repeat">
+      <a:schemeClr val="dk1"/>
+    </dgm:txFillClrLst>
+    <dgm:txEffectClrLst/>
+  </dgm:styleLbl>
+  <dgm:styleLbl name="bgAcc1">
+    <dgm:fillClrLst meth="repeat">
+      <a:schemeClr val="lt1">
+        <a:alpha val="90000"/>
+      </a:schemeClr>
+    </dgm:fillClrLst>
+    <dgm:linClrLst meth="repeat">
+      <a:schemeClr val="accent2"/>
+    </dgm:linClrLst>
+    <dgm:effectClrLst/>
+    <dgm:txLinClrLst/>
+    <dgm:txFillClrLst meth="repeat">
+      <a:schemeClr val="dk1"/>
+    </dgm:txFillClrLst>
+    <dgm:txEffectClrLst/>
+  </dgm:styleLbl>
+  <dgm:styleLbl name="solidFgAcc1">
+    <dgm:fillClrLst meth="repeat">
+      <a:schemeClr val="lt1"/>
+    </dgm:fillClrLst>
+    <dgm:linClrLst meth="repeat">
+      <a:schemeClr val="accent2"/>
+    </dgm:linClrLst>
+    <dgm:effectClrLst/>
+    <dgm:txLinClrLst/>
+    <dgm:txFillClrLst meth="repeat">
+      <a:schemeClr val="dk1"/>
+    </dgm:txFillClrLst>
+    <dgm:txEffectClrLst/>
+  </dgm:styleLbl>
+  <dgm:styleLbl name="solidAlignAcc1">
+    <dgm:fillClrLst meth="repeat">
+      <a:schemeClr val="lt1"/>
+    </dgm:fillClrLst>
+    <dgm:linClrLst meth="repeat">
+      <a:schemeClr val="accent2"/>
+    </dgm:linClrLst>
+    <dgm:effectClrLst/>
+    <dgm:txLinClrLst/>
+    <dgm:txFillClrLst meth="repeat">
+      <a:schemeClr val="dk1"/>
+    </dgm:txFillClrLst>
+    <dgm:txEffectClrLst/>
+  </dgm:styleLbl>
+  <dgm:styleLbl name="solidBgAcc1">
+    <dgm:fillClrLst meth="repeat">
+      <a:schemeClr val="lt1"/>
+    </dgm:fillClrLst>
+    <dgm:linClrLst meth="repeat">
+      <a:schemeClr val="accent2"/>
+    </dgm:linClrLst>
+    <dgm:effectClrLst/>
+    <dgm:txLinClrLst/>
+    <dgm:txFillClrLst meth="repeat">
+      <a:schemeClr val="dk1"/>
+    </dgm:txFillClrLst>
+    <dgm:txEffectClrLst/>
+  </dgm:styleLbl>
+  <dgm:styleLbl name="fgAccFollowNode1">
+    <dgm:fillClrLst meth="repeat">
+      <a:schemeClr val="accent2">
+        <a:alpha val="90000"/>
+        <a:tint val="40000"/>
+      </a:schemeClr>
+    </dgm:fillClrLst>
+    <dgm:linClrLst meth="repeat">
+      <a:schemeClr val="accent2">
+        <a:alpha val="90000"/>
+        <a:tint val="40000"/>
+      </a:schemeClr>
+    </dgm:linClrLst>
+    <dgm:effectClrLst/>
+    <dgm:txLinClrLst/>
+    <dgm:txFillClrLst meth="repeat">
+      <a:schemeClr val="dk1"/>
+    </dgm:txFillClrLst>
+    <dgm:txEffectClrLst/>
+  </dgm:styleLbl>
+  <dgm:styleLbl name="alignAccFollowNode1">
+    <dgm:fillClrLst meth="repeat">
+      <a:schemeClr val="accent2">
+        <a:alpha val="90000"/>
+        <a:tint val="40000"/>
+      </a:schemeClr>
+    </dgm:fillClrLst>
+    <dgm:linClrLst meth="repeat">
+      <a:schemeClr val="accent2">
+        <a:alpha val="90000"/>
+        <a:tint val="40000"/>
+      </a:schemeClr>
+    </dgm:linClrLst>
+    <dgm:effectClrLst/>
+    <dgm:txLinClrLst/>
+    <dgm:txFillClrLst meth="repeat">
+      <a:schemeClr val="dk1"/>
+    </dgm:txFillClrLst>
+    <dgm:txEffectClrLst/>
+  </dgm:styleLbl>
+  <dgm:styleLbl name="bgAccFollowNode1">
+    <dgm:fillClrLst meth="repeat">
+      <a:schemeClr val="accent2">
+        <a:alpha val="90000"/>
+        <a:tint val="40000"/>
+      </a:schemeClr>
+    </dgm:fillClrLst>
+    <dgm:linClrLst meth="repeat">
+      <a:schemeClr val="accent2">
+        <a:alpha val="90000"/>
+        <a:tint val="40000"/>
+      </a:schemeClr>
+    </dgm:linClrLst>
+    <dgm:effectClrLst/>
+    <dgm:txLinClrLst/>
+    <dgm:txFillClrLst meth="repeat">
+      <a:schemeClr val="dk1"/>
+    </dgm:txFillClrLst>
+    <dgm:txEffectClrLst/>
+  </dgm:styleLbl>
+  <dgm:styleLbl name="fgAcc0">
+    <dgm:fillClrLst meth="repeat">
+      <a:schemeClr val="lt1">
+        <a:alpha val="90000"/>
+      </a:schemeClr>
+    </dgm:fillClrLst>
+    <dgm:linClrLst meth="repeat">
+      <a:schemeClr val="accent2"/>
+    </dgm:linClrLst>
+    <dgm:effectClrLst/>
+    <dgm:txLinClrLst/>
+    <dgm:txFillClrLst meth="repeat">
+      <a:schemeClr val="dk1"/>
+    </dgm:txFillClrLst>
+    <dgm:txEffectClrLst/>
+  </dgm:styleLbl>
+  <dgm:styleLbl name="fgAcc2">
+    <dgm:fillClrLst meth="repeat">
+      <a:schemeClr val="lt1">
+        <a:alpha val="90000"/>
+      </a:schemeClr>
+    </dgm:fillClrLst>
+    <dgm:linClrLst meth="repeat">
+      <a:schemeClr val="accent2"/>
+    </dgm:linClrLst>
+    <dgm:effectClrLst/>
+    <dgm:txLinClrLst/>
+    <dgm:txFillClrLst meth="repeat">
+      <a:schemeClr val="dk1"/>
+    </dgm:txFillClrLst>
+    <dgm:txEffectClrLst/>
+  </dgm:styleLbl>
+  <dgm:styleLbl name="fgAcc3">
+    <dgm:fillClrLst meth="repeat">
+      <a:schemeClr val="lt1">
+        <a:alpha val="90000"/>
+      </a:schemeClr>
+    </dgm:fillClrLst>
+    <dgm:linClrLst meth="repeat">
+      <a:schemeClr val="accent2"/>
+    </dgm:linClrLst>
+    <dgm:effectClrLst/>
+    <dgm:txLinClrLst/>
+    <dgm:txFillClrLst meth="repeat">
+      <a:schemeClr val="dk1"/>
+    </dgm:txFillClrLst>
+    <dgm:txEffectClrLst/>
+  </dgm:styleLbl>
+  <dgm:styleLbl name="fgAcc4">
+    <dgm:fillClrLst meth="repeat">
+      <a:schemeClr val="lt1">
+        <a:alpha val="90000"/>
+      </a:schemeClr>
+    </dgm:fillClrLst>
+    <dgm:linClrLst meth="repeat">
+      <a:schemeClr val="accent2"/>
+    </dgm:linClrLst>
+    <dgm:effectClrLst/>
+    <dgm:txLinClrLst/>
+    <dgm:txFillClrLst meth="repeat">
+      <a:schemeClr val="dk1"/>
+    </dgm:txFillClrLst>
+    <dgm:txEffectClrLst/>
+  </dgm:styleLbl>
+  <dgm:styleLbl name="bgShp">
+    <dgm:fillClrLst meth="repeat">
+      <a:schemeClr val="accent2">
+        <a:tint val="40000"/>
+      </a:schemeClr>
+    </dgm:fillClrLst>
+    <dgm:linClrLst meth="repeat">
+      <a:schemeClr val="accent2"/>
+    </dgm:linClrLst>
+    <dgm:effectClrLst/>
+    <dgm:txLinClrLst/>
+    <dgm:txFillClrLst meth="repeat">
+      <a:schemeClr val="dk1"/>
+    </dgm:txFillClrLst>
+    <dgm:txEffectClrLst/>
+  </dgm:styleLbl>
+  <dgm:styleLbl name="dkBgShp">
+    <dgm:fillClrLst meth="repeat">
+      <a:schemeClr val="accent2">
+        <a:shade val="80000"/>
+      </a:schemeClr>
+    </dgm:fillClrLst>
+    <dgm:linClrLst meth="repeat">
+      <a:schemeClr val="accent2"/>
+    </dgm:linClrLst>
+    <dgm:effectClrLst/>
+    <dgm:txLinClrLst/>
+    <dgm:txFillClrLst meth="repeat">
+      <a:schemeClr val="lt1"/>
+    </dgm:txFillClrLst>
+    <dgm:txEffectClrLst/>
+  </dgm:styleLbl>
+  <dgm:styleLbl name="trBgShp">
+    <dgm:fillClrLst meth="repeat">
+      <a:schemeClr val="accent2">
+        <a:tint val="50000"/>
+        <a:alpha val="40000"/>
+      </a:schemeClr>
+    </dgm:fillClrLst>
+    <dgm:linClrLst meth="repeat">
+      <a:schemeClr val="accent2"/>
+    </dgm:linClrLst>
+    <dgm:effectClrLst/>
+    <dgm:txLinClrLst/>
+    <dgm:txFillClrLst meth="repeat">
+      <a:schemeClr val="lt1"/>
+    </dgm:txFillClrLst>
+    <dgm:txEffectClrLst/>
+  </dgm:styleLbl>
+  <dgm:styleLbl name="fgShp">
+    <dgm:fillClrLst meth="repeat">
+      <a:schemeClr val="accent2">
+        <a:tint val="60000"/>
+      </a:schemeClr>
+    </dgm:fillClrLst>
+    <dgm:linClrLst meth="repeat">
+      <a:schemeClr val="lt1"/>
+    </dgm:linClrLst>
+    <dgm:effectClrLst/>
+    <dgm:txLinClrLst/>
+    <dgm:txFillClrLst meth="repeat">
+      <a:schemeClr val="dk1"/>
+    </dgm:txFillClrLst>
+    <dgm:txEffectClrLst/>
+  </dgm:styleLbl>
+  <dgm:styleLbl name="revTx">
+    <dgm:fillClrLst meth="repeat">
+      <a:schemeClr val="lt1">
+        <a:alpha val="0"/>
+      </a:schemeClr>
+    </dgm:fillClrLst>
+    <dgm:linClrLst meth="repeat">
+      <a:schemeClr val="dk1">
+        <a:alpha val="0"/>
+      </a:schemeClr>
+    </dgm:linClrLst>
+    <dgm:effectClrLst/>
+    <dgm:txLinClrLst/>
+    <dgm:txFillClrLst meth="repeat">
+      <a:schemeClr val="tx1"/>
+    </dgm:txFillClrLst>
+    <dgm:txEffectClrLst/>
+  </dgm:styleLbl>
+</dgm:colorsDef>
+</file>
+
+<file path=ppt/diagrams/colors2.xml><?xml version="1.0" encoding="utf-8"?>
 <dgm:colorsDef xmlns:dgm="http://schemas.openxmlformats.org/drawingml/2006/diagram" xmlns:a="http://schemas.openxmlformats.org/drawingml/2006/main" uniqueId="urn:microsoft.com/office/officeart/2005/8/colors/accent0_3">
   <dgm:title val=""/>
   <dgm:desc val=""/>
@@ -896,6 +1648,376 @@
 </file>
 
 <file path=ppt/diagrams/data1.xml><?xml version="1.0" encoding="utf-8"?>
+<dgm:dataModel xmlns:dgm="http://schemas.openxmlformats.org/drawingml/2006/diagram" xmlns:a="http://schemas.openxmlformats.org/drawingml/2006/main">
+  <dgm:ptLst>
+    <dgm:pt modelId="{20EE2D5E-F702-4A5D-913C-FDD6D4CD6828}" type="doc">
+      <dgm:prSet loTypeId="urn:microsoft.com/office/officeart/2005/8/layout/hList6" loCatId="list" qsTypeId="urn:microsoft.com/office/officeart/2005/8/quickstyle/simple3" qsCatId="simple" csTypeId="urn:microsoft.com/office/officeart/2005/8/colors/accent2_2" csCatId="accent2"/>
+      <dgm:spPr/>
+      <dgm:t>
+        <a:bodyPr/>
+        <a:lstStyle/>
+        <a:p>
+          <a:endParaRPr lang="vi-VN"/>
+        </a:p>
+      </dgm:t>
+    </dgm:pt>
+    <dgm:pt modelId="{9E492877-3DB4-437F-B2A8-B534652324B2}">
+      <dgm:prSet/>
+      <dgm:spPr/>
+      <dgm:t>
+        <a:bodyPr/>
+        <a:lstStyle/>
+        <a:p>
+          <a:pPr rtl="0"/>
+          <a:r>
+            <a:rPr lang="en-US" smtClean="0">
+              <a:solidFill>
+                <a:srgbClr val="FF0000"/>
+              </a:solidFill>
+            </a:rPr>
+            <a:t>HTML5</a:t>
+          </a:r>
+          <a:endParaRPr lang="vi-VN">
+            <a:solidFill>
+              <a:srgbClr val="FF0000"/>
+            </a:solidFill>
+          </a:endParaRPr>
+        </a:p>
+      </dgm:t>
+    </dgm:pt>
+    <dgm:pt modelId="{0D166711-5A28-47E6-9C2B-4655D74E76EC}" type="parTrans" cxnId="{0C573826-7353-4FA3-8223-2E2F78BB2723}">
+      <dgm:prSet/>
+      <dgm:spPr/>
+      <dgm:t>
+        <a:bodyPr/>
+        <a:lstStyle/>
+        <a:p>
+          <a:endParaRPr lang="vi-VN"/>
+        </a:p>
+      </dgm:t>
+    </dgm:pt>
+    <dgm:pt modelId="{8FF42943-0148-4833-AFDA-CE6DD84AF558}" type="sibTrans" cxnId="{0C573826-7353-4FA3-8223-2E2F78BB2723}">
+      <dgm:prSet/>
+      <dgm:spPr/>
+      <dgm:t>
+        <a:bodyPr/>
+        <a:lstStyle/>
+        <a:p>
+          <a:endParaRPr lang="vi-VN"/>
+        </a:p>
+      </dgm:t>
+    </dgm:pt>
+    <dgm:pt modelId="{8D8250B8-7D61-4DD8-94EB-DCE2AAC8D1F6}">
+      <dgm:prSet/>
+      <dgm:spPr/>
+      <dgm:t>
+        <a:bodyPr/>
+        <a:lstStyle/>
+        <a:p>
+          <a:pPr algn="just" rtl="0"/>
+          <a:r>
+            <a:rPr lang="en-US" smtClean="0">
+              <a:latin typeface="Arial" pitchFamily="34" charset="0"/>
+              <a:cs typeface="Arial" pitchFamily="34" charset="0"/>
+            </a:rPr>
+            <a:t>Là chuẩn công nghệ mới  nhất của HTML.</a:t>
+          </a:r>
+          <a:endParaRPr lang="vi-VN">
+            <a:latin typeface="Arial" pitchFamily="34" charset="0"/>
+            <a:cs typeface="Arial" pitchFamily="34" charset="0"/>
+          </a:endParaRPr>
+        </a:p>
+      </dgm:t>
+    </dgm:pt>
+    <dgm:pt modelId="{F67CE5C5-5799-436A-B5BF-891425F9A5E3}" type="parTrans" cxnId="{93748C8C-DBA7-40FD-8BEE-3651422505FD}">
+      <dgm:prSet/>
+      <dgm:spPr/>
+      <dgm:t>
+        <a:bodyPr/>
+        <a:lstStyle/>
+        <a:p>
+          <a:endParaRPr lang="vi-VN"/>
+        </a:p>
+      </dgm:t>
+    </dgm:pt>
+    <dgm:pt modelId="{BB3FD149-F28A-438F-837B-9010F064CD8A}" type="sibTrans" cxnId="{93748C8C-DBA7-40FD-8BEE-3651422505FD}">
+      <dgm:prSet/>
+      <dgm:spPr/>
+      <dgm:t>
+        <a:bodyPr/>
+        <a:lstStyle/>
+        <a:p>
+          <a:endParaRPr lang="vi-VN"/>
+        </a:p>
+      </dgm:t>
+    </dgm:pt>
+    <dgm:pt modelId="{66D16FEC-866E-442D-A0E9-E25B0A7DF2DA}">
+      <dgm:prSet/>
+      <dgm:spPr/>
+      <dgm:t>
+        <a:bodyPr/>
+        <a:lstStyle/>
+        <a:p>
+          <a:pPr algn="just" rtl="0"/>
+          <a:r>
+            <a:rPr lang="en-US" smtClean="0">
+              <a:latin typeface="Arial" pitchFamily="34" charset="0"/>
+              <a:cs typeface="Arial" pitchFamily="34" charset="0"/>
+            </a:rPr>
+            <a:t>Vẫn đang được phát triển.</a:t>
+          </a:r>
+          <a:endParaRPr lang="vi-VN">
+            <a:latin typeface="Arial" pitchFamily="34" charset="0"/>
+            <a:cs typeface="Arial" pitchFamily="34" charset="0"/>
+          </a:endParaRPr>
+        </a:p>
+      </dgm:t>
+    </dgm:pt>
+    <dgm:pt modelId="{9F5C1AB7-BC2C-4827-85C3-D8CFB7A29B60}" type="parTrans" cxnId="{2F04CD73-DE41-4841-A9F8-7E23929D5A60}">
+      <dgm:prSet/>
+      <dgm:spPr/>
+      <dgm:t>
+        <a:bodyPr/>
+        <a:lstStyle/>
+        <a:p>
+          <a:endParaRPr lang="vi-VN"/>
+        </a:p>
+      </dgm:t>
+    </dgm:pt>
+    <dgm:pt modelId="{D0DDB64B-3642-40B0-B8C8-151BB4B011BB}" type="sibTrans" cxnId="{2F04CD73-DE41-4841-A9F8-7E23929D5A60}">
+      <dgm:prSet/>
+      <dgm:spPr/>
+      <dgm:t>
+        <a:bodyPr/>
+        <a:lstStyle/>
+        <a:p>
+          <a:endParaRPr lang="vi-VN"/>
+        </a:p>
+      </dgm:t>
+    </dgm:pt>
+    <dgm:pt modelId="{08A56D3E-C691-4CF9-8830-5BB0B89E94A2}">
+      <dgm:prSet/>
+      <dgm:spPr/>
+      <dgm:t>
+        <a:bodyPr/>
+        <a:lstStyle/>
+        <a:p>
+          <a:pPr algn="just" rtl="0"/>
+          <a:r>
+            <a:rPr lang="en-US" smtClean="0">
+              <a:latin typeface="Arial" pitchFamily="34" charset="0"/>
+              <a:cs typeface="Arial" pitchFamily="34" charset="0"/>
+            </a:rPr>
+            <a:t>Tính đến tháng 1/2011 thì vẫn còn trong giai đoạn đặc tả kỹ thuật</a:t>
+          </a:r>
+          <a:endParaRPr lang="vi-VN">
+            <a:latin typeface="Arial" pitchFamily="34" charset="0"/>
+            <a:cs typeface="Arial" pitchFamily="34" charset="0"/>
+          </a:endParaRPr>
+        </a:p>
+      </dgm:t>
+    </dgm:pt>
+    <dgm:pt modelId="{5788B36C-3F6F-40A8-8EC8-B7D5534E312E}" type="parTrans" cxnId="{1EBFD0D8-4761-4E40-8719-0B554DA0DF05}">
+      <dgm:prSet/>
+      <dgm:spPr/>
+      <dgm:t>
+        <a:bodyPr/>
+        <a:lstStyle/>
+        <a:p>
+          <a:endParaRPr lang="vi-VN"/>
+        </a:p>
+      </dgm:t>
+    </dgm:pt>
+    <dgm:pt modelId="{9CA8EE3F-1315-4D0C-B33B-7A75876E19C2}" type="sibTrans" cxnId="{1EBFD0D8-4761-4E40-8719-0B554DA0DF05}">
+      <dgm:prSet/>
+      <dgm:spPr/>
+      <dgm:t>
+        <a:bodyPr/>
+        <a:lstStyle/>
+        <a:p>
+          <a:endParaRPr lang="vi-VN"/>
+        </a:p>
+      </dgm:t>
+    </dgm:pt>
+    <dgm:pt modelId="{9DA62732-26A5-4EA9-83E4-49359569FB45}">
+      <dgm:prSet/>
+      <dgm:spPr/>
+      <dgm:t>
+        <a:bodyPr/>
+        <a:lstStyle/>
+        <a:p>
+          <a:pPr algn="just" rtl="0"/>
+          <a:r>
+            <a:rPr lang="en-US" smtClean="0">
+              <a:latin typeface="Arial" pitchFamily="34" charset="0"/>
+              <a:cs typeface="Arial" pitchFamily="34" charset="0"/>
+            </a:rPr>
+            <a:t>Dự kiến đến 2012 thì sẽ được đề suất sử dụng</a:t>
+          </a:r>
+          <a:endParaRPr lang="vi-VN">
+            <a:latin typeface="Arial" pitchFamily="34" charset="0"/>
+            <a:cs typeface="Arial" pitchFamily="34" charset="0"/>
+          </a:endParaRPr>
+        </a:p>
+      </dgm:t>
+    </dgm:pt>
+    <dgm:pt modelId="{7B827509-232B-49FD-802A-31B235A9EC83}" type="parTrans" cxnId="{A45FA1C8-3D31-46BB-9331-6AE5D3B5E80A}">
+      <dgm:prSet/>
+      <dgm:spPr/>
+      <dgm:t>
+        <a:bodyPr/>
+        <a:lstStyle/>
+        <a:p>
+          <a:endParaRPr lang="vi-VN"/>
+        </a:p>
+      </dgm:t>
+    </dgm:pt>
+    <dgm:pt modelId="{258665C2-29A2-4181-A4B4-F78754FD3C6D}" type="sibTrans" cxnId="{A45FA1C8-3D31-46BB-9331-6AE5D3B5E80A}">
+      <dgm:prSet/>
+      <dgm:spPr/>
+      <dgm:t>
+        <a:bodyPr/>
+        <a:lstStyle/>
+        <a:p>
+          <a:endParaRPr lang="vi-VN"/>
+        </a:p>
+      </dgm:t>
+    </dgm:pt>
+    <dgm:pt modelId="{74C6DDCB-C05A-49E8-B44C-ACBB7B02120D}">
+      <dgm:prSet/>
+      <dgm:spPr/>
+      <dgm:t>
+        <a:bodyPr/>
+        <a:lstStyle/>
+        <a:p>
+          <a:pPr algn="just" rtl="0"/>
+          <a:r>
+            <a:rPr lang="en-US" smtClean="0">
+              <a:latin typeface="Arial" pitchFamily="34" charset="0"/>
+              <a:cs typeface="Arial" pitchFamily="34" charset="0"/>
+            </a:rPr>
+            <a:t>Đến 2014 thì sẽ đặc tả đầy đủ</a:t>
+          </a:r>
+          <a:endParaRPr lang="vi-VN">
+            <a:latin typeface="Arial" pitchFamily="34" charset="0"/>
+            <a:cs typeface="Arial" pitchFamily="34" charset="0"/>
+          </a:endParaRPr>
+        </a:p>
+      </dgm:t>
+    </dgm:pt>
+    <dgm:pt modelId="{E164ED94-E168-4612-B580-6D627AE38F66}" type="parTrans" cxnId="{0F414816-02D6-4FDB-A039-BB13CA528BD2}">
+      <dgm:prSet/>
+      <dgm:spPr/>
+      <dgm:t>
+        <a:bodyPr/>
+        <a:lstStyle/>
+        <a:p>
+          <a:endParaRPr lang="vi-VN"/>
+        </a:p>
+      </dgm:t>
+    </dgm:pt>
+    <dgm:pt modelId="{3842FB5E-FAEB-4ADE-8DC1-D1EEC467A40C}" type="sibTrans" cxnId="{0F414816-02D6-4FDB-A039-BB13CA528BD2}">
+      <dgm:prSet/>
+      <dgm:spPr/>
+      <dgm:t>
+        <a:bodyPr/>
+        <a:lstStyle/>
+        <a:p>
+          <a:endParaRPr lang="vi-VN"/>
+        </a:p>
+      </dgm:t>
+    </dgm:pt>
+    <dgm:pt modelId="{9BC4EAFA-B4A3-45C5-A144-7A7CEED4C53B}">
+      <dgm:prSet/>
+      <dgm:spPr/>
+      <dgm:t>
+        <a:bodyPr/>
+        <a:lstStyle/>
+        <a:p>
+          <a:pPr algn="just" rtl="0"/>
+          <a:r>
+            <a:rPr lang="en-US" smtClean="0">
+              <a:latin typeface="Arial" pitchFamily="34" charset="0"/>
+              <a:cs typeface="Arial" pitchFamily="34" charset="0"/>
+            </a:rPr>
+            <a:t>Đến 2022 thì hoàn thành 100% và tương thích đầy đủ.</a:t>
+          </a:r>
+          <a:endParaRPr lang="vi-VN">
+            <a:latin typeface="Arial" pitchFamily="34" charset="0"/>
+            <a:cs typeface="Arial" pitchFamily="34" charset="0"/>
+          </a:endParaRPr>
+        </a:p>
+      </dgm:t>
+    </dgm:pt>
+    <dgm:pt modelId="{D20DA068-41CD-48CE-A1B0-BDB9AE06BB82}" type="parTrans" cxnId="{C8966D2E-5E63-4150-807A-010F2FE2E8F0}">
+      <dgm:prSet/>
+      <dgm:spPr/>
+      <dgm:t>
+        <a:bodyPr/>
+        <a:lstStyle/>
+        <a:p>
+          <a:endParaRPr lang="vi-VN"/>
+        </a:p>
+      </dgm:t>
+    </dgm:pt>
+    <dgm:pt modelId="{DFA44520-1A69-4074-BAE7-883230A7FEAE}" type="sibTrans" cxnId="{C8966D2E-5E63-4150-807A-010F2FE2E8F0}">
+      <dgm:prSet/>
+      <dgm:spPr/>
+      <dgm:t>
+        <a:bodyPr/>
+        <a:lstStyle/>
+        <a:p>
+          <a:endParaRPr lang="vi-VN"/>
+        </a:p>
+      </dgm:t>
+    </dgm:pt>
+    <dgm:pt modelId="{B95A78AB-21A9-4015-8250-940444BD3C15}" type="pres">
+      <dgm:prSet presAssocID="{20EE2D5E-F702-4A5D-913C-FDD6D4CD6828}" presName="Name0" presStyleCnt="0">
+        <dgm:presLayoutVars>
+          <dgm:dir/>
+          <dgm:resizeHandles val="exact"/>
+        </dgm:presLayoutVars>
+      </dgm:prSet>
+      <dgm:spPr/>
+    </dgm:pt>
+    <dgm:pt modelId="{CB4308E7-C16A-4D80-B990-A129F3D9F85C}" type="pres">
+      <dgm:prSet presAssocID="{9E492877-3DB4-437F-B2A8-B534652324B2}" presName="node" presStyleLbl="node1" presStyleIdx="0" presStyleCnt="1">
+        <dgm:presLayoutVars>
+          <dgm:bulletEnabled val="1"/>
+        </dgm:presLayoutVars>
+      </dgm:prSet>
+      <dgm:spPr/>
+    </dgm:pt>
+  </dgm:ptLst>
+  <dgm:cxnLst>
+    <dgm:cxn modelId="{DAF2F311-1F57-416C-928E-C790594461DE}" type="presOf" srcId="{74C6DDCB-C05A-49E8-B44C-ACBB7B02120D}" destId="{CB4308E7-C16A-4D80-B990-A129F3D9F85C}" srcOrd="0" destOrd="5" presId="urn:microsoft.com/office/officeart/2005/8/layout/hList6"/>
+    <dgm:cxn modelId="{0C573826-7353-4FA3-8223-2E2F78BB2723}" srcId="{20EE2D5E-F702-4A5D-913C-FDD6D4CD6828}" destId="{9E492877-3DB4-437F-B2A8-B534652324B2}" srcOrd="0" destOrd="0" parTransId="{0D166711-5A28-47E6-9C2B-4655D74E76EC}" sibTransId="{8FF42943-0148-4833-AFDA-CE6DD84AF558}"/>
+    <dgm:cxn modelId="{A6F94DF7-248B-43E6-B28D-2CAFA3A4E957}" type="presOf" srcId="{20EE2D5E-F702-4A5D-913C-FDD6D4CD6828}" destId="{B95A78AB-21A9-4015-8250-940444BD3C15}" srcOrd="0" destOrd="0" presId="urn:microsoft.com/office/officeart/2005/8/layout/hList6"/>
+    <dgm:cxn modelId="{21302D41-93AC-44F0-96A3-1B294CE34FFE}" type="presOf" srcId="{9E492877-3DB4-437F-B2A8-B534652324B2}" destId="{CB4308E7-C16A-4D80-B990-A129F3D9F85C}" srcOrd="0" destOrd="0" presId="urn:microsoft.com/office/officeart/2005/8/layout/hList6"/>
+    <dgm:cxn modelId="{2FE15E40-91CA-472F-99C8-D7D0A11075E7}" type="presOf" srcId="{08A56D3E-C691-4CF9-8830-5BB0B89E94A2}" destId="{CB4308E7-C16A-4D80-B990-A129F3D9F85C}" srcOrd="0" destOrd="3" presId="urn:microsoft.com/office/officeart/2005/8/layout/hList6"/>
+    <dgm:cxn modelId="{93748C8C-DBA7-40FD-8BEE-3651422505FD}" srcId="{9E492877-3DB4-437F-B2A8-B534652324B2}" destId="{8D8250B8-7D61-4DD8-94EB-DCE2AAC8D1F6}" srcOrd="0" destOrd="0" parTransId="{F67CE5C5-5799-436A-B5BF-891425F9A5E3}" sibTransId="{BB3FD149-F28A-438F-837B-9010F064CD8A}"/>
+    <dgm:cxn modelId="{C2F4F394-620B-4C24-A8B2-5FF642C734ED}" type="presOf" srcId="{9BC4EAFA-B4A3-45C5-A144-7A7CEED4C53B}" destId="{CB4308E7-C16A-4D80-B990-A129F3D9F85C}" srcOrd="0" destOrd="6" presId="urn:microsoft.com/office/officeart/2005/8/layout/hList6"/>
+    <dgm:cxn modelId="{0F414816-02D6-4FDB-A039-BB13CA528BD2}" srcId="{9E492877-3DB4-437F-B2A8-B534652324B2}" destId="{74C6DDCB-C05A-49E8-B44C-ACBB7B02120D}" srcOrd="4" destOrd="0" parTransId="{E164ED94-E168-4612-B580-6D627AE38F66}" sibTransId="{3842FB5E-FAEB-4ADE-8DC1-D1EEC467A40C}"/>
+    <dgm:cxn modelId="{A45FA1C8-3D31-46BB-9331-6AE5D3B5E80A}" srcId="{9E492877-3DB4-437F-B2A8-B534652324B2}" destId="{9DA62732-26A5-4EA9-83E4-49359569FB45}" srcOrd="3" destOrd="0" parTransId="{7B827509-232B-49FD-802A-31B235A9EC83}" sibTransId="{258665C2-29A2-4181-A4B4-F78754FD3C6D}"/>
+    <dgm:cxn modelId="{2F04CD73-DE41-4841-A9F8-7E23929D5A60}" srcId="{9E492877-3DB4-437F-B2A8-B534652324B2}" destId="{66D16FEC-866E-442D-A0E9-E25B0A7DF2DA}" srcOrd="1" destOrd="0" parTransId="{9F5C1AB7-BC2C-4827-85C3-D8CFB7A29B60}" sibTransId="{D0DDB64B-3642-40B0-B8C8-151BB4B011BB}"/>
+    <dgm:cxn modelId="{1EBFD0D8-4761-4E40-8719-0B554DA0DF05}" srcId="{9E492877-3DB4-437F-B2A8-B534652324B2}" destId="{08A56D3E-C691-4CF9-8830-5BB0B89E94A2}" srcOrd="2" destOrd="0" parTransId="{5788B36C-3F6F-40A8-8EC8-B7D5534E312E}" sibTransId="{9CA8EE3F-1315-4D0C-B33B-7A75876E19C2}"/>
+    <dgm:cxn modelId="{8106B156-2A33-465B-B469-749D442FCE71}" type="presOf" srcId="{8D8250B8-7D61-4DD8-94EB-DCE2AAC8D1F6}" destId="{CB4308E7-C16A-4D80-B990-A129F3D9F85C}" srcOrd="0" destOrd="1" presId="urn:microsoft.com/office/officeart/2005/8/layout/hList6"/>
+    <dgm:cxn modelId="{51CF858F-BE4E-40AD-BE23-F2E9303FFC6C}" type="presOf" srcId="{66D16FEC-866E-442D-A0E9-E25B0A7DF2DA}" destId="{CB4308E7-C16A-4D80-B990-A129F3D9F85C}" srcOrd="0" destOrd="2" presId="urn:microsoft.com/office/officeart/2005/8/layout/hList6"/>
+    <dgm:cxn modelId="{79A0168D-5F0E-45CF-9404-8F484035FAB8}" type="presOf" srcId="{9DA62732-26A5-4EA9-83E4-49359569FB45}" destId="{CB4308E7-C16A-4D80-B990-A129F3D9F85C}" srcOrd="0" destOrd="4" presId="urn:microsoft.com/office/officeart/2005/8/layout/hList6"/>
+    <dgm:cxn modelId="{C8966D2E-5E63-4150-807A-010F2FE2E8F0}" srcId="{9E492877-3DB4-437F-B2A8-B534652324B2}" destId="{9BC4EAFA-B4A3-45C5-A144-7A7CEED4C53B}" srcOrd="5" destOrd="0" parTransId="{D20DA068-41CD-48CE-A1B0-BDB9AE06BB82}" sibTransId="{DFA44520-1A69-4074-BAE7-883230A7FEAE}"/>
+    <dgm:cxn modelId="{9AEBB1E1-887A-48D6-8364-9841E2444249}" type="presParOf" srcId="{B95A78AB-21A9-4015-8250-940444BD3C15}" destId="{CB4308E7-C16A-4D80-B990-A129F3D9F85C}" srcOrd="0" destOrd="0" presId="urn:microsoft.com/office/officeart/2005/8/layout/hList6"/>
+  </dgm:cxnLst>
+  <dgm:bg/>
+  <dgm:whole/>
+  <dgm:extLst>
+    <a:ext uri="http://schemas.microsoft.com/office/drawing/2008/diagram">
+      <dsp:dataModelExt xmlns:dsp="http://schemas.microsoft.com/office/drawing/2008/diagram" xmlns="" relId="rId7" minVer="http://schemas.openxmlformats.org/drawingml/2006/diagram"/>
+    </a:ext>
+  </dgm:extLst>
+</dgm:dataModel>
+</file>
+
+<file path=ppt/diagrams/data2.xml><?xml version="1.0" encoding="utf-8"?>
 <dgm:dataModel xmlns:dgm="http://schemas.openxmlformats.org/drawingml/2006/diagram" xmlns:a="http://schemas.openxmlformats.org/drawingml/2006/main">
   <dgm:ptLst>
     <dgm:pt modelId="{49096357-9C91-4167-A972-E985BAD816A0}" type="doc">
@@ -918,7 +2040,7 @@
         <a:p>
           <a:r>
             <a:rPr lang="en-US" smtClean="0"/>
-            <a:t>ASDA</a:t>
+            <a:t>AS</a:t>
           </a:r>
           <a:endParaRPr lang="vi-VN"/>
         </a:p>
@@ -980,9 +2102,9 @@
     </dgm:pt>
   </dgm:ptLst>
   <dgm:cxnLst>
+    <dgm:cxn modelId="{5E800945-FE86-4621-A09A-16A153C76E56}" type="presOf" srcId="{49096357-9C91-4167-A972-E985BAD816A0}" destId="{31933326-C36D-4ED9-A75F-33F1E14837D8}" srcOrd="0" destOrd="0" presId="urn:microsoft.com/office/officeart/2005/8/layout/vList2"/>
     <dgm:cxn modelId="{53037927-50B0-44F0-B088-1671EEF68BD5}" type="presOf" srcId="{B0B29364-8619-4595-97C3-608B15BEC228}" destId="{45619883-06EF-40B0-97F4-84FDACE06C27}" srcOrd="0" destOrd="0" presId="urn:microsoft.com/office/officeart/2005/8/layout/vList2"/>
     <dgm:cxn modelId="{4F9CEC8A-AC29-417F-B13A-1627C41C95B3}" srcId="{49096357-9C91-4167-A972-E985BAD816A0}" destId="{B0B29364-8619-4595-97C3-608B15BEC228}" srcOrd="0" destOrd="0" parTransId="{066CCF9F-F9EC-4974-BC4F-1FB258A8D9E7}" sibTransId="{4D99351C-3DC8-4C36-9084-7BCD935801CD}"/>
-    <dgm:cxn modelId="{5E800945-FE86-4621-A09A-16A153C76E56}" type="presOf" srcId="{49096357-9C91-4167-A972-E985BAD816A0}" destId="{31933326-C36D-4ED9-A75F-33F1E14837D8}" srcOrd="0" destOrd="0" presId="urn:microsoft.com/office/officeart/2005/8/layout/vList2"/>
     <dgm:cxn modelId="{F5FE96E3-C692-4594-954B-1595C578AA9B}" type="presParOf" srcId="{31933326-C36D-4ED9-A75F-33F1E14837D8}" destId="{45619883-06EF-40B0-97F4-84FDACE06C27}" srcOrd="0" destOrd="0" presId="urn:microsoft.com/office/officeart/2005/8/layout/vList2"/>
   </dgm:cxnLst>
   <dgm:bg/>
@@ -996,6 +2118,285 @@
 </file>
 
 <file path=ppt/diagrams/drawing1.xml><?xml version="1.0" encoding="utf-8"?>
+<dsp:drawing xmlns:dgm="http://schemas.openxmlformats.org/drawingml/2006/diagram" xmlns:a="http://schemas.openxmlformats.org/drawingml/2006/main" xmlns:dsp="http://schemas.microsoft.com/office/drawing/2008/diagram">
+  <dsp:spTree>
+    <dsp:nvGrpSpPr>
+      <dsp:cNvPr id="0" name=""/>
+      <dsp:cNvGrpSpPr/>
+    </dsp:nvGrpSpPr>
+    <dsp:grpSpPr/>
+    <dsp:sp modelId="{CB4308E7-C16A-4D80-B990-A129F3D9F85C}">
+      <dsp:nvSpPr>
+        <dsp:cNvPr id="0" name=""/>
+        <dsp:cNvSpPr/>
+      </dsp:nvSpPr>
+      <dsp:spPr>
+        <a:xfrm rot="16200000">
+          <a:off x="2209800" y="-2209800"/>
+          <a:ext cx="4114800" cy="8534400"/>
+        </a:xfrm>
+        <a:prstGeom prst="flowChartManualOperation">
+          <a:avLst/>
+        </a:prstGeom>
+        <a:gradFill rotWithShape="0">
+          <a:gsLst>
+            <a:gs pos="0">
+              <a:schemeClr val="accent2">
+                <a:hueOff val="0"/>
+                <a:satOff val="0"/>
+                <a:lumOff val="0"/>
+                <a:alphaOff val="0"/>
+                <a:tint val="50000"/>
+                <a:satMod val="300000"/>
+              </a:schemeClr>
+            </a:gs>
+            <a:gs pos="35000">
+              <a:schemeClr val="accent2">
+                <a:hueOff val="0"/>
+                <a:satOff val="0"/>
+                <a:lumOff val="0"/>
+                <a:alphaOff val="0"/>
+                <a:tint val="37000"/>
+                <a:satMod val="300000"/>
+              </a:schemeClr>
+            </a:gs>
+            <a:gs pos="100000">
+              <a:schemeClr val="accent2">
+                <a:hueOff val="0"/>
+                <a:satOff val="0"/>
+                <a:lumOff val="0"/>
+                <a:alphaOff val="0"/>
+                <a:tint val="15000"/>
+                <a:satMod val="350000"/>
+              </a:schemeClr>
+            </a:gs>
+          </a:gsLst>
+          <a:lin ang="16200000" scaled="1"/>
+        </a:gradFill>
+        <a:ln>
+          <a:noFill/>
+        </a:ln>
+        <a:effectLst>
+          <a:outerShdw blurRad="40000" dist="20000" dir="5400000" rotWithShape="0">
+            <a:srgbClr val="000000">
+              <a:alpha val="38000"/>
+            </a:srgbClr>
+          </a:outerShdw>
+        </a:effectLst>
+        <a:scene3d>
+          <a:camera prst="orthographicFront"/>
+          <a:lightRig rig="flat" dir="t"/>
+        </a:scene3d>
+        <a:sp3d prstMaterial="dkEdge">
+          <a:bevelT w="8200" h="38100"/>
+        </a:sp3d>
+      </dsp:spPr>
+      <dsp:style>
+        <a:lnRef idx="0">
+          <a:scrgbClr r="0" g="0" b="0"/>
+        </a:lnRef>
+        <a:fillRef idx="2">
+          <a:scrgbClr r="0" g="0" b="0"/>
+        </a:fillRef>
+        <a:effectRef idx="1">
+          <a:scrgbClr r="0" g="0" b="0"/>
+        </a:effectRef>
+        <a:fontRef idx="minor">
+          <a:schemeClr val="dk1"/>
+        </a:fontRef>
+      </dsp:style>
+      <dsp:txBody>
+        <a:bodyPr spcFirstLastPara="0" vert="horz" wrap="square" lIns="171450" tIns="0" rIns="168672" bIns="0" numCol="1" spcCol="1270" anchor="t" anchorCtr="0">
+          <a:noAutofit/>
+        </a:bodyPr>
+        <a:lstStyle/>
+        <a:p>
+          <a:pPr lvl="0" algn="l" defTabSz="1200150" rtl="0">
+            <a:lnSpc>
+              <a:spcPct val="90000"/>
+            </a:lnSpc>
+            <a:spcBef>
+              <a:spcPct val="0"/>
+            </a:spcBef>
+            <a:spcAft>
+              <a:spcPct val="35000"/>
+            </a:spcAft>
+          </a:pPr>
+          <a:r>
+            <a:rPr lang="en-US" sz="2700" kern="1200" smtClean="0">
+              <a:solidFill>
+                <a:srgbClr val="FF0000"/>
+              </a:solidFill>
+            </a:rPr>
+            <a:t>HTML5</a:t>
+          </a:r>
+          <a:endParaRPr lang="vi-VN" sz="2700" kern="1200">
+            <a:solidFill>
+              <a:srgbClr val="FF0000"/>
+            </a:solidFill>
+          </a:endParaRPr>
+        </a:p>
+        <a:p>
+          <a:pPr marL="228600" lvl="1" indent="-228600" algn="just" defTabSz="933450" rtl="0">
+            <a:lnSpc>
+              <a:spcPct val="90000"/>
+            </a:lnSpc>
+            <a:spcBef>
+              <a:spcPct val="0"/>
+            </a:spcBef>
+            <a:spcAft>
+              <a:spcPct val="15000"/>
+            </a:spcAft>
+            <a:buChar char="••"/>
+          </a:pPr>
+          <a:r>
+            <a:rPr lang="en-US" sz="2100" kern="1200" smtClean="0">
+              <a:latin typeface="Arial" pitchFamily="34" charset="0"/>
+              <a:cs typeface="Arial" pitchFamily="34" charset="0"/>
+            </a:rPr>
+            <a:t>Là chuẩn công nghệ mới  nhất của HTML.</a:t>
+          </a:r>
+          <a:endParaRPr lang="vi-VN" sz="2100" kern="1200">
+            <a:latin typeface="Arial" pitchFamily="34" charset="0"/>
+            <a:cs typeface="Arial" pitchFamily="34" charset="0"/>
+          </a:endParaRPr>
+        </a:p>
+        <a:p>
+          <a:pPr marL="228600" lvl="1" indent="-228600" algn="just" defTabSz="933450" rtl="0">
+            <a:lnSpc>
+              <a:spcPct val="90000"/>
+            </a:lnSpc>
+            <a:spcBef>
+              <a:spcPct val="0"/>
+            </a:spcBef>
+            <a:spcAft>
+              <a:spcPct val="15000"/>
+            </a:spcAft>
+            <a:buChar char="••"/>
+          </a:pPr>
+          <a:r>
+            <a:rPr lang="en-US" sz="2100" kern="1200" smtClean="0">
+              <a:latin typeface="Arial" pitchFamily="34" charset="0"/>
+              <a:cs typeface="Arial" pitchFamily="34" charset="0"/>
+            </a:rPr>
+            <a:t>Vẫn đang được phát triển.</a:t>
+          </a:r>
+          <a:endParaRPr lang="vi-VN" sz="2100" kern="1200">
+            <a:latin typeface="Arial" pitchFamily="34" charset="0"/>
+            <a:cs typeface="Arial" pitchFamily="34" charset="0"/>
+          </a:endParaRPr>
+        </a:p>
+        <a:p>
+          <a:pPr marL="228600" lvl="1" indent="-228600" algn="just" defTabSz="933450" rtl="0">
+            <a:lnSpc>
+              <a:spcPct val="90000"/>
+            </a:lnSpc>
+            <a:spcBef>
+              <a:spcPct val="0"/>
+            </a:spcBef>
+            <a:spcAft>
+              <a:spcPct val="15000"/>
+            </a:spcAft>
+            <a:buChar char="••"/>
+          </a:pPr>
+          <a:r>
+            <a:rPr lang="en-US" sz="2100" kern="1200" smtClean="0">
+              <a:latin typeface="Arial" pitchFamily="34" charset="0"/>
+              <a:cs typeface="Arial" pitchFamily="34" charset="0"/>
+            </a:rPr>
+            <a:t>Tính đến tháng 1/2011 thì vẫn còn trong giai đoạn đặc tả kỹ thuật</a:t>
+          </a:r>
+          <a:endParaRPr lang="vi-VN" sz="2100" kern="1200">
+            <a:latin typeface="Arial" pitchFamily="34" charset="0"/>
+            <a:cs typeface="Arial" pitchFamily="34" charset="0"/>
+          </a:endParaRPr>
+        </a:p>
+        <a:p>
+          <a:pPr marL="228600" lvl="1" indent="-228600" algn="just" defTabSz="933450" rtl="0">
+            <a:lnSpc>
+              <a:spcPct val="90000"/>
+            </a:lnSpc>
+            <a:spcBef>
+              <a:spcPct val="0"/>
+            </a:spcBef>
+            <a:spcAft>
+              <a:spcPct val="15000"/>
+            </a:spcAft>
+            <a:buChar char="••"/>
+          </a:pPr>
+          <a:r>
+            <a:rPr lang="en-US" sz="2100" kern="1200" smtClean="0">
+              <a:latin typeface="Arial" pitchFamily="34" charset="0"/>
+              <a:cs typeface="Arial" pitchFamily="34" charset="0"/>
+            </a:rPr>
+            <a:t>Dự kiến đến 2012 thì sẽ được đề suất sử dụng</a:t>
+          </a:r>
+          <a:endParaRPr lang="vi-VN" sz="2100" kern="1200">
+            <a:latin typeface="Arial" pitchFamily="34" charset="0"/>
+            <a:cs typeface="Arial" pitchFamily="34" charset="0"/>
+          </a:endParaRPr>
+        </a:p>
+        <a:p>
+          <a:pPr marL="228600" lvl="1" indent="-228600" algn="just" defTabSz="933450" rtl="0">
+            <a:lnSpc>
+              <a:spcPct val="90000"/>
+            </a:lnSpc>
+            <a:spcBef>
+              <a:spcPct val="0"/>
+            </a:spcBef>
+            <a:spcAft>
+              <a:spcPct val="15000"/>
+            </a:spcAft>
+            <a:buChar char="••"/>
+          </a:pPr>
+          <a:r>
+            <a:rPr lang="en-US" sz="2100" kern="1200" smtClean="0">
+              <a:latin typeface="Arial" pitchFamily="34" charset="0"/>
+              <a:cs typeface="Arial" pitchFamily="34" charset="0"/>
+            </a:rPr>
+            <a:t>Đến 2014 thì sẽ đặc tả đầy đủ</a:t>
+          </a:r>
+          <a:endParaRPr lang="vi-VN" sz="2100" kern="1200">
+            <a:latin typeface="Arial" pitchFamily="34" charset="0"/>
+            <a:cs typeface="Arial" pitchFamily="34" charset="0"/>
+          </a:endParaRPr>
+        </a:p>
+        <a:p>
+          <a:pPr marL="228600" lvl="1" indent="-228600" algn="just" defTabSz="933450" rtl="0">
+            <a:lnSpc>
+              <a:spcPct val="90000"/>
+            </a:lnSpc>
+            <a:spcBef>
+              <a:spcPct val="0"/>
+            </a:spcBef>
+            <a:spcAft>
+              <a:spcPct val="15000"/>
+            </a:spcAft>
+            <a:buChar char="••"/>
+          </a:pPr>
+          <a:r>
+            <a:rPr lang="en-US" sz="2100" kern="1200" smtClean="0">
+              <a:latin typeface="Arial" pitchFamily="34" charset="0"/>
+              <a:cs typeface="Arial" pitchFamily="34" charset="0"/>
+            </a:rPr>
+            <a:t>Đến 2022 thì hoàn thành 100% và tương thích đầy đủ.</a:t>
+          </a:r>
+          <a:endParaRPr lang="vi-VN" sz="2100" kern="1200">
+            <a:latin typeface="Arial" pitchFamily="34" charset="0"/>
+            <a:cs typeface="Arial" pitchFamily="34" charset="0"/>
+          </a:endParaRPr>
+        </a:p>
+      </dsp:txBody>
+      <dsp:txXfrm rot="16200000">
+        <a:off x="2209800" y="-2209800"/>
+        <a:ext cx="4114800" cy="8534400"/>
+      </dsp:txXfrm>
+    </dsp:sp>
+  </dsp:spTree>
+</dsp:drawing>
+</file>
+
+<file path=ppt/diagrams/drawing2.xml><?xml version="1.0" encoding="utf-8"?>
 <dsp:drawing xmlns:dgm="http://schemas.openxmlformats.org/drawingml/2006/diagram" xmlns:a="http://schemas.openxmlformats.org/drawingml/2006/main" xmlns:dsp="http://schemas.microsoft.com/office/drawing/2008/diagram">
   <dsp:spTree>
     <dsp:nvGrpSpPr>
@@ -1070,7 +2471,7 @@
           </a:pPr>
           <a:r>
             <a:rPr lang="en-US" sz="6500" kern="1200" smtClean="0"/>
-            <a:t>ASDA</a:t>
+            <a:t>AS</a:t>
           </a:r>
           <a:endParaRPr lang="vi-VN" sz="6500" kern="1200"/>
         </a:p>
@@ -1085,6 +2486,178 @@
 </file>
 
 <file path=ppt/diagrams/layout1.xml><?xml version="1.0" encoding="utf-8"?>
+<dgm:layoutDef xmlns:dgm="http://schemas.openxmlformats.org/drawingml/2006/diagram" xmlns:a="http://schemas.openxmlformats.org/drawingml/2006/main" uniqueId="urn:microsoft.com/office/officeart/2005/8/layout/hList6">
+  <dgm:title val=""/>
+  <dgm:desc val=""/>
+  <dgm:catLst>
+    <dgm:cat type="list" pri="18000"/>
+  </dgm:catLst>
+  <dgm:sampData>
+    <dgm:dataModel>
+      <dgm:ptLst>
+        <dgm:pt modelId="0" type="doc"/>
+        <dgm:pt modelId="1">
+          <dgm:prSet phldr="1"/>
+        </dgm:pt>
+        <dgm:pt modelId="11">
+          <dgm:prSet phldr="1"/>
+        </dgm:pt>
+        <dgm:pt modelId="12">
+          <dgm:prSet phldr="1"/>
+        </dgm:pt>
+        <dgm:pt modelId="2">
+          <dgm:prSet phldr="1"/>
+        </dgm:pt>
+        <dgm:pt modelId="21">
+          <dgm:prSet phldr="1"/>
+        </dgm:pt>
+        <dgm:pt modelId="22">
+          <dgm:prSet phldr="1"/>
+        </dgm:pt>
+        <dgm:pt modelId="3">
+          <dgm:prSet phldr="1"/>
+        </dgm:pt>
+        <dgm:pt modelId="31">
+          <dgm:prSet phldr="1"/>
+        </dgm:pt>
+        <dgm:pt modelId="32">
+          <dgm:prSet phldr="1"/>
+        </dgm:pt>
+      </dgm:ptLst>
+      <dgm:cxnLst>
+        <dgm:cxn modelId="4" srcId="0" destId="1" srcOrd="0" destOrd="0"/>
+        <dgm:cxn modelId="5" srcId="0" destId="2" srcOrd="1" destOrd="0"/>
+        <dgm:cxn modelId="6" srcId="0" destId="3" srcOrd="2" destOrd="0"/>
+        <dgm:cxn modelId="13" srcId="1" destId="11" srcOrd="0" destOrd="0"/>
+        <dgm:cxn modelId="14" srcId="1" destId="12" srcOrd="1" destOrd="0"/>
+        <dgm:cxn modelId="23" srcId="2" destId="21" srcOrd="0" destOrd="0"/>
+        <dgm:cxn modelId="24" srcId="2" destId="22" srcOrd="1" destOrd="0"/>
+        <dgm:cxn modelId="33" srcId="3" destId="31" srcOrd="0" destOrd="0"/>
+        <dgm:cxn modelId="34" srcId="3" destId="32" srcOrd="1" destOrd="0"/>
+      </dgm:cxnLst>
+      <dgm:bg/>
+      <dgm:whole/>
+    </dgm:dataModel>
+  </dgm:sampData>
+  <dgm:styleData>
+    <dgm:dataModel>
+      <dgm:ptLst>
+        <dgm:pt modelId="0" type="doc"/>
+        <dgm:pt modelId="1"/>
+        <dgm:pt modelId="11"/>
+        <dgm:pt modelId="2"/>
+        <dgm:pt modelId="21"/>
+      </dgm:ptLst>
+      <dgm:cxnLst>
+        <dgm:cxn modelId="4" srcId="0" destId="1" srcOrd="0" destOrd="0"/>
+        <dgm:cxn modelId="5" srcId="0" destId="2" srcOrd="1" destOrd="0"/>
+        <dgm:cxn modelId="13" srcId="1" destId="11" srcOrd="0" destOrd="0"/>
+        <dgm:cxn modelId="23" srcId="2" destId="21" srcOrd="0" destOrd="0"/>
+      </dgm:cxnLst>
+      <dgm:bg/>
+      <dgm:whole/>
+    </dgm:dataModel>
+  </dgm:styleData>
+  <dgm:clrData>
+    <dgm:dataModel>
+      <dgm:ptLst>
+        <dgm:pt modelId="0" type="doc"/>
+        <dgm:pt modelId="1"/>
+        <dgm:pt modelId="11"/>
+        <dgm:pt modelId="2"/>
+        <dgm:pt modelId="21"/>
+        <dgm:pt modelId="3"/>
+        <dgm:pt modelId="31"/>
+        <dgm:pt modelId="4"/>
+        <dgm:pt modelId="41"/>
+      </dgm:ptLst>
+      <dgm:cxnLst>
+        <dgm:cxn modelId="5" srcId="0" destId="1" srcOrd="0" destOrd="0"/>
+        <dgm:cxn modelId="6" srcId="0" destId="2" srcOrd="1" destOrd="0"/>
+        <dgm:cxn modelId="7" srcId="0" destId="3" srcOrd="2" destOrd="0"/>
+        <dgm:cxn modelId="8" srcId="0" destId="4" srcOrd="3" destOrd="0"/>
+        <dgm:cxn modelId="13" srcId="1" destId="11" srcOrd="0" destOrd="0"/>
+        <dgm:cxn modelId="23" srcId="2" destId="21" srcOrd="0" destOrd="0"/>
+        <dgm:cxn modelId="33" srcId="3" destId="31" srcOrd="0" destOrd="0"/>
+        <dgm:cxn modelId="43" srcId="4" destId="41" srcOrd="0" destOrd="0"/>
+      </dgm:cxnLst>
+      <dgm:bg/>
+      <dgm:whole/>
+    </dgm:dataModel>
+  </dgm:clrData>
+  <dgm:layoutNode name="Name0">
+    <dgm:varLst>
+      <dgm:dir/>
+      <dgm:resizeHandles val="exact"/>
+    </dgm:varLst>
+    <dgm:choose name="Name1">
+      <dgm:if name="Name2" func="var" arg="dir" op="equ" val="norm">
+        <dgm:alg type="lin"/>
+      </dgm:if>
+      <dgm:else name="Name3">
+        <dgm:alg type="lin">
+          <dgm:param type="linDir" val="fromR"/>
+        </dgm:alg>
+      </dgm:else>
+    </dgm:choose>
+    <dgm:shape xmlns:r="http://schemas.openxmlformats.org/officeDocument/2006/relationships" r:blip="">
+      <dgm:adjLst/>
+    </dgm:shape>
+    <dgm:presOf/>
+    <dgm:constrLst>
+      <dgm:constr type="h" for="ch" ptType="node" refType="h"/>
+      <dgm:constr type="w" for="ch" ptType="node" refType="w"/>
+      <dgm:constr type="primFontSz" for="ch" ptType="node" op="equ"/>
+      <dgm:constr type="w" for="ch" forName="sibTrans" refType="w" fact="0.075"/>
+    </dgm:constrLst>
+    <dgm:ruleLst/>
+    <dgm:forEach name="nodesForEach" axis="ch" ptType="node">
+      <dgm:layoutNode name="node">
+        <dgm:varLst>
+          <dgm:bulletEnabled val="1"/>
+        </dgm:varLst>
+        <dgm:alg type="tx"/>
+        <dgm:choose name="Name4">
+          <dgm:if name="Name5" func="var" arg="dir" op="equ" val="norm">
+            <dgm:shape xmlns:r="http://schemas.openxmlformats.org/officeDocument/2006/relationships" rot="-90" type="flowChartManualOperation" r:blip="">
+              <dgm:adjLst/>
+            </dgm:shape>
+          </dgm:if>
+          <dgm:else name="Name6">
+            <dgm:shape xmlns:r="http://schemas.openxmlformats.org/officeDocument/2006/relationships" rot="90" type="flowChartManualOperation" r:blip="">
+              <dgm:adjLst/>
+            </dgm:shape>
+          </dgm:else>
+        </dgm:choose>
+        <dgm:presOf axis="desOrSelf" ptType="node"/>
+        <dgm:constrLst>
+          <dgm:constr type="primFontSz" val="65"/>
+          <dgm:constr type="tMarg"/>
+          <dgm:constr type="bMarg"/>
+          <dgm:constr type="lMarg" refType="primFontSz" fact="0.5"/>
+          <dgm:constr type="rMarg" refType="lMarg"/>
+        </dgm:constrLst>
+        <dgm:ruleLst>
+          <dgm:rule type="primFontSz" val="5" fact="NaN" max="NaN"/>
+        </dgm:ruleLst>
+      </dgm:layoutNode>
+      <dgm:forEach name="sibTransForEach" axis="followSib" ptType="sibTrans" cnt="1">
+        <dgm:layoutNode name="sibTrans">
+          <dgm:alg type="sp"/>
+          <dgm:shape xmlns:r="http://schemas.openxmlformats.org/officeDocument/2006/relationships" r:blip="">
+            <dgm:adjLst/>
+          </dgm:shape>
+          <dgm:presOf/>
+          <dgm:constrLst/>
+          <dgm:ruleLst/>
+        </dgm:layoutNode>
+      </dgm:forEach>
+    </dgm:forEach>
+  </dgm:layoutNode>
+</dgm:layoutDef>
+</file>
+
+<file path=ppt/diagrams/layout2.xml><?xml version="1.0" encoding="utf-8"?>
 <dgm:layoutDef xmlns:dgm="http://schemas.openxmlformats.org/drawingml/2006/diagram" xmlns:a="http://schemas.openxmlformats.org/drawingml/2006/main" uniqueId="urn:microsoft.com/office/officeart/2005/8/layout/vList2">
   <dgm:title val=""/>
   <dgm:desc val=""/>
@@ -1252,6 +2825,1066 @@
 </file>
 
 <file path=ppt/diagrams/quickStyle1.xml><?xml version="1.0" encoding="utf-8"?>
+<dgm:styleDef xmlns:dgm="http://schemas.openxmlformats.org/drawingml/2006/diagram" xmlns:a="http://schemas.openxmlformats.org/drawingml/2006/main" uniqueId="urn:microsoft.com/office/officeart/2005/8/quickstyle/simple3">
+  <dgm:title val=""/>
+  <dgm:desc val=""/>
+  <dgm:catLst>
+    <dgm:cat type="simple" pri="10300"/>
+  </dgm:catLst>
+  <dgm:scene3d>
+    <a:camera prst="orthographicFront"/>
+    <a:lightRig rig="threePt" dir="t"/>
+  </dgm:scene3d>
+  <dgm:styleLbl name="node0">
+    <dgm:scene3d>
+      <a:camera prst="orthographicFront"/>
+      <a:lightRig rig="flat" dir="t"/>
+    </dgm:scene3d>
+    <dgm:sp3d prstMaterial="dkEdge">
+      <a:bevelT w="8200" h="38100"/>
+    </dgm:sp3d>
+    <dgm:txPr/>
+    <dgm:style>
+      <a:lnRef idx="0">
+        <a:scrgbClr r="0" g="0" b="0"/>
+      </a:lnRef>
+      <a:fillRef idx="2">
+        <a:scrgbClr r="0" g="0" b="0"/>
+      </a:fillRef>
+      <a:effectRef idx="1">
+        <a:scrgbClr r="0" g="0" b="0"/>
+      </a:effectRef>
+      <a:fontRef idx="minor">
+        <a:schemeClr val="dk1"/>
+      </a:fontRef>
+    </dgm:style>
+  </dgm:styleLbl>
+  <dgm:styleLbl name="lnNode1">
+    <dgm:scene3d>
+      <a:camera prst="orthographicFront"/>
+      <a:lightRig rig="flat" dir="t"/>
+    </dgm:scene3d>
+    <dgm:sp3d prstMaterial="dkEdge">
+      <a:bevelT w="8200" h="38100"/>
+    </dgm:sp3d>
+    <dgm:txPr/>
+    <dgm:style>
+      <a:lnRef idx="1">
+        <a:scrgbClr r="0" g="0" b="0"/>
+      </a:lnRef>
+      <a:fillRef idx="2">
+        <a:scrgbClr r="0" g="0" b="0"/>
+      </a:fillRef>
+      <a:effectRef idx="0">
+        <a:scrgbClr r="0" g="0" b="0"/>
+      </a:effectRef>
+      <a:fontRef idx="minor">
+        <a:schemeClr val="dk1"/>
+      </a:fontRef>
+    </dgm:style>
+  </dgm:styleLbl>
+  <dgm:styleLbl name="vennNode1">
+    <dgm:scene3d>
+      <a:camera prst="orthographicFront"/>
+      <a:lightRig rig="flat" dir="t"/>
+    </dgm:scene3d>
+    <dgm:sp3d prstMaterial="dkEdge">
+      <a:bevelT w="8200" h="38100"/>
+    </dgm:sp3d>
+    <dgm:txPr/>
+    <dgm:style>
+      <a:lnRef idx="0">
+        <a:scrgbClr r="0" g="0" b="0"/>
+      </a:lnRef>
+      <a:fillRef idx="2">
+        <a:scrgbClr r="0" g="0" b="0"/>
+      </a:fillRef>
+      <a:effectRef idx="0">
+        <a:scrgbClr r="0" g="0" b="0"/>
+      </a:effectRef>
+      <a:fontRef idx="minor">
+        <a:schemeClr val="tx1"/>
+      </a:fontRef>
+    </dgm:style>
+  </dgm:styleLbl>
+  <dgm:styleLbl name="alignNode1">
+    <dgm:scene3d>
+      <a:camera prst="orthographicFront"/>
+      <a:lightRig rig="threePt" dir="t"/>
+    </dgm:scene3d>
+    <dgm:sp3d/>
+    <dgm:txPr/>
+    <dgm:style>
+      <a:lnRef idx="1">
+        <a:scrgbClr r="0" g="0" b="0"/>
+      </a:lnRef>
+      <a:fillRef idx="2">
+        <a:scrgbClr r="0" g="0" b="0"/>
+      </a:fillRef>
+      <a:effectRef idx="1">
+        <a:scrgbClr r="0" g="0" b="0"/>
+      </a:effectRef>
+      <a:fontRef idx="minor">
+        <a:schemeClr val="dk1"/>
+      </a:fontRef>
+    </dgm:style>
+  </dgm:styleLbl>
+  <dgm:styleLbl name="node1">
+    <dgm:scene3d>
+      <a:camera prst="orthographicFront"/>
+      <a:lightRig rig="flat" dir="t"/>
+    </dgm:scene3d>
+    <dgm:sp3d prstMaterial="dkEdge">
+      <a:bevelT w="8200" h="38100"/>
+    </dgm:sp3d>
+    <dgm:txPr/>
+    <dgm:style>
+      <a:lnRef idx="0">
+        <a:scrgbClr r="0" g="0" b="0"/>
+      </a:lnRef>
+      <a:fillRef idx="2">
+        <a:scrgbClr r="0" g="0" b="0"/>
+      </a:fillRef>
+      <a:effectRef idx="1">
+        <a:scrgbClr r="0" g="0" b="0"/>
+      </a:effectRef>
+      <a:fontRef idx="minor">
+        <a:schemeClr val="dk1"/>
+      </a:fontRef>
+    </dgm:style>
+  </dgm:styleLbl>
+  <dgm:styleLbl name="node2">
+    <dgm:scene3d>
+      <a:camera prst="orthographicFront"/>
+      <a:lightRig rig="flat" dir="t"/>
+    </dgm:scene3d>
+    <dgm:sp3d prstMaterial="dkEdge">
+      <a:bevelT w="8200" h="38100"/>
+    </dgm:sp3d>
+    <dgm:txPr/>
+    <dgm:style>
+      <a:lnRef idx="0">
+        <a:scrgbClr r="0" g="0" b="0"/>
+      </a:lnRef>
+      <a:fillRef idx="2">
+        <a:scrgbClr r="0" g="0" b="0"/>
+      </a:fillRef>
+      <a:effectRef idx="1">
+        <a:scrgbClr r="0" g="0" b="0"/>
+      </a:effectRef>
+      <a:fontRef idx="minor">
+        <a:schemeClr val="dk1"/>
+      </a:fontRef>
+    </dgm:style>
+  </dgm:styleLbl>
+  <dgm:styleLbl name="node3">
+    <dgm:scene3d>
+      <a:camera prst="orthographicFront"/>
+      <a:lightRig rig="flat" dir="t"/>
+    </dgm:scene3d>
+    <dgm:sp3d prstMaterial="dkEdge">
+      <a:bevelT w="8200" h="38100"/>
+    </dgm:sp3d>
+    <dgm:txPr/>
+    <dgm:style>
+      <a:lnRef idx="0">
+        <a:scrgbClr r="0" g="0" b="0"/>
+      </a:lnRef>
+      <a:fillRef idx="2">
+        <a:scrgbClr r="0" g="0" b="0"/>
+      </a:fillRef>
+      <a:effectRef idx="1">
+        <a:scrgbClr r="0" g="0" b="0"/>
+      </a:effectRef>
+      <a:fontRef idx="minor">
+        <a:schemeClr val="dk1"/>
+      </a:fontRef>
+    </dgm:style>
+  </dgm:styleLbl>
+  <dgm:styleLbl name="node4">
+    <dgm:scene3d>
+      <a:camera prst="orthographicFront"/>
+      <a:lightRig rig="flat" dir="t"/>
+    </dgm:scene3d>
+    <dgm:sp3d prstMaterial="dkEdge">
+      <a:bevelT w="8200" h="38100"/>
+    </dgm:sp3d>
+    <dgm:txPr/>
+    <dgm:style>
+      <a:lnRef idx="0">
+        <a:scrgbClr r="0" g="0" b="0"/>
+      </a:lnRef>
+      <a:fillRef idx="2">
+        <a:scrgbClr r="0" g="0" b="0"/>
+      </a:fillRef>
+      <a:effectRef idx="1">
+        <a:scrgbClr r="0" g="0" b="0"/>
+      </a:effectRef>
+      <a:fontRef idx="minor">
+        <a:schemeClr val="dk1"/>
+      </a:fontRef>
+    </dgm:style>
+  </dgm:styleLbl>
+  <dgm:styleLbl name="fgImgPlace1">
+    <dgm:scene3d>
+      <a:camera prst="orthographicFront"/>
+      <a:lightRig rig="threePt" dir="t"/>
+    </dgm:scene3d>
+    <dgm:sp3d/>
+    <dgm:txPr/>
+    <dgm:style>
+      <a:lnRef idx="1">
+        <a:scrgbClr r="0" g="0" b="0"/>
+      </a:lnRef>
+      <a:fillRef idx="1">
+        <a:scrgbClr r="0" g="0" b="0"/>
+      </a:fillRef>
+      <a:effectRef idx="1">
+        <a:scrgbClr r="0" g="0" b="0"/>
+      </a:effectRef>
+      <a:fontRef idx="minor"/>
+    </dgm:style>
+  </dgm:styleLbl>
+  <dgm:styleLbl name="alignImgPlace1">
+    <dgm:scene3d>
+      <a:camera prst="orthographicFront"/>
+      <a:lightRig rig="threePt" dir="t"/>
+    </dgm:scene3d>
+    <dgm:sp3d/>
+    <dgm:txPr/>
+    <dgm:style>
+      <a:lnRef idx="1">
+        <a:scrgbClr r="0" g="0" b="0"/>
+      </a:lnRef>
+      <a:fillRef idx="1">
+        <a:scrgbClr r="0" g="0" b="0"/>
+      </a:fillRef>
+      <a:effectRef idx="1">
+        <a:scrgbClr r="0" g="0" b="0"/>
+      </a:effectRef>
+      <a:fontRef idx="minor"/>
+    </dgm:style>
+  </dgm:styleLbl>
+  <dgm:styleLbl name="bgImgPlace1">
+    <dgm:scene3d>
+      <a:camera prst="orthographicFront"/>
+      <a:lightRig rig="threePt" dir="t"/>
+    </dgm:scene3d>
+    <dgm:sp3d/>
+    <dgm:txPr/>
+    <dgm:style>
+      <a:lnRef idx="1">
+        <a:scrgbClr r="0" g="0" b="0"/>
+      </a:lnRef>
+      <a:fillRef idx="1">
+        <a:scrgbClr r="0" g="0" b="0"/>
+      </a:fillRef>
+      <a:effectRef idx="1">
+        <a:scrgbClr r="0" g="0" b="0"/>
+      </a:effectRef>
+      <a:fontRef idx="minor"/>
+    </dgm:style>
+  </dgm:styleLbl>
+  <dgm:styleLbl name="sibTrans2D1">
+    <dgm:scene3d>
+      <a:camera prst="orthographicFront"/>
+      <a:lightRig rig="threePt" dir="t"/>
+    </dgm:scene3d>
+    <dgm:sp3d/>
+    <dgm:txPr/>
+    <dgm:style>
+      <a:lnRef idx="0">
+        <a:scrgbClr r="0" g="0" b="0"/>
+      </a:lnRef>
+      <a:fillRef idx="2">
+        <a:scrgbClr r="0" g="0" b="0"/>
+      </a:fillRef>
+      <a:effectRef idx="1">
+        <a:scrgbClr r="0" g="0" b="0"/>
+      </a:effectRef>
+      <a:fontRef idx="minor">
+        <a:schemeClr val="dk1"/>
+      </a:fontRef>
+    </dgm:style>
+  </dgm:styleLbl>
+  <dgm:styleLbl name="fgSibTrans2D1">
+    <dgm:scene3d>
+      <a:camera prst="orthographicFront"/>
+      <a:lightRig rig="threePt" dir="t"/>
+    </dgm:scene3d>
+    <dgm:sp3d/>
+    <dgm:txPr/>
+    <dgm:style>
+      <a:lnRef idx="0">
+        <a:scrgbClr r="0" g="0" b="0"/>
+      </a:lnRef>
+      <a:fillRef idx="2">
+        <a:scrgbClr r="0" g="0" b="0"/>
+      </a:fillRef>
+      <a:effectRef idx="1">
+        <a:scrgbClr r="0" g="0" b="0"/>
+      </a:effectRef>
+      <a:fontRef idx="minor">
+        <a:schemeClr val="dk1"/>
+      </a:fontRef>
+    </dgm:style>
+  </dgm:styleLbl>
+  <dgm:styleLbl name="bgSibTrans2D1">
+    <dgm:scene3d>
+      <a:camera prst="orthographicFront"/>
+      <a:lightRig rig="threePt" dir="t"/>
+    </dgm:scene3d>
+    <dgm:sp3d/>
+    <dgm:txPr/>
+    <dgm:style>
+      <a:lnRef idx="0">
+        <a:scrgbClr r="0" g="0" b="0"/>
+      </a:lnRef>
+      <a:fillRef idx="2">
+        <a:scrgbClr r="0" g="0" b="0"/>
+      </a:fillRef>
+      <a:effectRef idx="1">
+        <a:scrgbClr r="0" g="0" b="0"/>
+      </a:effectRef>
+      <a:fontRef idx="minor">
+        <a:schemeClr val="dk1"/>
+      </a:fontRef>
+    </dgm:style>
+  </dgm:styleLbl>
+  <dgm:styleLbl name="sibTrans1D1">
+    <dgm:scene3d>
+      <a:camera prst="orthographicFront"/>
+      <a:lightRig rig="threePt" dir="t"/>
+    </dgm:scene3d>
+    <dgm:sp3d/>
+    <dgm:txPr/>
+    <dgm:style>
+      <a:lnRef idx="1">
+        <a:scrgbClr r="0" g="0" b="0"/>
+      </a:lnRef>
+      <a:fillRef idx="0">
+        <a:scrgbClr r="0" g="0" b="0"/>
+      </a:fillRef>
+      <a:effectRef idx="0">
+        <a:scrgbClr r="0" g="0" b="0"/>
+      </a:effectRef>
+      <a:fontRef idx="minor"/>
+    </dgm:style>
+  </dgm:styleLbl>
+  <dgm:styleLbl name="callout">
+    <dgm:scene3d>
+      <a:camera prst="orthographicFront"/>
+      <a:lightRig rig="threePt" dir="t"/>
+    </dgm:scene3d>
+    <dgm:sp3d/>
+    <dgm:txPr/>
+    <dgm:style>
+      <a:lnRef idx="1">
+        <a:scrgbClr r="0" g="0" b="0"/>
+      </a:lnRef>
+      <a:fillRef idx="2">
+        <a:scrgbClr r="0" g="0" b="0"/>
+      </a:fillRef>
+      <a:effectRef idx="1">
+        <a:scrgbClr r="0" g="0" b="0"/>
+      </a:effectRef>
+      <a:fontRef idx="minor"/>
+    </dgm:style>
+  </dgm:styleLbl>
+  <dgm:styleLbl name="asst0">
+    <dgm:scene3d>
+      <a:camera prst="orthographicFront"/>
+      <a:lightRig rig="flat" dir="t"/>
+    </dgm:scene3d>
+    <dgm:sp3d prstMaterial="dkEdge">
+      <a:bevelT w="8200" h="38100"/>
+    </dgm:sp3d>
+    <dgm:txPr/>
+    <dgm:style>
+      <a:lnRef idx="0">
+        <a:scrgbClr r="0" g="0" b="0"/>
+      </a:lnRef>
+      <a:fillRef idx="2">
+        <a:scrgbClr r="0" g="0" b="0"/>
+      </a:fillRef>
+      <a:effectRef idx="1">
+        <a:scrgbClr r="0" g="0" b="0"/>
+      </a:effectRef>
+      <a:fontRef idx="minor">
+        <a:schemeClr val="dk1"/>
+      </a:fontRef>
+    </dgm:style>
+  </dgm:styleLbl>
+  <dgm:styleLbl name="asst1">
+    <dgm:scene3d>
+      <a:camera prst="orthographicFront"/>
+      <a:lightRig rig="flat" dir="t"/>
+    </dgm:scene3d>
+    <dgm:sp3d prstMaterial="dkEdge">
+      <a:bevelT w="8200" h="38100"/>
+    </dgm:sp3d>
+    <dgm:txPr/>
+    <dgm:style>
+      <a:lnRef idx="0">
+        <a:scrgbClr r="0" g="0" b="0"/>
+      </a:lnRef>
+      <a:fillRef idx="2">
+        <a:scrgbClr r="0" g="0" b="0"/>
+      </a:fillRef>
+      <a:effectRef idx="1">
+        <a:scrgbClr r="0" g="0" b="0"/>
+      </a:effectRef>
+      <a:fontRef idx="minor">
+        <a:schemeClr val="dk1"/>
+      </a:fontRef>
+    </dgm:style>
+  </dgm:styleLbl>
+  <dgm:styleLbl name="asst2">
+    <dgm:scene3d>
+      <a:camera prst="orthographicFront"/>
+      <a:lightRig rig="flat" dir="t"/>
+    </dgm:scene3d>
+    <dgm:sp3d prstMaterial="dkEdge">
+      <a:bevelT w="8200" h="38100"/>
+    </dgm:sp3d>
+    <dgm:txPr/>
+    <dgm:style>
+      <a:lnRef idx="0">
+        <a:scrgbClr r="0" g="0" b="0"/>
+      </a:lnRef>
+      <a:fillRef idx="2">
+        <a:scrgbClr r="0" g="0" b="0"/>
+      </a:fillRef>
+      <a:effectRef idx="1">
+        <a:scrgbClr r="0" g="0" b="0"/>
+      </a:effectRef>
+      <a:fontRef idx="minor">
+        <a:schemeClr val="dk1"/>
+      </a:fontRef>
+    </dgm:style>
+  </dgm:styleLbl>
+  <dgm:styleLbl name="asst3">
+    <dgm:scene3d>
+      <a:camera prst="orthographicFront"/>
+      <a:lightRig rig="flat" dir="t"/>
+    </dgm:scene3d>
+    <dgm:sp3d prstMaterial="dkEdge">
+      <a:bevelT w="8200" h="38100"/>
+    </dgm:sp3d>
+    <dgm:txPr/>
+    <dgm:style>
+      <a:lnRef idx="0">
+        <a:scrgbClr r="0" g="0" b="0"/>
+      </a:lnRef>
+      <a:fillRef idx="2">
+        <a:scrgbClr r="0" g="0" b="0"/>
+      </a:fillRef>
+      <a:effectRef idx="1">
+        <a:scrgbClr r="0" g="0" b="0"/>
+      </a:effectRef>
+      <a:fontRef idx="minor">
+        <a:schemeClr val="dk1"/>
+      </a:fontRef>
+    </dgm:style>
+  </dgm:styleLbl>
+  <dgm:styleLbl name="asst4">
+    <dgm:scene3d>
+      <a:camera prst="orthographicFront"/>
+      <a:lightRig rig="flat" dir="t"/>
+    </dgm:scene3d>
+    <dgm:sp3d prstMaterial="dkEdge">
+      <a:bevelT w="8200" h="38100"/>
+    </dgm:sp3d>
+    <dgm:txPr/>
+    <dgm:style>
+      <a:lnRef idx="0">
+        <a:scrgbClr r="0" g="0" b="0"/>
+      </a:lnRef>
+      <a:fillRef idx="2">
+        <a:scrgbClr r="0" g="0" b="0"/>
+      </a:fillRef>
+      <a:effectRef idx="1">
+        <a:scrgbClr r="0" g="0" b="0"/>
+      </a:effectRef>
+      <a:fontRef idx="minor">
+        <a:schemeClr val="dk1"/>
+      </a:fontRef>
+    </dgm:style>
+  </dgm:styleLbl>
+  <dgm:styleLbl name="parChTrans2D1">
+    <dgm:scene3d>
+      <a:camera prst="orthographicFront"/>
+      <a:lightRig rig="threePt" dir="t"/>
+    </dgm:scene3d>
+    <dgm:sp3d/>
+    <dgm:txPr/>
+    <dgm:style>
+      <a:lnRef idx="1">
+        <a:scrgbClr r="0" g="0" b="0"/>
+      </a:lnRef>
+      <a:fillRef idx="2">
+        <a:scrgbClr r="0" g="0" b="0"/>
+      </a:fillRef>
+      <a:effectRef idx="1">
+        <a:scrgbClr r="0" g="0" b="0"/>
+      </a:effectRef>
+      <a:fontRef idx="minor">
+        <a:schemeClr val="dk1"/>
+      </a:fontRef>
+    </dgm:style>
+  </dgm:styleLbl>
+  <dgm:styleLbl name="parChTrans2D2">
+    <dgm:scene3d>
+      <a:camera prst="orthographicFront"/>
+      <a:lightRig rig="threePt" dir="t"/>
+    </dgm:scene3d>
+    <dgm:sp3d/>
+    <dgm:txPr/>
+    <dgm:style>
+      <a:lnRef idx="1">
+        <a:scrgbClr r="0" g="0" b="0"/>
+      </a:lnRef>
+      <a:fillRef idx="2">
+        <a:scrgbClr r="0" g="0" b="0"/>
+      </a:fillRef>
+      <a:effectRef idx="1">
+        <a:scrgbClr r="0" g="0" b="0"/>
+      </a:effectRef>
+      <a:fontRef idx="minor">
+        <a:schemeClr val="dk1"/>
+      </a:fontRef>
+    </dgm:style>
+  </dgm:styleLbl>
+  <dgm:styleLbl name="parChTrans2D3">
+    <dgm:scene3d>
+      <a:camera prst="orthographicFront"/>
+      <a:lightRig rig="threePt" dir="t"/>
+    </dgm:scene3d>
+    <dgm:sp3d/>
+    <dgm:txPr/>
+    <dgm:style>
+      <a:lnRef idx="1">
+        <a:scrgbClr r="0" g="0" b="0"/>
+      </a:lnRef>
+      <a:fillRef idx="2">
+        <a:scrgbClr r="0" g="0" b="0"/>
+      </a:fillRef>
+      <a:effectRef idx="1">
+        <a:scrgbClr r="0" g="0" b="0"/>
+      </a:effectRef>
+      <a:fontRef idx="minor">
+        <a:schemeClr val="dk1"/>
+      </a:fontRef>
+    </dgm:style>
+  </dgm:styleLbl>
+  <dgm:styleLbl name="parChTrans2D4">
+    <dgm:scene3d>
+      <a:camera prst="orthographicFront"/>
+      <a:lightRig rig="threePt" dir="t"/>
+    </dgm:scene3d>
+    <dgm:sp3d/>
+    <dgm:txPr/>
+    <dgm:style>
+      <a:lnRef idx="1">
+        <a:scrgbClr r="0" g="0" b="0"/>
+      </a:lnRef>
+      <a:fillRef idx="2">
+        <a:scrgbClr r="0" g="0" b="0"/>
+      </a:fillRef>
+      <a:effectRef idx="1">
+        <a:scrgbClr r="0" g="0" b="0"/>
+      </a:effectRef>
+      <a:fontRef idx="minor">
+        <a:schemeClr val="dk1"/>
+      </a:fontRef>
+    </dgm:style>
+  </dgm:styleLbl>
+  <dgm:styleLbl name="parChTrans1D1">
+    <dgm:scene3d>
+      <a:camera prst="orthographicFront"/>
+      <a:lightRig rig="threePt" dir="t"/>
+    </dgm:scene3d>
+    <dgm:sp3d/>
+    <dgm:txPr/>
+    <dgm:style>
+      <a:lnRef idx="2">
+        <a:scrgbClr r="0" g="0" b="0"/>
+      </a:lnRef>
+      <a:fillRef idx="0">
+        <a:scrgbClr r="0" g="0" b="0"/>
+      </a:fillRef>
+      <a:effectRef idx="0">
+        <a:scrgbClr r="0" g="0" b="0"/>
+      </a:effectRef>
+      <a:fontRef idx="minor"/>
+    </dgm:style>
+  </dgm:styleLbl>
+  <dgm:styleLbl name="parChTrans1D2">
+    <dgm:scene3d>
+      <a:camera prst="orthographicFront"/>
+      <a:lightRig rig="threePt" dir="t"/>
+    </dgm:scene3d>
+    <dgm:sp3d/>
+    <dgm:txPr/>
+    <dgm:style>
+      <a:lnRef idx="2">
+        <a:scrgbClr r="0" g="0" b="0"/>
+      </a:lnRef>
+      <a:fillRef idx="0">
+        <a:scrgbClr r="0" g="0" b="0"/>
+      </a:fillRef>
+      <a:effectRef idx="0">
+        <a:scrgbClr r="0" g="0" b="0"/>
+      </a:effectRef>
+      <a:fontRef idx="minor"/>
+    </dgm:style>
+  </dgm:styleLbl>
+  <dgm:styleLbl name="parChTrans1D3">
+    <dgm:scene3d>
+      <a:camera prst="orthographicFront"/>
+      <a:lightRig rig="threePt" dir="t"/>
+    </dgm:scene3d>
+    <dgm:sp3d/>
+    <dgm:txPr/>
+    <dgm:style>
+      <a:lnRef idx="2">
+        <a:scrgbClr r="0" g="0" b="0"/>
+      </a:lnRef>
+      <a:fillRef idx="0">
+        <a:scrgbClr r="0" g="0" b="0"/>
+      </a:fillRef>
+      <a:effectRef idx="0">
+        <a:scrgbClr r="0" g="0" b="0"/>
+      </a:effectRef>
+      <a:fontRef idx="minor"/>
+    </dgm:style>
+  </dgm:styleLbl>
+  <dgm:styleLbl name="parChTrans1D4">
+    <dgm:scene3d>
+      <a:camera prst="orthographicFront"/>
+      <a:lightRig rig="threePt" dir="t"/>
+    </dgm:scene3d>
+    <dgm:sp3d/>
+    <dgm:txPr/>
+    <dgm:style>
+      <a:lnRef idx="2">
+        <a:scrgbClr r="0" g="0" b="0"/>
+      </a:lnRef>
+      <a:fillRef idx="0">
+        <a:scrgbClr r="0" g="0" b="0"/>
+      </a:fillRef>
+      <a:effectRef idx="0">
+        <a:scrgbClr r="0" g="0" b="0"/>
+      </a:effectRef>
+      <a:fontRef idx="minor"/>
+    </dgm:style>
+  </dgm:styleLbl>
+  <dgm:styleLbl name="fgAcc1">
+    <dgm:scene3d>
+      <a:camera prst="orthographicFront"/>
+      <a:lightRig rig="threePt" dir="t"/>
+    </dgm:scene3d>
+    <dgm:sp3d/>
+    <dgm:txPr/>
+    <dgm:style>
+      <a:lnRef idx="1">
+        <a:scrgbClr r="0" g="0" b="0"/>
+      </a:lnRef>
+      <a:fillRef idx="1">
+        <a:scrgbClr r="0" g="0" b="0"/>
+      </a:fillRef>
+      <a:effectRef idx="0">
+        <a:scrgbClr r="0" g="0" b="0"/>
+      </a:effectRef>
+      <a:fontRef idx="minor"/>
+    </dgm:style>
+  </dgm:styleLbl>
+  <dgm:styleLbl name="conFgAcc1">
+    <dgm:scene3d>
+      <a:camera prst="orthographicFront"/>
+      <a:lightRig rig="threePt" dir="t"/>
+    </dgm:scene3d>
+    <dgm:sp3d/>
+    <dgm:txPr/>
+    <dgm:style>
+      <a:lnRef idx="1">
+        <a:scrgbClr r="0" g="0" b="0"/>
+      </a:lnRef>
+      <a:fillRef idx="1">
+        <a:scrgbClr r="0" g="0" b="0"/>
+      </a:fillRef>
+      <a:effectRef idx="0">
+        <a:scrgbClr r="0" g="0" b="0"/>
+      </a:effectRef>
+      <a:fontRef idx="minor"/>
+    </dgm:style>
+  </dgm:styleLbl>
+  <dgm:styleLbl name="alignAcc1">
+    <dgm:scene3d>
+      <a:camera prst="orthographicFront"/>
+      <a:lightRig rig="threePt" dir="t"/>
+    </dgm:scene3d>
+    <dgm:sp3d/>
+    <dgm:txPr/>
+    <dgm:style>
+      <a:lnRef idx="1">
+        <a:scrgbClr r="0" g="0" b="0"/>
+      </a:lnRef>
+      <a:fillRef idx="1">
+        <a:scrgbClr r="0" g="0" b="0"/>
+      </a:fillRef>
+      <a:effectRef idx="0">
+        <a:scrgbClr r="0" g="0" b="0"/>
+      </a:effectRef>
+      <a:fontRef idx="minor"/>
+    </dgm:style>
+  </dgm:styleLbl>
+  <dgm:styleLbl name="trAlignAcc1">
+    <dgm:scene3d>
+      <a:camera prst="orthographicFront"/>
+      <a:lightRig rig="threePt" dir="t"/>
+    </dgm:scene3d>
+    <dgm:sp3d/>
+    <dgm:txPr/>
+    <dgm:style>
+      <a:lnRef idx="1">
+        <a:scrgbClr r="0" g="0" b="0"/>
+      </a:lnRef>
+      <a:fillRef idx="1">
+        <a:scrgbClr r="0" g="0" b="0"/>
+      </a:fillRef>
+      <a:effectRef idx="0">
+        <a:scrgbClr r="0" g="0" b="0"/>
+      </a:effectRef>
+      <a:fontRef idx="minor"/>
+    </dgm:style>
+  </dgm:styleLbl>
+  <dgm:styleLbl name="bgAcc1">
+    <dgm:scene3d>
+      <a:camera prst="orthographicFront"/>
+      <a:lightRig rig="threePt" dir="t"/>
+    </dgm:scene3d>
+    <dgm:sp3d/>
+    <dgm:txPr/>
+    <dgm:style>
+      <a:lnRef idx="1">
+        <a:scrgbClr r="0" g="0" b="0"/>
+      </a:lnRef>
+      <a:fillRef idx="1">
+        <a:scrgbClr r="0" g="0" b="0"/>
+      </a:fillRef>
+      <a:effectRef idx="0">
+        <a:scrgbClr r="0" g="0" b="0"/>
+      </a:effectRef>
+      <a:fontRef idx="minor"/>
+    </dgm:style>
+  </dgm:styleLbl>
+  <dgm:styleLbl name="solidFgAcc1">
+    <dgm:scene3d>
+      <a:camera prst="orthographicFront"/>
+      <a:lightRig rig="threePt" dir="t"/>
+    </dgm:scene3d>
+    <dgm:sp3d/>
+    <dgm:txPr/>
+    <dgm:style>
+      <a:lnRef idx="1">
+        <a:scrgbClr r="0" g="0" b="0"/>
+      </a:lnRef>
+      <a:fillRef idx="2">
+        <a:scrgbClr r="0" g="0" b="0"/>
+      </a:fillRef>
+      <a:effectRef idx="0">
+        <a:scrgbClr r="0" g="0" b="0"/>
+      </a:effectRef>
+      <a:fontRef idx="minor"/>
+    </dgm:style>
+  </dgm:styleLbl>
+  <dgm:styleLbl name="solidAlignAcc1">
+    <dgm:scene3d>
+      <a:camera prst="orthographicFront"/>
+      <a:lightRig rig="threePt" dir="t"/>
+    </dgm:scene3d>
+    <dgm:sp3d/>
+    <dgm:txPr/>
+    <dgm:style>
+      <a:lnRef idx="1">
+        <a:scrgbClr r="0" g="0" b="0"/>
+      </a:lnRef>
+      <a:fillRef idx="1">
+        <a:scrgbClr r="0" g="0" b="0"/>
+      </a:fillRef>
+      <a:effectRef idx="0">
+        <a:scrgbClr r="0" g="0" b="0"/>
+      </a:effectRef>
+      <a:fontRef idx="minor"/>
+    </dgm:style>
+  </dgm:styleLbl>
+  <dgm:styleLbl name="solidBgAcc1">
+    <dgm:scene3d>
+      <a:camera prst="orthographicFront"/>
+      <a:lightRig rig="threePt" dir="t"/>
+    </dgm:scene3d>
+    <dgm:sp3d/>
+    <dgm:txPr/>
+    <dgm:style>
+      <a:lnRef idx="1">
+        <a:scrgbClr r="0" g="0" b="0"/>
+      </a:lnRef>
+      <a:fillRef idx="1">
+        <a:scrgbClr r="0" g="0" b="0"/>
+      </a:fillRef>
+      <a:effectRef idx="0">
+        <a:scrgbClr r="0" g="0" b="0"/>
+      </a:effectRef>
+      <a:fontRef idx="minor"/>
+    </dgm:style>
+  </dgm:styleLbl>
+  <dgm:styleLbl name="fgAccFollowNode1">
+    <dgm:scene3d>
+      <a:camera prst="orthographicFront"/>
+      <a:lightRig rig="threePt" dir="t"/>
+    </dgm:scene3d>
+    <dgm:sp3d/>
+    <dgm:txPr/>
+    <dgm:style>
+      <a:lnRef idx="1">
+        <a:scrgbClr r="0" g="0" b="0"/>
+      </a:lnRef>
+      <a:fillRef idx="1">
+        <a:scrgbClr r="0" g="0" b="0"/>
+      </a:fillRef>
+      <a:effectRef idx="0">
+        <a:scrgbClr r="0" g="0" b="0"/>
+      </a:effectRef>
+      <a:fontRef idx="minor"/>
+    </dgm:style>
+  </dgm:styleLbl>
+  <dgm:styleLbl name="alignAccFollowNode1">
+    <dgm:scene3d>
+      <a:camera prst="orthographicFront"/>
+      <a:lightRig rig="threePt" dir="t"/>
+    </dgm:scene3d>
+    <dgm:sp3d/>
+    <dgm:txPr/>
+    <dgm:style>
+      <a:lnRef idx="1">
+        <a:scrgbClr r="0" g="0" b="0"/>
+      </a:lnRef>
+      <a:fillRef idx="1">
+        <a:scrgbClr r="0" g="0" b="0"/>
+      </a:fillRef>
+      <a:effectRef idx="0">
+        <a:scrgbClr r="0" g="0" b="0"/>
+      </a:effectRef>
+      <a:fontRef idx="minor"/>
+    </dgm:style>
+  </dgm:styleLbl>
+  <dgm:styleLbl name="bgAccFollowNode1">
+    <dgm:scene3d>
+      <a:camera prst="orthographicFront"/>
+      <a:lightRig rig="threePt" dir="t"/>
+    </dgm:scene3d>
+    <dgm:sp3d/>
+    <dgm:txPr/>
+    <dgm:style>
+      <a:lnRef idx="1">
+        <a:scrgbClr r="0" g="0" b="0"/>
+      </a:lnRef>
+      <a:fillRef idx="1">
+        <a:scrgbClr r="0" g="0" b="0"/>
+      </a:fillRef>
+      <a:effectRef idx="0">
+        <a:scrgbClr r="0" g="0" b="0"/>
+      </a:effectRef>
+      <a:fontRef idx="minor"/>
+    </dgm:style>
+  </dgm:styleLbl>
+  <dgm:styleLbl name="fgAcc0">
+    <dgm:scene3d>
+      <a:camera prst="orthographicFront"/>
+      <a:lightRig rig="threePt" dir="t"/>
+    </dgm:scene3d>
+    <dgm:sp3d/>
+    <dgm:txPr/>
+    <dgm:style>
+      <a:lnRef idx="1">
+        <a:scrgbClr r="0" g="0" b="0"/>
+      </a:lnRef>
+      <a:fillRef idx="1">
+        <a:scrgbClr r="0" g="0" b="0"/>
+      </a:fillRef>
+      <a:effectRef idx="0">
+        <a:scrgbClr r="0" g="0" b="0"/>
+      </a:effectRef>
+      <a:fontRef idx="minor"/>
+    </dgm:style>
+  </dgm:styleLbl>
+  <dgm:styleLbl name="fgAcc2">
+    <dgm:scene3d>
+      <a:camera prst="orthographicFront"/>
+      <a:lightRig rig="threePt" dir="t"/>
+    </dgm:scene3d>
+    <dgm:sp3d/>
+    <dgm:txPr/>
+    <dgm:style>
+      <a:lnRef idx="1">
+        <a:scrgbClr r="0" g="0" b="0"/>
+      </a:lnRef>
+      <a:fillRef idx="1">
+        <a:scrgbClr r="0" g="0" b="0"/>
+      </a:fillRef>
+      <a:effectRef idx="0">
+        <a:scrgbClr r="0" g="0" b="0"/>
+      </a:effectRef>
+      <a:fontRef idx="minor"/>
+    </dgm:style>
+  </dgm:styleLbl>
+  <dgm:styleLbl name="fgAcc3">
+    <dgm:scene3d>
+      <a:camera prst="orthographicFront"/>
+      <a:lightRig rig="threePt" dir="t"/>
+    </dgm:scene3d>
+    <dgm:sp3d/>
+    <dgm:txPr/>
+    <dgm:style>
+      <a:lnRef idx="1">
+        <a:scrgbClr r="0" g="0" b="0"/>
+      </a:lnRef>
+      <a:fillRef idx="1">
+        <a:scrgbClr r="0" g="0" b="0"/>
+      </a:fillRef>
+      <a:effectRef idx="0">
+        <a:scrgbClr r="0" g="0" b="0"/>
+      </a:effectRef>
+      <a:fontRef idx="minor"/>
+    </dgm:style>
+  </dgm:styleLbl>
+  <dgm:styleLbl name="fgAcc4">
+    <dgm:scene3d>
+      <a:camera prst="orthographicFront"/>
+      <a:lightRig rig="threePt" dir="t"/>
+    </dgm:scene3d>
+    <dgm:sp3d/>
+    <dgm:txPr/>
+    <dgm:style>
+      <a:lnRef idx="1">
+        <a:scrgbClr r="0" g="0" b="0"/>
+      </a:lnRef>
+      <a:fillRef idx="1">
+        <a:scrgbClr r="0" g="0" b="0"/>
+      </a:fillRef>
+      <a:effectRef idx="0">
+        <a:scrgbClr r="0" g="0" b="0"/>
+      </a:effectRef>
+      <a:fontRef idx="minor"/>
+    </dgm:style>
+  </dgm:styleLbl>
+  <dgm:styleLbl name="bgShp">
+    <dgm:scene3d>
+      <a:camera prst="orthographicFront"/>
+      <a:lightRig rig="threePt" dir="t"/>
+    </dgm:scene3d>
+    <dgm:sp3d/>
+    <dgm:txPr/>
+    <dgm:style>
+      <a:lnRef idx="0">
+        <a:scrgbClr r="0" g="0" b="0"/>
+      </a:lnRef>
+      <a:fillRef idx="1">
+        <a:scrgbClr r="0" g="0" b="0"/>
+      </a:fillRef>
+      <a:effectRef idx="1">
+        <a:scrgbClr r="0" g="0" b="0"/>
+      </a:effectRef>
+      <a:fontRef idx="minor"/>
+    </dgm:style>
+  </dgm:styleLbl>
+  <dgm:styleLbl name="dkBgShp">
+    <dgm:scene3d>
+      <a:camera prst="orthographicFront"/>
+      <a:lightRig rig="threePt" dir="t"/>
+    </dgm:scene3d>
+    <dgm:sp3d/>
+    <dgm:txPr/>
+    <dgm:style>
+      <a:lnRef idx="0">
+        <a:scrgbClr r="0" g="0" b="0"/>
+      </a:lnRef>
+      <a:fillRef idx="1">
+        <a:scrgbClr r="0" g="0" b="0"/>
+      </a:fillRef>
+      <a:effectRef idx="1">
+        <a:scrgbClr r="0" g="0" b="0"/>
+      </a:effectRef>
+      <a:fontRef idx="minor"/>
+    </dgm:style>
+  </dgm:styleLbl>
+  <dgm:styleLbl name="trBgShp">
+    <dgm:scene3d>
+      <a:camera prst="orthographicFront"/>
+      <a:lightRig rig="threePt" dir="t"/>
+    </dgm:scene3d>
+    <dgm:sp3d/>
+    <dgm:txPr/>
+    <dgm:style>
+      <a:lnRef idx="0">
+        <a:scrgbClr r="0" g="0" b="0"/>
+      </a:lnRef>
+      <a:fillRef idx="1">
+        <a:scrgbClr r="0" g="0" b="0"/>
+      </a:fillRef>
+      <a:effectRef idx="0">
+        <a:scrgbClr r="0" g="0" b="0"/>
+      </a:effectRef>
+      <a:fontRef idx="minor"/>
+    </dgm:style>
+  </dgm:styleLbl>
+  <dgm:styleLbl name="fgShp">
+    <dgm:scene3d>
+      <a:camera prst="orthographicFront"/>
+      <a:lightRig rig="flat" dir="t"/>
+    </dgm:scene3d>
+    <dgm:sp3d prstMaterial="dkEdge">
+      <a:bevelT w="8200" h="38100"/>
+    </dgm:sp3d>
+    <dgm:txPr/>
+    <dgm:style>
+      <a:lnRef idx="1">
+        <a:scrgbClr r="0" g="0" b="0"/>
+      </a:lnRef>
+      <a:fillRef idx="2">
+        <a:scrgbClr r="0" g="0" b="0"/>
+      </a:fillRef>
+      <a:effectRef idx="1">
+        <a:scrgbClr r="0" g="0" b="0"/>
+      </a:effectRef>
+      <a:fontRef idx="minor"/>
+    </dgm:style>
+  </dgm:styleLbl>
+  <dgm:styleLbl name="revTx">
+    <dgm:scene3d>
+      <a:camera prst="orthographicFront"/>
+      <a:lightRig rig="threePt" dir="t"/>
+    </dgm:scene3d>
+    <dgm:sp3d/>
+    <dgm:txPr/>
+    <dgm:style>
+      <a:lnRef idx="0">
+        <a:scrgbClr r="0" g="0" b="0"/>
+      </a:lnRef>
+      <a:fillRef idx="0">
+        <a:scrgbClr r="0" g="0" b="0"/>
+      </a:fillRef>
+      <a:effectRef idx="0">
+        <a:scrgbClr r="0" g="0" b="0"/>
+      </a:effectRef>
+      <a:fontRef idx="minor"/>
+    </dgm:style>
+  </dgm:styleLbl>
+</dgm:styleDef>
+</file>
+
+<file path=ppt/diagrams/quickStyle2.xml><?xml version="1.0" encoding="utf-8"?>
 <dgm:styleDef xmlns:dgm="http://schemas.openxmlformats.org/drawingml/2006/diagram" xmlns:a="http://schemas.openxmlformats.org/drawingml/2006/main" uniqueId="urn:microsoft.com/office/officeart/2005/8/quickstyle/simple1">
   <dgm:title val=""/>
   <dgm:desc val=""/>
@@ -2376,7 +5009,7 @@
               <a:pPr>
                 <a:defRPr/>
               </a:pPr>
-              <a:t>2011/11/30</a:t>
+              <a:t>2011/12/3</a:t>
             </a:fld>
             <a:endParaRPr lang="zh-CN" altLang="en-US"/>
           </a:p>
@@ -2793,6 +5426,118 @@
 </p:notes>
 </file>
 
+<file path=ppt/notesSlides/notesSlide10.xml><?xml version="1.0" encoding="utf-8"?>
+<p:notes xmlns:a="http://schemas.openxmlformats.org/drawingml/2006/main" xmlns:r="http://schemas.openxmlformats.org/officeDocument/2006/relationships" xmlns:p="http://schemas.openxmlformats.org/presentationml/2006/main">
+  <p:cSld>
+    <p:spTree>
+      <p:nvGrpSpPr>
+        <p:cNvPr id="1" name=""/>
+        <p:cNvGrpSpPr/>
+        <p:nvPr/>
+      </p:nvGrpSpPr>
+      <p:grpSpPr>
+        <a:xfrm>
+          <a:off x="0" y="0"/>
+          <a:ext cx="0" cy="0"/>
+          <a:chOff x="0" y="0"/>
+          <a:chExt cx="0" cy="0"/>
+        </a:xfrm>
+      </p:grpSpPr>
+      <p:sp>
+        <p:nvSpPr>
+          <p:cNvPr id="38914" name="Slide Image Placeholder 1"/>
+          <p:cNvSpPr>
+            <a:spLocks noGrp="1" noRot="1" noChangeAspect="1" noTextEdit="1"/>
+          </p:cNvSpPr>
+          <p:nvPr>
+            <p:ph type="sldImg"/>
+          </p:nvPr>
+        </p:nvSpPr>
+        <p:spPr bwMode="auto">
+          <a:noFill/>
+          <a:ln>
+            <a:solidFill>
+              <a:srgbClr val="000000"/>
+            </a:solidFill>
+            <a:miter lim="800000"/>
+            <a:headEnd/>
+            <a:tailEnd/>
+          </a:ln>
+        </p:spPr>
+      </p:sp>
+      <p:sp>
+        <p:nvSpPr>
+          <p:cNvPr id="38915" name="Notes Placeholder 2"/>
+          <p:cNvSpPr>
+            <a:spLocks noGrp="1"/>
+          </p:cNvSpPr>
+          <p:nvPr>
+            <p:ph type="body" idx="1"/>
+          </p:nvPr>
+        </p:nvSpPr>
+        <p:spPr bwMode="auto">
+          <a:noFill/>
+        </p:spPr>
+        <p:txBody>
+          <a:bodyPr wrap="square" numCol="1" anchor="t" anchorCtr="0" compatLnSpc="1">
+            <a:prstTxWarp prst="textNoShape">
+              <a:avLst/>
+            </a:prstTxWarp>
+          </a:bodyPr>
+          <a:lstStyle/>
+          <a:p>
+            <a:pPr eaLnBrk="1" hangingPunct="1">
+              <a:spcBef>
+                <a:spcPct val="0"/>
+              </a:spcBef>
+            </a:pPr>
+            <a:endParaRPr lang="zh-CN" altLang="en-US" smtClean="0"/>
+          </a:p>
+        </p:txBody>
+      </p:sp>
+      <p:sp>
+        <p:nvSpPr>
+          <p:cNvPr id="38916" name="Slide Number Placeholder 3"/>
+          <p:cNvSpPr>
+            <a:spLocks noGrp="1"/>
+          </p:cNvSpPr>
+          <p:nvPr>
+            <p:ph type="sldNum" sz="quarter" idx="5"/>
+          </p:nvPr>
+        </p:nvSpPr>
+        <p:spPr bwMode="auto">
+          <a:noFill/>
+          <a:ln>
+            <a:miter lim="800000"/>
+            <a:headEnd/>
+            <a:tailEnd/>
+          </a:ln>
+        </p:spPr>
+        <p:txBody>
+          <a:bodyPr wrap="square" numCol="1" anchorCtr="0" compatLnSpc="1">
+            <a:prstTxWarp prst="textNoShape">
+              <a:avLst/>
+            </a:prstTxWarp>
+          </a:bodyPr>
+          <a:lstStyle/>
+          <a:p>
+            <a:fld id="{884964A4-8746-46D0-B4FE-65104B927633}" type="slidenum">
+              <a:rPr lang="zh-CN" altLang="en-US" smtClean="0"/>
+              <a:pPr/>
+              <a:t>10</a:t>
+            </a:fld>
+            <a:endParaRPr lang="zh-CN" altLang="en-US" smtClean="0"/>
+          </a:p>
+        </p:txBody>
+      </p:sp>
+    </p:spTree>
+  </p:cSld>
+  <p:clrMapOvr>
+    <a:masterClrMapping/>
+  </p:clrMapOvr>
+</p:notes>
+</file>
+
 <file path=ppt/notesSlides/notesSlide2.xml><?xml version="1.0" encoding="utf-8"?>
 <p:notes xmlns:a="http://schemas.openxmlformats.org/drawingml/2006/main" xmlns:r="http://schemas.openxmlformats.org/officeDocument/2006/relationships" xmlns:p="http://schemas.openxmlformats.org/presentationml/2006/main">
   <p:cSld>
@@ -2930,6 +5675,124 @@
       </p:grpSpPr>
       <p:sp>
         <p:nvSpPr>
+          <p:cNvPr id="23554" name="Slide Image Placeholder 1"/>
+          <p:cNvSpPr>
+            <a:spLocks noGrp="1" noRot="1" noChangeAspect="1" noTextEdit="1"/>
+          </p:cNvSpPr>
+          <p:nvPr>
+            <p:ph type="sldImg"/>
+          </p:nvPr>
+        </p:nvSpPr>
+        <p:spPr bwMode="auto">
+          <a:noFill/>
+          <a:ln>
+            <a:solidFill>
+              <a:srgbClr val="000000"/>
+            </a:solidFill>
+            <a:miter lim="800000"/>
+            <a:headEnd/>
+            <a:tailEnd/>
+          </a:ln>
+        </p:spPr>
+      </p:sp>
+      <p:sp>
+        <p:nvSpPr>
+          <p:cNvPr id="23555" name="Notes Placeholder 2"/>
+          <p:cNvSpPr>
+            <a:spLocks noGrp="1"/>
+          </p:cNvSpPr>
+          <p:nvPr>
+            <p:ph type="body" idx="1"/>
+          </p:nvPr>
+        </p:nvSpPr>
+        <p:spPr bwMode="auto">
+          <a:noFill/>
+        </p:spPr>
+        <p:txBody>
+          <a:bodyPr wrap="square" numCol="1" anchor="t" anchorCtr="0" compatLnSpc="1">
+            <a:prstTxWarp prst="textNoShape">
+              <a:avLst/>
+            </a:prstTxWarp>
+          </a:bodyPr>
+          <a:lstStyle/>
+          <a:p>
+            <a:pPr eaLnBrk="1" hangingPunct="1">
+              <a:spcBef>
+                <a:spcPct val="0"/>
+              </a:spcBef>
+            </a:pPr>
+            <a:r>
+              <a:rPr lang="en-US" smtClean="0"/>
+              <a:t>Please email us if you have any questions.</a:t>
+            </a:r>
+            <a:endParaRPr lang="vi-VN" smtClean="0">
+              <a:latin typeface="Calibri" pitchFamily="34" charset="0"/>
+            </a:endParaRPr>
+          </a:p>
+        </p:txBody>
+      </p:sp>
+      <p:sp>
+        <p:nvSpPr>
+          <p:cNvPr id="23556" name="Slide Number Placeholder 3"/>
+          <p:cNvSpPr>
+            <a:spLocks noGrp="1"/>
+          </p:cNvSpPr>
+          <p:nvPr>
+            <p:ph type="sldNum" sz="quarter" idx="5"/>
+          </p:nvPr>
+        </p:nvSpPr>
+        <p:spPr bwMode="auto">
+          <a:noFill/>
+          <a:ln>
+            <a:miter lim="800000"/>
+            <a:headEnd/>
+            <a:tailEnd/>
+          </a:ln>
+        </p:spPr>
+        <p:txBody>
+          <a:bodyPr wrap="square" numCol="1" anchorCtr="0" compatLnSpc="1">
+            <a:prstTxWarp prst="textNoShape">
+              <a:avLst/>
+            </a:prstTxWarp>
+          </a:bodyPr>
+          <a:lstStyle/>
+          <a:p>
+            <a:fld id="{54B4CBB0-F51F-41D1-ADFC-928E58146567}" type="slidenum">
+              <a:rPr lang="zh-CN" altLang="en-US" smtClean="0"/>
+              <a:pPr/>
+              <a:t>3</a:t>
+            </a:fld>
+            <a:endParaRPr lang="zh-CN" altLang="en-US" smtClean="0"/>
+          </a:p>
+        </p:txBody>
+      </p:sp>
+    </p:spTree>
+  </p:cSld>
+  <p:clrMapOvr>
+    <a:masterClrMapping/>
+  </p:clrMapOvr>
+</p:notes>
+</file>
+
+<file path=ppt/notesSlides/notesSlide4.xml><?xml version="1.0" encoding="utf-8"?>
+<p:notes xmlns:a="http://schemas.openxmlformats.org/drawingml/2006/main" xmlns:r="http://schemas.openxmlformats.org/officeDocument/2006/relationships" xmlns:p="http://schemas.openxmlformats.org/presentationml/2006/main">
+  <p:cSld>
+    <p:spTree>
+      <p:nvGrpSpPr>
+        <p:cNvPr id="1" name=""/>
+        <p:cNvGrpSpPr/>
+        <p:nvPr/>
+      </p:nvGrpSpPr>
+      <p:grpSpPr>
+        <a:xfrm>
+          <a:off x="0" y="0"/>
+          <a:ext cx="0" cy="0"/>
+          <a:chOff x="0" y="0"/>
+          <a:chExt cx="0" cy="0"/>
+        </a:xfrm>
+      </p:grpSpPr>
+      <p:sp>
+        <p:nvSpPr>
           <p:cNvPr id="26626" name="Slide Image Placeholder 1"/>
           <p:cNvSpPr>
             <a:spLocks noGrp="1" noRot="1" noChangeAspect="1" noTextEdit="1"/>
@@ -2971,10 +5834,6 @@
           </a:bodyPr>
           <a:lstStyle/>
           <a:p>
-            <a:r>
-              <a:rPr lang="en-US" smtClean="0"/>
-              <a:t>Gia công phần mềm hiện nay gặp nhiều thách thức và cơ hội như: cloud computing, software-as-a-service, mobile device web access, data center virtualization and consolidation. Chính những công nghệ này đang ảnh hưởng đến khả năng và sự phức tạp của gia công phần mềm.</a:t>
-            </a:r>
             <a:endParaRPr lang="vi-VN" smtClean="0"/>
           </a:p>
         </p:txBody>
@@ -3008,7 +5867,7 @@
             <a:fld id="{3A8F3EA6-691A-44C4-9681-184349940B09}" type="slidenum">
               <a:rPr lang="zh-CN" altLang="en-US" smtClean="0"/>
               <a:pPr/>
-              <a:t>3</a:t>
+              <a:t>4</a:t>
             </a:fld>
             <a:endParaRPr lang="zh-CN" altLang="en-US" smtClean="0"/>
           </a:p>
@@ -3022,7 +5881,435 @@
 </p:notes>
 </file>
 
-<file path=ppt/notesSlides/notesSlide4.xml><?xml version="1.0" encoding="utf-8"?>
+<file path=ppt/notesSlides/notesSlide5.xml><?xml version="1.0" encoding="utf-8"?>
+<p:notes xmlns:a="http://schemas.openxmlformats.org/drawingml/2006/main" xmlns:r="http://schemas.openxmlformats.org/officeDocument/2006/relationships" xmlns:p="http://schemas.openxmlformats.org/presentationml/2006/main">
+  <p:cSld>
+    <p:spTree>
+      <p:nvGrpSpPr>
+        <p:cNvPr id="1" name=""/>
+        <p:cNvGrpSpPr/>
+        <p:nvPr/>
+      </p:nvGrpSpPr>
+      <p:grpSpPr>
+        <a:xfrm>
+          <a:off x="0" y="0"/>
+          <a:ext cx="0" cy="0"/>
+          <a:chOff x="0" y="0"/>
+          <a:chExt cx="0" cy="0"/>
+        </a:xfrm>
+      </p:grpSpPr>
+      <p:sp>
+        <p:nvSpPr>
+          <p:cNvPr id="26626" name="Slide Image Placeholder 1"/>
+          <p:cNvSpPr>
+            <a:spLocks noGrp="1" noRot="1" noChangeAspect="1" noTextEdit="1"/>
+          </p:cNvSpPr>
+          <p:nvPr>
+            <p:ph type="sldImg"/>
+          </p:nvPr>
+        </p:nvSpPr>
+        <p:spPr bwMode="auto">
+          <a:noFill/>
+          <a:ln>
+            <a:solidFill>
+              <a:srgbClr val="000000"/>
+            </a:solidFill>
+            <a:miter lim="800000"/>
+            <a:headEnd/>
+            <a:tailEnd/>
+          </a:ln>
+        </p:spPr>
+      </p:sp>
+      <p:sp>
+        <p:nvSpPr>
+          <p:cNvPr id="26627" name="Notes Placeholder 2"/>
+          <p:cNvSpPr>
+            <a:spLocks noGrp="1"/>
+          </p:cNvSpPr>
+          <p:nvPr>
+            <p:ph type="body" idx="1"/>
+          </p:nvPr>
+        </p:nvSpPr>
+        <p:spPr bwMode="auto">
+          <a:noFill/>
+        </p:spPr>
+        <p:txBody>
+          <a:bodyPr wrap="square" numCol="1" anchor="t" anchorCtr="0" compatLnSpc="1">
+            <a:prstTxWarp prst="textNoShape">
+              <a:avLst/>
+            </a:prstTxWarp>
+          </a:bodyPr>
+          <a:lstStyle/>
+          <a:p>
+            <a:endParaRPr lang="vi-VN" smtClean="0"/>
+          </a:p>
+        </p:txBody>
+      </p:sp>
+      <p:sp>
+        <p:nvSpPr>
+          <p:cNvPr id="26628" name="Slide Number Placeholder 3"/>
+          <p:cNvSpPr>
+            <a:spLocks noGrp="1"/>
+          </p:cNvSpPr>
+          <p:nvPr>
+            <p:ph type="sldNum" sz="quarter" idx="5"/>
+          </p:nvPr>
+        </p:nvSpPr>
+        <p:spPr bwMode="auto">
+          <a:noFill/>
+          <a:ln>
+            <a:miter lim="800000"/>
+            <a:headEnd/>
+            <a:tailEnd/>
+          </a:ln>
+        </p:spPr>
+        <p:txBody>
+          <a:bodyPr wrap="square" numCol="1" anchorCtr="0" compatLnSpc="1">
+            <a:prstTxWarp prst="textNoShape">
+              <a:avLst/>
+            </a:prstTxWarp>
+          </a:bodyPr>
+          <a:lstStyle/>
+          <a:p>
+            <a:fld id="{3A8F3EA6-691A-44C4-9681-184349940B09}" type="slidenum">
+              <a:rPr lang="zh-CN" altLang="en-US" smtClean="0"/>
+              <a:pPr/>
+              <a:t>5</a:t>
+            </a:fld>
+            <a:endParaRPr lang="zh-CN" altLang="en-US" smtClean="0"/>
+          </a:p>
+        </p:txBody>
+      </p:sp>
+    </p:spTree>
+  </p:cSld>
+  <p:clrMapOvr>
+    <a:masterClrMapping/>
+  </p:clrMapOvr>
+</p:notes>
+</file>
+
+<file path=ppt/notesSlides/notesSlide6.xml><?xml version="1.0" encoding="utf-8"?>
+<p:notes xmlns:a="http://schemas.openxmlformats.org/drawingml/2006/main" xmlns:r="http://schemas.openxmlformats.org/officeDocument/2006/relationships" xmlns:p="http://schemas.openxmlformats.org/presentationml/2006/main">
+  <p:cSld>
+    <p:spTree>
+      <p:nvGrpSpPr>
+        <p:cNvPr id="1" name=""/>
+        <p:cNvGrpSpPr/>
+        <p:nvPr/>
+      </p:nvGrpSpPr>
+      <p:grpSpPr>
+        <a:xfrm>
+          <a:off x="0" y="0"/>
+          <a:ext cx="0" cy="0"/>
+          <a:chOff x="0" y="0"/>
+          <a:chExt cx="0" cy="0"/>
+        </a:xfrm>
+      </p:grpSpPr>
+      <p:sp>
+        <p:nvSpPr>
+          <p:cNvPr id="26626" name="Slide Image Placeholder 1"/>
+          <p:cNvSpPr>
+            <a:spLocks noGrp="1" noRot="1" noChangeAspect="1" noTextEdit="1"/>
+          </p:cNvSpPr>
+          <p:nvPr>
+            <p:ph type="sldImg"/>
+          </p:nvPr>
+        </p:nvSpPr>
+        <p:spPr bwMode="auto">
+          <a:noFill/>
+          <a:ln>
+            <a:solidFill>
+              <a:srgbClr val="000000"/>
+            </a:solidFill>
+            <a:miter lim="800000"/>
+            <a:headEnd/>
+            <a:tailEnd/>
+          </a:ln>
+        </p:spPr>
+      </p:sp>
+      <p:sp>
+        <p:nvSpPr>
+          <p:cNvPr id="26627" name="Notes Placeholder 2"/>
+          <p:cNvSpPr>
+            <a:spLocks noGrp="1"/>
+          </p:cNvSpPr>
+          <p:nvPr>
+            <p:ph type="body" idx="1"/>
+          </p:nvPr>
+        </p:nvSpPr>
+        <p:spPr bwMode="auto">
+          <a:noFill/>
+        </p:spPr>
+        <p:txBody>
+          <a:bodyPr wrap="square" numCol="1" anchor="t" anchorCtr="0" compatLnSpc="1">
+            <a:prstTxWarp prst="textNoShape">
+              <a:avLst/>
+            </a:prstTxWarp>
+          </a:bodyPr>
+          <a:lstStyle/>
+          <a:p>
+            <a:endParaRPr lang="vi-VN" smtClean="0"/>
+          </a:p>
+        </p:txBody>
+      </p:sp>
+      <p:sp>
+        <p:nvSpPr>
+          <p:cNvPr id="26628" name="Slide Number Placeholder 3"/>
+          <p:cNvSpPr>
+            <a:spLocks noGrp="1"/>
+          </p:cNvSpPr>
+          <p:nvPr>
+            <p:ph type="sldNum" sz="quarter" idx="5"/>
+          </p:nvPr>
+        </p:nvSpPr>
+        <p:spPr bwMode="auto">
+          <a:noFill/>
+          <a:ln>
+            <a:miter lim="800000"/>
+            <a:headEnd/>
+            <a:tailEnd/>
+          </a:ln>
+        </p:spPr>
+        <p:txBody>
+          <a:bodyPr wrap="square" numCol="1" anchorCtr="0" compatLnSpc="1">
+            <a:prstTxWarp prst="textNoShape">
+              <a:avLst/>
+            </a:prstTxWarp>
+          </a:bodyPr>
+          <a:lstStyle/>
+          <a:p>
+            <a:fld id="{3A8F3EA6-691A-44C4-9681-184349940B09}" type="slidenum">
+              <a:rPr lang="zh-CN" altLang="en-US" smtClean="0"/>
+              <a:pPr/>
+              <a:t>6</a:t>
+            </a:fld>
+            <a:endParaRPr lang="zh-CN" altLang="en-US" smtClean="0"/>
+          </a:p>
+        </p:txBody>
+      </p:sp>
+    </p:spTree>
+  </p:cSld>
+  <p:clrMapOvr>
+    <a:masterClrMapping/>
+  </p:clrMapOvr>
+</p:notes>
+</file>
+
+<file path=ppt/notesSlides/notesSlide7.xml><?xml version="1.0" encoding="utf-8"?>
+<p:notes xmlns:a="http://schemas.openxmlformats.org/drawingml/2006/main" xmlns:r="http://schemas.openxmlformats.org/officeDocument/2006/relationships" xmlns:p="http://schemas.openxmlformats.org/presentationml/2006/main">
+  <p:cSld>
+    <p:spTree>
+      <p:nvGrpSpPr>
+        <p:cNvPr id="1" name=""/>
+        <p:cNvGrpSpPr/>
+        <p:nvPr/>
+      </p:nvGrpSpPr>
+      <p:grpSpPr>
+        <a:xfrm>
+          <a:off x="0" y="0"/>
+          <a:ext cx="0" cy="0"/>
+          <a:chOff x="0" y="0"/>
+          <a:chExt cx="0" cy="0"/>
+        </a:xfrm>
+      </p:grpSpPr>
+      <p:sp>
+        <p:nvSpPr>
+          <p:cNvPr id="26626" name="Slide Image Placeholder 1"/>
+          <p:cNvSpPr>
+            <a:spLocks noGrp="1" noRot="1" noChangeAspect="1" noTextEdit="1"/>
+          </p:cNvSpPr>
+          <p:nvPr>
+            <p:ph type="sldImg"/>
+          </p:nvPr>
+        </p:nvSpPr>
+        <p:spPr bwMode="auto">
+          <a:noFill/>
+          <a:ln>
+            <a:solidFill>
+              <a:srgbClr val="000000"/>
+            </a:solidFill>
+            <a:miter lim="800000"/>
+            <a:headEnd/>
+            <a:tailEnd/>
+          </a:ln>
+        </p:spPr>
+      </p:sp>
+      <p:sp>
+        <p:nvSpPr>
+          <p:cNvPr id="26627" name="Notes Placeholder 2"/>
+          <p:cNvSpPr>
+            <a:spLocks noGrp="1"/>
+          </p:cNvSpPr>
+          <p:nvPr>
+            <p:ph type="body" idx="1"/>
+          </p:nvPr>
+        </p:nvSpPr>
+        <p:spPr bwMode="auto">
+          <a:noFill/>
+        </p:spPr>
+        <p:txBody>
+          <a:bodyPr wrap="square" numCol="1" anchor="t" anchorCtr="0" compatLnSpc="1">
+            <a:prstTxWarp prst="textNoShape">
+              <a:avLst/>
+            </a:prstTxWarp>
+          </a:bodyPr>
+          <a:lstStyle/>
+          <a:p>
+            <a:endParaRPr lang="vi-VN" smtClean="0"/>
+          </a:p>
+        </p:txBody>
+      </p:sp>
+      <p:sp>
+        <p:nvSpPr>
+          <p:cNvPr id="26628" name="Slide Number Placeholder 3"/>
+          <p:cNvSpPr>
+            <a:spLocks noGrp="1"/>
+          </p:cNvSpPr>
+          <p:nvPr>
+            <p:ph type="sldNum" sz="quarter" idx="5"/>
+          </p:nvPr>
+        </p:nvSpPr>
+        <p:spPr bwMode="auto">
+          <a:noFill/>
+          <a:ln>
+            <a:miter lim="800000"/>
+            <a:headEnd/>
+            <a:tailEnd/>
+          </a:ln>
+        </p:spPr>
+        <p:txBody>
+          <a:bodyPr wrap="square" numCol="1" anchorCtr="0" compatLnSpc="1">
+            <a:prstTxWarp prst="textNoShape">
+              <a:avLst/>
+            </a:prstTxWarp>
+          </a:bodyPr>
+          <a:lstStyle/>
+          <a:p>
+            <a:fld id="{3A8F3EA6-691A-44C4-9681-184349940B09}" type="slidenum">
+              <a:rPr lang="zh-CN" altLang="en-US" smtClean="0"/>
+              <a:pPr/>
+              <a:t>7</a:t>
+            </a:fld>
+            <a:endParaRPr lang="zh-CN" altLang="en-US" smtClean="0"/>
+          </a:p>
+        </p:txBody>
+      </p:sp>
+    </p:spTree>
+  </p:cSld>
+  <p:clrMapOvr>
+    <a:masterClrMapping/>
+  </p:clrMapOvr>
+</p:notes>
+</file>
+
+<file path=ppt/notesSlides/notesSlide8.xml><?xml version="1.0" encoding="utf-8"?>
+<p:notes xmlns:a="http://schemas.openxmlformats.org/drawingml/2006/main" xmlns:r="http://schemas.openxmlformats.org/officeDocument/2006/relationships" xmlns:p="http://schemas.openxmlformats.org/presentationml/2006/main">
+  <p:cSld>
+    <p:spTree>
+      <p:nvGrpSpPr>
+        <p:cNvPr id="1" name=""/>
+        <p:cNvGrpSpPr/>
+        <p:nvPr/>
+      </p:nvGrpSpPr>
+      <p:grpSpPr>
+        <a:xfrm>
+          <a:off x="0" y="0"/>
+          <a:ext cx="0" cy="0"/>
+          <a:chOff x="0" y="0"/>
+          <a:chExt cx="0" cy="0"/>
+        </a:xfrm>
+      </p:grpSpPr>
+      <p:sp>
+        <p:nvSpPr>
+          <p:cNvPr id="26626" name="Slide Image Placeholder 1"/>
+          <p:cNvSpPr>
+            <a:spLocks noGrp="1" noRot="1" noChangeAspect="1" noTextEdit="1"/>
+          </p:cNvSpPr>
+          <p:nvPr>
+            <p:ph type="sldImg"/>
+          </p:nvPr>
+        </p:nvSpPr>
+        <p:spPr bwMode="auto">
+          <a:noFill/>
+          <a:ln>
+            <a:solidFill>
+              <a:srgbClr val="000000"/>
+            </a:solidFill>
+            <a:miter lim="800000"/>
+            <a:headEnd/>
+            <a:tailEnd/>
+          </a:ln>
+        </p:spPr>
+      </p:sp>
+      <p:sp>
+        <p:nvSpPr>
+          <p:cNvPr id="26627" name="Notes Placeholder 2"/>
+          <p:cNvSpPr>
+            <a:spLocks noGrp="1"/>
+          </p:cNvSpPr>
+          <p:nvPr>
+            <p:ph type="body" idx="1"/>
+          </p:nvPr>
+        </p:nvSpPr>
+        <p:spPr bwMode="auto">
+          <a:noFill/>
+        </p:spPr>
+        <p:txBody>
+          <a:bodyPr wrap="square" numCol="1" anchor="t" anchorCtr="0" compatLnSpc="1">
+            <a:prstTxWarp prst="textNoShape">
+              <a:avLst/>
+            </a:prstTxWarp>
+          </a:bodyPr>
+          <a:lstStyle/>
+          <a:p>
+            <a:endParaRPr lang="vi-VN" smtClean="0"/>
+          </a:p>
+        </p:txBody>
+      </p:sp>
+      <p:sp>
+        <p:nvSpPr>
+          <p:cNvPr id="26628" name="Slide Number Placeholder 3"/>
+          <p:cNvSpPr>
+            <a:spLocks noGrp="1"/>
+          </p:cNvSpPr>
+          <p:nvPr>
+            <p:ph type="sldNum" sz="quarter" idx="5"/>
+          </p:nvPr>
+        </p:nvSpPr>
+        <p:spPr bwMode="auto">
+          <a:noFill/>
+          <a:ln>
+            <a:miter lim="800000"/>
+            <a:headEnd/>
+            <a:tailEnd/>
+          </a:ln>
+        </p:spPr>
+        <p:txBody>
+          <a:bodyPr wrap="square" numCol="1" anchorCtr="0" compatLnSpc="1">
+            <a:prstTxWarp prst="textNoShape">
+              <a:avLst/>
+            </a:prstTxWarp>
+          </a:bodyPr>
+          <a:lstStyle/>
+          <a:p>
+            <a:fld id="{3A8F3EA6-691A-44C4-9681-184349940B09}" type="slidenum">
+              <a:rPr lang="zh-CN" altLang="en-US" smtClean="0"/>
+              <a:pPr/>
+              <a:t>8</a:t>
+            </a:fld>
+            <a:endParaRPr lang="zh-CN" altLang="en-US" smtClean="0"/>
+          </a:p>
+        </p:txBody>
+      </p:sp>
+    </p:spTree>
+  </p:cSld>
+  <p:clrMapOvr>
+    <a:masterClrMapping/>
+  </p:clrMapOvr>
+</p:notes>
+</file>
+
+<file path=ppt/notesSlides/notesSlide9.xml><?xml version="1.0" encoding="utf-8"?>
 <p:notes xmlns:a="http://schemas.openxmlformats.org/drawingml/2006/main" xmlns:r="http://schemas.openxmlformats.org/officeDocument/2006/relationships" xmlns:p="http://schemas.openxmlformats.org/presentationml/2006/main">
   <p:cSld>
     <p:spTree>
@@ -3120,119 +6407,7 @@
             <a:fld id="{42C2D286-7950-4CA7-9D87-3EFDD8B9C3DC}" type="slidenum">
               <a:rPr lang="zh-CN" altLang="en-US" smtClean="0"/>
               <a:pPr/>
-              <a:t>4</a:t>
-            </a:fld>
-            <a:endParaRPr lang="zh-CN" altLang="en-US" smtClean="0"/>
-          </a:p>
-        </p:txBody>
-      </p:sp>
-    </p:spTree>
-  </p:cSld>
-  <p:clrMapOvr>
-    <a:masterClrMapping/>
-  </p:clrMapOvr>
-</p:notes>
-</file>
-
-<file path=ppt/notesSlides/notesSlide5.xml><?xml version="1.0" encoding="utf-8"?>
-<p:notes xmlns:a="http://schemas.openxmlformats.org/drawingml/2006/main" xmlns:r="http://schemas.openxmlformats.org/officeDocument/2006/relationships" xmlns:p="http://schemas.openxmlformats.org/presentationml/2006/main">
-  <p:cSld>
-    <p:spTree>
-      <p:nvGrpSpPr>
-        <p:cNvPr id="1" name=""/>
-        <p:cNvGrpSpPr/>
-        <p:nvPr/>
-      </p:nvGrpSpPr>
-      <p:grpSpPr>
-        <a:xfrm>
-          <a:off x="0" y="0"/>
-          <a:ext cx="0" cy="0"/>
-          <a:chOff x="0" y="0"/>
-          <a:chExt cx="0" cy="0"/>
-        </a:xfrm>
-      </p:grpSpPr>
-      <p:sp>
-        <p:nvSpPr>
-          <p:cNvPr id="38914" name="Slide Image Placeholder 1"/>
-          <p:cNvSpPr>
-            <a:spLocks noGrp="1" noRot="1" noChangeAspect="1" noTextEdit="1"/>
-          </p:cNvSpPr>
-          <p:nvPr>
-            <p:ph type="sldImg"/>
-          </p:nvPr>
-        </p:nvSpPr>
-        <p:spPr bwMode="auto">
-          <a:noFill/>
-          <a:ln>
-            <a:solidFill>
-              <a:srgbClr val="000000"/>
-            </a:solidFill>
-            <a:miter lim="800000"/>
-            <a:headEnd/>
-            <a:tailEnd/>
-          </a:ln>
-        </p:spPr>
-      </p:sp>
-      <p:sp>
-        <p:nvSpPr>
-          <p:cNvPr id="38915" name="Notes Placeholder 2"/>
-          <p:cNvSpPr>
-            <a:spLocks noGrp="1"/>
-          </p:cNvSpPr>
-          <p:nvPr>
-            <p:ph type="body" idx="1"/>
-          </p:nvPr>
-        </p:nvSpPr>
-        <p:spPr bwMode="auto">
-          <a:noFill/>
-        </p:spPr>
-        <p:txBody>
-          <a:bodyPr wrap="square" numCol="1" anchor="t" anchorCtr="0" compatLnSpc="1">
-            <a:prstTxWarp prst="textNoShape">
-              <a:avLst/>
-            </a:prstTxWarp>
-          </a:bodyPr>
-          <a:lstStyle/>
-          <a:p>
-            <a:pPr eaLnBrk="1" hangingPunct="1">
-              <a:spcBef>
-                <a:spcPct val="0"/>
-              </a:spcBef>
-            </a:pPr>
-            <a:endParaRPr lang="zh-CN" altLang="en-US" smtClean="0"/>
-          </a:p>
-        </p:txBody>
-      </p:sp>
-      <p:sp>
-        <p:nvSpPr>
-          <p:cNvPr id="38916" name="Slide Number Placeholder 3"/>
-          <p:cNvSpPr>
-            <a:spLocks noGrp="1"/>
-          </p:cNvSpPr>
-          <p:nvPr>
-            <p:ph type="sldNum" sz="quarter" idx="5"/>
-          </p:nvPr>
-        </p:nvSpPr>
-        <p:spPr bwMode="auto">
-          <a:noFill/>
-          <a:ln>
-            <a:miter lim="800000"/>
-            <a:headEnd/>
-            <a:tailEnd/>
-          </a:ln>
-        </p:spPr>
-        <p:txBody>
-          <a:bodyPr wrap="square" numCol="1" anchorCtr="0" compatLnSpc="1">
-            <a:prstTxWarp prst="textNoShape">
-              <a:avLst/>
-            </a:prstTxWarp>
-          </a:bodyPr>
-          <a:lstStyle/>
-          <a:p>
-            <a:fld id="{884964A4-8746-46D0-B4FE-65104B927633}" type="slidenum">
-              <a:rPr lang="zh-CN" altLang="en-US" smtClean="0"/>
-              <a:pPr/>
-              <a:t>5</a:t>
+              <a:t>9</a:t>
             </a:fld>
             <a:endParaRPr lang="zh-CN" altLang="en-US" smtClean="0"/>
           </a:p>
@@ -4422,25 +7597,7 @@
                 <a:latin typeface="Arial" pitchFamily="34" charset="0"/>
                 <a:cs typeface="Arial" pitchFamily="34" charset="0"/>
               </a:rPr>
-              <a:t>CÁC CÔNG NGHỆ LẬP TRÌNH HiỆN </a:t>
-            </a:r>
-            <a:r>
-              <a:rPr lang="en-US" altLang="zh-CN" sz="1600" b="1" smtClean="0">
-                <a:ln w="1905"/>
-                <a:solidFill>
-                  <a:srgbClr val="FF0000"/>
-                </a:solidFill>
-                <a:effectLst>
-                  <a:innerShdw blurRad="69850" dist="43180" dir="5400000">
-                    <a:srgbClr val="000000">
-                      <a:alpha val="65000"/>
-                    </a:srgbClr>
-                  </a:innerShdw>
-                </a:effectLst>
-                <a:latin typeface="Arial" pitchFamily="34" charset="0"/>
-                <a:cs typeface="Arial" pitchFamily="34" charset="0"/>
-              </a:rPr>
-              <a:t>ĐẠI TH2008/3</a:t>
+              <a:t>CÁC CÔNG NGHỆ LẬP TRÌNH HiỆN ĐẠI TH2008/3</a:t>
             </a:r>
             <a:endParaRPr lang="en-US" altLang="zh-CN" sz="1600" b="1">
               <a:ln w="1905"/>
@@ -4693,6 +7850,221 @@
     </p:tnLst>
     <p:bldLst>
       <p:bldP spid="4098" grpId="0"/>
+    </p:bldLst>
+  </p:timing>
+</p:sld>
+</file>
+
+<file path=ppt/slides/slide10.xml><?xml version="1.0" encoding="utf-8"?>
+<p:sld xmlns:a="http://schemas.openxmlformats.org/drawingml/2006/main" xmlns:r="http://schemas.openxmlformats.org/officeDocument/2006/relationships" xmlns:p="http://schemas.openxmlformats.org/presentationml/2006/main">
+  <p:cSld>
+    <p:spTree>
+      <p:nvGrpSpPr>
+        <p:cNvPr id="1" name=""/>
+        <p:cNvGrpSpPr/>
+        <p:nvPr/>
+      </p:nvGrpSpPr>
+      <p:grpSpPr>
+        <a:xfrm>
+          <a:off x="0" y="0"/>
+          <a:ext cx="0" cy="0"/>
+          <a:chOff x="0" y="0"/>
+          <a:chExt cx="0" cy="0"/>
+        </a:xfrm>
+      </p:grpSpPr>
+      <p:sp>
+        <p:nvSpPr>
+          <p:cNvPr id="86021" name="WordArt 5"/>
+          <p:cNvSpPr>
+            <a:spLocks noChangeArrowheads="1" noChangeShapeType="1" noTextEdit="1"/>
+          </p:cNvSpPr>
+          <p:nvPr/>
+        </p:nvSpPr>
+        <p:spPr bwMode="invGray">
+          <a:xfrm>
+            <a:off x="457200" y="2343150"/>
+            <a:ext cx="5257800" cy="800100"/>
+          </a:xfrm>
+          <a:prstGeom prst="rect">
+            <a:avLst/>
+          </a:prstGeom>
+        </p:spPr>
+        <p:txBody>
+          <a:bodyPr wrap="none" fromWordArt="1">
+            <a:prstTxWarp prst="textDeflate">
+              <a:avLst>
+                <a:gd name="adj" fmla="val 0"/>
+              </a:avLst>
+            </a:prstTxWarp>
+          </a:bodyPr>
+          <a:lstStyle/>
+          <a:p>
+            <a:pPr algn="ctr"/>
+            <a:r>
+              <a:rPr lang="vi-VN" sz="3600" b="1" kern="10">
+                <a:ln w="18000">
+                  <a:solidFill>
+                    <a:schemeClr val="accent2">
+                      <a:satMod val="140000"/>
+                    </a:schemeClr>
+                  </a:solidFill>
+                  <a:prstDash val="solid"/>
+                  <a:miter lim="800000"/>
+                </a:ln>
+                <a:noFill/>
+                <a:effectLst>
+                  <a:outerShdw blurRad="25500" dist="23000" dir="7020000" algn="tl">
+                    <a:srgbClr val="000000">
+                      <a:alpha val="50000"/>
+                    </a:srgbClr>
+                  </a:outerShdw>
+                </a:effectLst>
+                <a:latin typeface="Arial"/>
+                <a:cs typeface="Arial"/>
+              </a:rPr>
+              <a:t>Thank You !</a:t>
+            </a:r>
+          </a:p>
+        </p:txBody>
+      </p:sp>
+    </p:spTree>
+  </p:cSld>
+  <p:clrMapOvr>
+    <a:masterClrMapping/>
+  </p:clrMapOvr>
+  <p:timing>
+    <p:tnLst>
+      <p:par>
+        <p:cTn id="1" dur="indefinite" restart="never" nodeType="tmRoot">
+          <p:childTnLst>
+            <p:seq concurrent="1" nextAc="seek">
+              <p:cTn id="2" dur="indefinite" nodeType="mainSeq">
+                <p:childTnLst>
+                  <p:par>
+                    <p:cTn id="3" fill="hold">
+                      <p:stCondLst>
+                        <p:cond delay="indefinite"/>
+                        <p:cond evt="onBegin" delay="0">
+                          <p:tn val="2"/>
+                        </p:cond>
+                      </p:stCondLst>
+                      <p:childTnLst>
+                        <p:par>
+                          <p:cTn id="4" fill="hold">
+                            <p:stCondLst>
+                              <p:cond delay="0"/>
+                            </p:stCondLst>
+                            <p:childTnLst>
+                              <p:par>
+                                <p:cTn id="5" presetID="53" presetClass="entr" presetSubtype="0" fill="hold" grpId="0" nodeType="afterEffect">
+                                  <p:stCondLst>
+                                    <p:cond delay="0"/>
+                                  </p:stCondLst>
+                                  <p:childTnLst>
+                                    <p:set>
+                                      <p:cBhvr>
+                                        <p:cTn id="6" dur="1" fill="hold">
+                                          <p:stCondLst>
+                                            <p:cond delay="0"/>
+                                          </p:stCondLst>
+                                        </p:cTn>
+                                        <p:tgtEl>
+                                          <p:spTgt spid="86021"/>
+                                        </p:tgtEl>
+                                        <p:attrNameLst>
+                                          <p:attrName>style.visibility</p:attrName>
+                                        </p:attrNameLst>
+                                      </p:cBhvr>
+                                      <p:to>
+                                        <p:strVal val="visible"/>
+                                      </p:to>
+                                    </p:set>
+                                    <p:anim calcmode="lin" valueType="num">
+                                      <p:cBhvr>
+                                        <p:cTn id="7" dur="500" fill="hold"/>
+                                        <p:tgtEl>
+                                          <p:spTgt spid="86021"/>
+                                        </p:tgtEl>
+                                        <p:attrNameLst>
+                                          <p:attrName>ppt_w</p:attrName>
+                                        </p:attrNameLst>
+                                      </p:cBhvr>
+                                      <p:tavLst>
+                                        <p:tav tm="0">
+                                          <p:val>
+                                            <p:fltVal val="0"/>
+                                          </p:val>
+                                        </p:tav>
+                                        <p:tav tm="100000">
+                                          <p:val>
+                                            <p:strVal val="#ppt_w"/>
+                                          </p:val>
+                                        </p:tav>
+                                      </p:tavLst>
+                                    </p:anim>
+                                    <p:anim calcmode="lin" valueType="num">
+                                      <p:cBhvr>
+                                        <p:cTn id="8" dur="500" fill="hold"/>
+                                        <p:tgtEl>
+                                          <p:spTgt spid="86021"/>
+                                        </p:tgtEl>
+                                        <p:attrNameLst>
+                                          <p:attrName>ppt_h</p:attrName>
+                                        </p:attrNameLst>
+                                      </p:cBhvr>
+                                      <p:tavLst>
+                                        <p:tav tm="0">
+                                          <p:val>
+                                            <p:fltVal val="0"/>
+                                          </p:val>
+                                        </p:tav>
+                                        <p:tav tm="100000">
+                                          <p:val>
+                                            <p:strVal val="#ppt_h"/>
+                                          </p:val>
+                                        </p:tav>
+                                      </p:tavLst>
+                                    </p:anim>
+                                    <p:animEffect transition="in" filter="fade">
+                                      <p:cBhvr>
+                                        <p:cTn id="9" dur="500"/>
+                                        <p:tgtEl>
+                                          <p:spTgt spid="86021"/>
+                                        </p:tgtEl>
+                                      </p:cBhvr>
+                                    </p:animEffect>
+                                  </p:childTnLst>
+                                </p:cTn>
+                              </p:par>
+                            </p:childTnLst>
+                          </p:cTn>
+                        </p:par>
+                      </p:childTnLst>
+                    </p:cTn>
+                  </p:par>
+                </p:childTnLst>
+              </p:cTn>
+              <p:prevCondLst>
+                <p:cond evt="onPrev" delay="0">
+                  <p:tgtEl>
+                    <p:sldTgt/>
+                  </p:tgtEl>
+                </p:cond>
+              </p:prevCondLst>
+              <p:nextCondLst>
+                <p:cond evt="onNext" delay="0">
+                  <p:tgtEl>
+                    <p:sldTgt/>
+                  </p:tgtEl>
+                </p:cond>
+              </p:nextCondLst>
+            </p:seq>
+          </p:childTnLst>
+        </p:cTn>
+      </p:par>
+    </p:tnLst>
+    <p:bldLst>
+      <p:bldP spid="86021" grpId="0" animBg="1"/>
     </p:bldLst>
   </p:timing>
 </p:sld>
@@ -5112,6 +8484,152 @@
       </p:grpSpPr>
       <p:sp>
         <p:nvSpPr>
+          <p:cNvPr id="4098" name="Rectangle 2"/>
+          <p:cNvSpPr>
+            <a:spLocks noGrp="1" noChangeArrowheads="1"/>
+          </p:cNvSpPr>
+          <p:nvPr>
+            <p:ph type="title"/>
+          </p:nvPr>
+        </p:nvSpPr>
+        <p:spPr>
+          <a:xfrm>
+            <a:off x="1662113" y="357188"/>
+            <a:ext cx="7481887" cy="563562"/>
+          </a:xfrm>
+        </p:spPr>
+        <p:txBody>
+          <a:bodyPr/>
+          <a:lstStyle/>
+          <a:p>
+            <a:pPr eaLnBrk="1" hangingPunct="1"/>
+            <a:r>
+              <a:rPr lang="en-US" altLang="zh-CN" smtClean="0">
+                <a:ea typeface="SimSun" pitchFamily="2" charset="-122"/>
+              </a:rPr>
+              <a:t>NỘI DUNG</a:t>
+            </a:r>
+            <a:endParaRPr lang="en-US" altLang="zh-CN" smtClean="0">
+              <a:solidFill>
+                <a:schemeClr val="accent1"/>
+              </a:solidFill>
+              <a:ea typeface="SimSun" pitchFamily="2" charset="-122"/>
+            </a:endParaRPr>
+          </a:p>
+        </p:txBody>
+      </p:sp>
+      <p:sp>
+        <p:nvSpPr>
+          <p:cNvPr id="4099" name="Text Box 3"/>
+          <p:cNvSpPr txBox="1">
+            <a:spLocks noChangeArrowheads="1"/>
+          </p:cNvSpPr>
+          <p:nvPr/>
+        </p:nvSpPr>
+        <p:spPr bwMode="auto">
+          <a:xfrm>
+            <a:off x="1660525" y="722313"/>
+            <a:ext cx="184150" cy="366712"/>
+          </a:xfrm>
+          <a:prstGeom prst="rect">
+            <a:avLst/>
+          </a:prstGeom>
+          <a:noFill/>
+          <a:ln w="9525">
+            <a:noFill/>
+            <a:miter lim="800000"/>
+            <a:headEnd/>
+            <a:tailEnd/>
+          </a:ln>
+        </p:spPr>
+        <p:txBody>
+          <a:bodyPr wrap="none">
+            <a:spAutoFit/>
+          </a:bodyPr>
+          <a:lstStyle/>
+          <a:p>
+            <a:endParaRPr lang="zh-CN" altLang="zh-CN">
+              <a:ea typeface="SimSun" pitchFamily="2" charset="-122"/>
+            </a:endParaRPr>
+          </a:p>
+        </p:txBody>
+      </p:sp>
+      <p:sp>
+        <p:nvSpPr>
+          <p:cNvPr id="6" name="TextBox 5"/>
+          <p:cNvSpPr txBox="1"/>
+          <p:nvPr/>
+        </p:nvSpPr>
+        <p:spPr>
+          <a:xfrm>
+            <a:off x="1219200" y="2057400"/>
+            <a:ext cx="1390124" cy="923330"/>
+          </a:xfrm>
+          <a:prstGeom prst="rect">
+            <a:avLst/>
+          </a:prstGeom>
+          <a:noFill/>
+        </p:spPr>
+        <p:txBody>
+          <a:bodyPr wrap="none" rtlCol="0">
+            <a:spAutoFit/>
+          </a:bodyPr>
+          <a:lstStyle/>
+          <a:p>
+            <a:r>
+              <a:rPr lang="en-US" smtClean="0"/>
+              <a:t>Introduction</a:t>
+            </a:r>
+          </a:p>
+          <a:p>
+            <a:r>
+              <a:rPr lang="en-US" smtClean="0"/>
+              <a:t>Storage</a:t>
+            </a:r>
+          </a:p>
+          <a:p>
+            <a:r>
+              <a:rPr lang="en-US" smtClean="0"/>
+              <a:t>Reference</a:t>
+            </a:r>
+            <a:endParaRPr lang="vi-VN"/>
+          </a:p>
+        </p:txBody>
+      </p:sp>
+    </p:spTree>
+  </p:cSld>
+  <p:clrMapOvr>
+    <a:masterClrMapping/>
+  </p:clrMapOvr>
+  <p:timing>
+    <p:tnLst>
+      <p:par>
+        <p:cTn id="1" dur="indefinite" restart="never" nodeType="tmRoot"/>
+      </p:par>
+    </p:tnLst>
+  </p:timing>
+</p:sld>
+</file>
+
+<file path=ppt/slides/slide4.xml><?xml version="1.0" encoding="utf-8"?>
+<p:sld xmlns:a="http://schemas.openxmlformats.org/drawingml/2006/main" xmlns:r="http://schemas.openxmlformats.org/officeDocument/2006/relationships" xmlns:p="http://schemas.openxmlformats.org/presentationml/2006/main">
+  <p:cSld>
+    <p:spTree>
+      <p:nvGrpSpPr>
+        <p:cNvPr id="1" name=""/>
+        <p:cNvGrpSpPr/>
+        <p:nvPr/>
+      </p:nvGrpSpPr>
+      <p:grpSpPr>
+        <a:xfrm>
+          <a:off x="0" y="0"/>
+          <a:ext cx="0" cy="0"/>
+          <a:chOff x="0" y="0"/>
+          <a:chExt cx="0" cy="0"/>
+        </a:xfrm>
+      </p:grpSpPr>
+      <p:sp>
+        <p:nvSpPr>
           <p:cNvPr id="7170" name="Title 1"/>
           <p:cNvSpPr>
             <a:spLocks noGrp="1"/>
@@ -5148,6 +8666,22 @@
           </a:p>
         </p:txBody>
       </p:sp>
+      <p:graphicFrame>
+        <p:nvGraphicFramePr>
+          <p:cNvPr id="4" name="Diagram 3"/>
+          <p:cNvGraphicFramePr/>
+          <p:nvPr/>
+        </p:nvGraphicFramePr>
+        <p:xfrm>
+          <a:off x="304800" y="1828800"/>
+          <a:ext cx="8534400" cy="4114800"/>
+        </p:xfrm>
+        <a:graphic>
+          <a:graphicData uri="http://schemas.openxmlformats.org/drawingml/2006/diagram">
+            <dgm:relIds xmlns:dgm="http://schemas.openxmlformats.org/drawingml/2006/diagram" xmlns:r="http://schemas.openxmlformats.org/officeDocument/2006/relationships" r:dm="rId3" r:lo="rId4" r:qs="rId5" r:cs="rId6"/>
+          </a:graphicData>
+        </a:graphic>
+      </p:graphicFrame>
     </p:spTree>
   </p:cSld>
   <p:clrMapOvr>
@@ -5163,7 +8697,655 @@
 </p:sld>
 </file>
 
-<file path=ppt/slides/slide4.xml><?xml version="1.0" encoding="utf-8"?>
+<file path=ppt/slides/slide5.xml><?xml version="1.0" encoding="utf-8"?>
+<p:sld xmlns:a="http://schemas.openxmlformats.org/drawingml/2006/main" xmlns:r="http://schemas.openxmlformats.org/officeDocument/2006/relationships" xmlns:p="http://schemas.openxmlformats.org/presentationml/2006/main">
+  <p:cSld>
+    <p:spTree>
+      <p:nvGrpSpPr>
+        <p:cNvPr id="1" name=""/>
+        <p:cNvGrpSpPr/>
+        <p:nvPr/>
+      </p:nvGrpSpPr>
+      <p:grpSpPr>
+        <a:xfrm>
+          <a:off x="0" y="0"/>
+          <a:ext cx="0" cy="0"/>
+          <a:chOff x="0" y="0"/>
+          <a:chExt cx="0" cy="0"/>
+        </a:xfrm>
+      </p:grpSpPr>
+      <p:sp>
+        <p:nvSpPr>
+          <p:cNvPr id="7170" name="Title 1"/>
+          <p:cNvSpPr>
+            <a:spLocks noGrp="1"/>
+          </p:cNvSpPr>
+          <p:nvPr>
+            <p:ph type="title"/>
+          </p:nvPr>
+        </p:nvSpPr>
+        <p:spPr>
+          <a:xfrm>
+            <a:off x="1662113" y="285750"/>
+            <a:ext cx="7481887" cy="563563"/>
+          </a:xfrm>
+        </p:spPr>
+        <p:txBody>
+          <a:bodyPr/>
+          <a:lstStyle/>
+          <a:p>
+            <a:r>
+              <a:rPr lang="en-US" altLang="zh-CN" smtClean="0">
+                <a:solidFill>
+                  <a:srgbClr val="002060"/>
+                </a:solidFill>
+                <a:latin typeface="Arial" charset="0"/>
+                <a:ea typeface="SimSun" pitchFamily="2" charset="-122"/>
+                <a:cs typeface="Arial" charset="0"/>
+              </a:rPr>
+              <a:t>Introduction</a:t>
+            </a:r>
+            <a:endParaRPr lang="vi-VN" smtClean="0">
+              <a:ea typeface="SimSun" pitchFamily="2" charset="-122"/>
+              <a:cs typeface="Arial" charset="0"/>
+            </a:endParaRPr>
+          </a:p>
+        </p:txBody>
+      </p:sp>
+      <p:pic>
+        <p:nvPicPr>
+          <p:cNvPr id="1026" name="Picture 2"/>
+          <p:cNvPicPr>
+            <a:picLocks noChangeAspect="1" noChangeArrowheads="1"/>
+          </p:cNvPicPr>
+          <p:nvPr/>
+        </p:nvPicPr>
+        <p:blipFill>
+          <a:blip r:embed="rId3" cstate="print"/>
+          <a:srcRect/>
+          <a:stretch>
+            <a:fillRect/>
+          </a:stretch>
+        </p:blipFill>
+        <p:spPr bwMode="auto">
+          <a:xfrm>
+            <a:off x="990600" y="2209800"/>
+            <a:ext cx="7239000" cy="4419600"/>
+          </a:xfrm>
+          <a:prstGeom prst="rect">
+            <a:avLst/>
+          </a:prstGeom>
+          <a:noFill/>
+          <a:ln w="9525">
+            <a:noFill/>
+            <a:miter lim="800000"/>
+            <a:headEnd/>
+            <a:tailEnd/>
+          </a:ln>
+        </p:spPr>
+      </p:pic>
+      <p:pic>
+        <p:nvPicPr>
+          <p:cNvPr id="1027" name="Picture 3"/>
+          <p:cNvPicPr>
+            <a:picLocks noChangeAspect="1" noChangeArrowheads="1"/>
+          </p:cNvPicPr>
+          <p:nvPr/>
+        </p:nvPicPr>
+        <p:blipFill>
+          <a:blip r:embed="rId4" cstate="print"/>
+          <a:srcRect/>
+          <a:stretch>
+            <a:fillRect/>
+          </a:stretch>
+        </p:blipFill>
+        <p:spPr bwMode="auto">
+          <a:xfrm>
+            <a:off x="1600200" y="1524000"/>
+            <a:ext cx="5495925" cy="666750"/>
+          </a:xfrm>
+          <a:prstGeom prst="rect">
+            <a:avLst/>
+          </a:prstGeom>
+          <a:noFill/>
+          <a:ln w="9525">
+            <a:noFill/>
+            <a:miter lim="800000"/>
+            <a:headEnd/>
+            <a:tailEnd/>
+          </a:ln>
+        </p:spPr>
+      </p:pic>
+      <p:sp>
+        <p:nvSpPr>
+          <p:cNvPr id="6" name="TextBox 5"/>
+          <p:cNvSpPr txBox="1"/>
+          <p:nvPr/>
+        </p:nvSpPr>
+        <p:spPr>
+          <a:xfrm>
+            <a:off x="5708444" y="6581001"/>
+            <a:ext cx="3435556" cy="276999"/>
+          </a:xfrm>
+          <a:prstGeom prst="rect">
+            <a:avLst/>
+          </a:prstGeom>
+          <a:noFill/>
+        </p:spPr>
+        <p:txBody>
+          <a:bodyPr wrap="none" rtlCol="0">
+            <a:spAutoFit/>
+          </a:bodyPr>
+          <a:lstStyle/>
+          <a:p>
+            <a:r>
+              <a:rPr lang="vi-VN" sz="1200" smtClean="0">
+                <a:hlinkClick r:id="rId5"/>
+              </a:rPr>
+              <a:t>http://slides.html5rocks.com</a:t>
+            </a:r>
+            <a:r>
+              <a:rPr lang="vi-VN" sz="1200" smtClean="0">
+                <a:hlinkClick r:id="rId5"/>
+              </a:rPr>
+              <a:t>/#</a:t>
+            </a:r>
+            <a:r>
+              <a:rPr lang="vi-VN" sz="1200" smtClean="0">
+                <a:hlinkClick r:id="rId5"/>
+              </a:rPr>
+              <a:t>formula-intro-slide</a:t>
+            </a:r>
+            <a:endParaRPr lang="vi-VN" sz="1200"/>
+          </a:p>
+        </p:txBody>
+      </p:sp>
+    </p:spTree>
+  </p:cSld>
+  <p:clrMapOvr>
+    <a:masterClrMapping/>
+  </p:clrMapOvr>
+  <p:timing>
+    <p:tnLst>
+      <p:par>
+        <p:cTn id="1" dur="indefinite" restart="never" nodeType="tmRoot"/>
+      </p:par>
+    </p:tnLst>
+  </p:timing>
+</p:sld>
+</file>
+
+<file path=ppt/slides/slide6.xml><?xml version="1.0" encoding="utf-8"?>
+<p:sld xmlns:a="http://schemas.openxmlformats.org/drawingml/2006/main" xmlns:r="http://schemas.openxmlformats.org/officeDocument/2006/relationships" xmlns:p="http://schemas.openxmlformats.org/presentationml/2006/main">
+  <p:cSld>
+    <p:spTree>
+      <p:nvGrpSpPr>
+        <p:cNvPr id="1" name=""/>
+        <p:cNvGrpSpPr/>
+        <p:nvPr/>
+      </p:nvGrpSpPr>
+      <p:grpSpPr>
+        <a:xfrm>
+          <a:off x="0" y="0"/>
+          <a:ext cx="0" cy="0"/>
+          <a:chOff x="0" y="0"/>
+          <a:chExt cx="0" cy="0"/>
+        </a:xfrm>
+      </p:grpSpPr>
+      <p:sp>
+        <p:nvSpPr>
+          <p:cNvPr id="7170" name="Title 1"/>
+          <p:cNvSpPr>
+            <a:spLocks noGrp="1"/>
+          </p:cNvSpPr>
+          <p:nvPr>
+            <p:ph type="title"/>
+          </p:nvPr>
+        </p:nvSpPr>
+        <p:spPr>
+          <a:xfrm>
+            <a:off x="1662113" y="285750"/>
+            <a:ext cx="7481887" cy="563563"/>
+          </a:xfrm>
+        </p:spPr>
+        <p:txBody>
+          <a:bodyPr/>
+          <a:lstStyle/>
+          <a:p>
+            <a:r>
+              <a:rPr lang="en-US" altLang="zh-CN" smtClean="0">
+                <a:solidFill>
+                  <a:srgbClr val="002060"/>
+                </a:solidFill>
+                <a:latin typeface="Arial" charset="0"/>
+                <a:ea typeface="SimSun" pitchFamily="2" charset="-122"/>
+                <a:cs typeface="Arial" charset="0"/>
+              </a:rPr>
+              <a:t>Web Storage – Web SQL Database</a:t>
+            </a:r>
+            <a:endParaRPr lang="vi-VN" smtClean="0">
+              <a:ea typeface="SimSun" pitchFamily="2" charset="-122"/>
+              <a:cs typeface="Arial" charset="0"/>
+            </a:endParaRPr>
+          </a:p>
+        </p:txBody>
+      </p:sp>
+      <p:sp>
+        <p:nvSpPr>
+          <p:cNvPr id="6" name="TextBox 5"/>
+          <p:cNvSpPr txBox="1"/>
+          <p:nvPr/>
+        </p:nvSpPr>
+        <p:spPr>
+          <a:xfrm>
+            <a:off x="6091561" y="6581001"/>
+            <a:ext cx="3052439" cy="276999"/>
+          </a:xfrm>
+          <a:prstGeom prst="rect">
+            <a:avLst/>
+          </a:prstGeom>
+          <a:noFill/>
+        </p:spPr>
+        <p:txBody>
+          <a:bodyPr wrap="none" rtlCol="0">
+            <a:spAutoFit/>
+          </a:bodyPr>
+          <a:lstStyle/>
+          <a:p>
+            <a:r>
+              <a:rPr lang="vi-VN" sz="1200" smtClean="0">
+                <a:hlinkClick r:id="rId3"/>
+              </a:rPr>
+              <a:t>http://slides.html5rocks.com</a:t>
+            </a:r>
+            <a:r>
+              <a:rPr lang="vi-VN" sz="1200" smtClean="0">
+                <a:hlinkClick r:id="rId3"/>
+              </a:rPr>
+              <a:t>/#</a:t>
+            </a:r>
+            <a:r>
+              <a:rPr lang="vi-VN" sz="1200" smtClean="0">
+                <a:hlinkClick r:id="rId3"/>
+              </a:rPr>
+              <a:t>web-storage</a:t>
+            </a:r>
+            <a:endParaRPr lang="vi-VN" sz="1200"/>
+          </a:p>
+        </p:txBody>
+      </p:sp>
+      <p:pic>
+        <p:nvPicPr>
+          <p:cNvPr id="2050" name="Picture 2"/>
+          <p:cNvPicPr>
+            <a:picLocks noChangeAspect="1" noChangeArrowheads="1"/>
+          </p:cNvPicPr>
+          <p:nvPr/>
+        </p:nvPicPr>
+        <p:blipFill>
+          <a:blip r:embed="rId4" cstate="print"/>
+          <a:srcRect/>
+          <a:stretch>
+            <a:fillRect/>
+          </a:stretch>
+        </p:blipFill>
+        <p:spPr bwMode="auto">
+          <a:xfrm>
+            <a:off x="533400" y="2057400"/>
+            <a:ext cx="8124825" cy="1714500"/>
+          </a:xfrm>
+          <a:prstGeom prst="rect">
+            <a:avLst/>
+          </a:prstGeom>
+          <a:noFill/>
+          <a:ln w="9525">
+            <a:noFill/>
+            <a:miter lim="800000"/>
+            <a:headEnd/>
+            <a:tailEnd/>
+          </a:ln>
+        </p:spPr>
+      </p:pic>
+      <p:pic>
+        <p:nvPicPr>
+          <p:cNvPr id="2051" name="Picture 3"/>
+          <p:cNvPicPr>
+            <a:picLocks noChangeAspect="1" noChangeArrowheads="1"/>
+          </p:cNvPicPr>
+          <p:nvPr/>
+        </p:nvPicPr>
+        <p:blipFill>
+          <a:blip r:embed="rId5" cstate="print"/>
+          <a:srcRect/>
+          <a:stretch>
+            <a:fillRect/>
+          </a:stretch>
+        </p:blipFill>
+        <p:spPr bwMode="auto">
+          <a:xfrm>
+            <a:off x="457200" y="4495800"/>
+            <a:ext cx="8096250" cy="1162050"/>
+          </a:xfrm>
+          <a:prstGeom prst="rect">
+            <a:avLst/>
+          </a:prstGeom>
+          <a:noFill/>
+          <a:ln w="9525">
+            <a:noFill/>
+            <a:miter lim="800000"/>
+            <a:headEnd/>
+            <a:tailEnd/>
+          </a:ln>
+        </p:spPr>
+      </p:pic>
+    </p:spTree>
+  </p:cSld>
+  <p:clrMapOvr>
+    <a:masterClrMapping/>
+  </p:clrMapOvr>
+  <p:timing>
+    <p:tnLst>
+      <p:par>
+        <p:cTn id="1" dur="indefinite" restart="never" nodeType="tmRoot"/>
+      </p:par>
+    </p:tnLst>
+  </p:timing>
+</p:sld>
+</file>
+
+<file path=ppt/slides/slide7.xml><?xml version="1.0" encoding="utf-8"?>
+<p:sld xmlns:a="http://schemas.openxmlformats.org/drawingml/2006/main" xmlns:r="http://schemas.openxmlformats.org/officeDocument/2006/relationships" xmlns:p="http://schemas.openxmlformats.org/presentationml/2006/main">
+  <p:cSld>
+    <p:spTree>
+      <p:nvGrpSpPr>
+        <p:cNvPr id="1" name=""/>
+        <p:cNvGrpSpPr/>
+        <p:nvPr/>
+      </p:nvGrpSpPr>
+      <p:grpSpPr>
+        <a:xfrm>
+          <a:off x="0" y="0"/>
+          <a:ext cx="0" cy="0"/>
+          <a:chOff x="0" y="0"/>
+          <a:chExt cx="0" cy="0"/>
+        </a:xfrm>
+      </p:grpSpPr>
+      <p:sp>
+        <p:nvSpPr>
+          <p:cNvPr id="7170" name="Title 1"/>
+          <p:cNvSpPr>
+            <a:spLocks noGrp="1"/>
+          </p:cNvSpPr>
+          <p:nvPr>
+            <p:ph type="title"/>
+          </p:nvPr>
+        </p:nvSpPr>
+        <p:spPr>
+          <a:xfrm>
+            <a:off x="1662113" y="285750"/>
+            <a:ext cx="7481887" cy="563563"/>
+          </a:xfrm>
+        </p:spPr>
+        <p:txBody>
+          <a:bodyPr/>
+          <a:lstStyle/>
+          <a:p>
+            <a:r>
+              <a:rPr lang="en-US" altLang="zh-CN" smtClean="0">
+                <a:solidFill>
+                  <a:srgbClr val="002060"/>
+                </a:solidFill>
+                <a:latin typeface="Arial" charset="0"/>
+                <a:ea typeface="SimSun" pitchFamily="2" charset="-122"/>
+                <a:cs typeface="Arial" charset="0"/>
+              </a:rPr>
+              <a:t>IndexedDB</a:t>
+            </a:r>
+            <a:endParaRPr lang="vi-VN" smtClean="0">
+              <a:ea typeface="SimSun" pitchFamily="2" charset="-122"/>
+              <a:cs typeface="Arial" charset="0"/>
+            </a:endParaRPr>
+          </a:p>
+        </p:txBody>
+      </p:sp>
+      <p:sp>
+        <p:nvSpPr>
+          <p:cNvPr id="6" name="TextBox 5"/>
+          <p:cNvSpPr txBox="1"/>
+          <p:nvPr/>
+        </p:nvSpPr>
+        <p:spPr>
+          <a:xfrm>
+            <a:off x="6178123" y="6581001"/>
+            <a:ext cx="2965877" cy="276999"/>
+          </a:xfrm>
+          <a:prstGeom prst="rect">
+            <a:avLst/>
+          </a:prstGeom>
+          <a:noFill/>
+        </p:spPr>
+        <p:txBody>
+          <a:bodyPr wrap="none" rtlCol="0">
+            <a:spAutoFit/>
+          </a:bodyPr>
+          <a:lstStyle/>
+          <a:p>
+            <a:r>
+              <a:rPr lang="vi-VN" sz="1200" smtClean="0">
+                <a:hlinkClick r:id="rId3"/>
+              </a:rPr>
+              <a:t>http://slides.html5rocks.com</a:t>
+            </a:r>
+            <a:r>
+              <a:rPr lang="vi-VN" sz="1200" smtClean="0">
+                <a:hlinkClick r:id="rId3"/>
+              </a:rPr>
+              <a:t>/#</a:t>
+            </a:r>
+            <a:r>
+              <a:rPr lang="vi-VN" sz="1200" smtClean="0">
+                <a:hlinkClick r:id="rId3"/>
+              </a:rPr>
+              <a:t>indexed-db</a:t>
+            </a:r>
+            <a:endParaRPr lang="vi-VN" sz="1200"/>
+          </a:p>
+        </p:txBody>
+      </p:sp>
+      <p:pic>
+        <p:nvPicPr>
+          <p:cNvPr id="3074" name="Picture 2"/>
+          <p:cNvPicPr>
+            <a:picLocks noChangeAspect="1" noChangeArrowheads="1"/>
+          </p:cNvPicPr>
+          <p:nvPr/>
+        </p:nvPicPr>
+        <p:blipFill>
+          <a:blip r:embed="rId4" cstate="print"/>
+          <a:srcRect/>
+          <a:stretch>
+            <a:fillRect/>
+          </a:stretch>
+        </p:blipFill>
+        <p:spPr bwMode="auto">
+          <a:xfrm>
+            <a:off x="533400" y="2209800"/>
+            <a:ext cx="8086725" cy="1743075"/>
+          </a:xfrm>
+          <a:prstGeom prst="rect">
+            <a:avLst/>
+          </a:prstGeom>
+          <a:noFill/>
+          <a:ln w="9525">
+            <a:noFill/>
+            <a:miter lim="800000"/>
+            <a:headEnd/>
+            <a:tailEnd/>
+          </a:ln>
+        </p:spPr>
+      </p:pic>
+    </p:spTree>
+  </p:cSld>
+  <p:clrMapOvr>
+    <a:masterClrMapping/>
+  </p:clrMapOvr>
+  <p:timing>
+    <p:tnLst>
+      <p:par>
+        <p:cTn id="1" dur="indefinite" restart="never" nodeType="tmRoot"/>
+      </p:par>
+    </p:tnLst>
+  </p:timing>
+</p:sld>
+</file>
+
+<file path=ppt/slides/slide8.xml><?xml version="1.0" encoding="utf-8"?>
+<p:sld xmlns:a="http://schemas.openxmlformats.org/drawingml/2006/main" xmlns:r="http://schemas.openxmlformats.org/officeDocument/2006/relationships" xmlns:p="http://schemas.openxmlformats.org/presentationml/2006/main">
+  <p:cSld>
+    <p:spTree>
+      <p:nvGrpSpPr>
+        <p:cNvPr id="1" name=""/>
+        <p:cNvGrpSpPr/>
+        <p:nvPr/>
+      </p:nvGrpSpPr>
+      <p:grpSpPr>
+        <a:xfrm>
+          <a:off x="0" y="0"/>
+          <a:ext cx="0" cy="0"/>
+          <a:chOff x="0" y="0"/>
+          <a:chExt cx="0" cy="0"/>
+        </a:xfrm>
+      </p:grpSpPr>
+      <p:sp>
+        <p:nvSpPr>
+          <p:cNvPr id="7170" name="Title 1"/>
+          <p:cNvSpPr>
+            <a:spLocks noGrp="1"/>
+          </p:cNvSpPr>
+          <p:nvPr>
+            <p:ph type="title"/>
+          </p:nvPr>
+        </p:nvSpPr>
+        <p:spPr>
+          <a:xfrm>
+            <a:off x="1662113" y="285750"/>
+            <a:ext cx="7481887" cy="563563"/>
+          </a:xfrm>
+        </p:spPr>
+        <p:txBody>
+          <a:bodyPr/>
+          <a:lstStyle/>
+          <a:p>
+            <a:r>
+              <a:rPr lang="en-US" altLang="zh-CN" smtClean="0">
+                <a:solidFill>
+                  <a:srgbClr val="002060"/>
+                </a:solidFill>
+                <a:latin typeface="Arial" charset="0"/>
+                <a:ea typeface="SimSun" pitchFamily="2" charset="-122"/>
+                <a:cs typeface="Arial" charset="0"/>
+              </a:rPr>
+              <a:t>Application Cache</a:t>
+            </a:r>
+            <a:endParaRPr lang="vi-VN" smtClean="0">
+              <a:ea typeface="SimSun" pitchFamily="2" charset="-122"/>
+              <a:cs typeface="Arial" charset="0"/>
+            </a:endParaRPr>
+          </a:p>
+        </p:txBody>
+      </p:sp>
+      <p:sp>
+        <p:nvSpPr>
+          <p:cNvPr id="6" name="TextBox 5"/>
+          <p:cNvSpPr txBox="1"/>
+          <p:nvPr/>
+        </p:nvSpPr>
+        <p:spPr>
+          <a:xfrm>
+            <a:off x="6219802" y="6581001"/>
+            <a:ext cx="2924198" cy="276999"/>
+          </a:xfrm>
+          <a:prstGeom prst="rect">
+            <a:avLst/>
+          </a:prstGeom>
+          <a:noFill/>
+        </p:spPr>
+        <p:txBody>
+          <a:bodyPr wrap="none" rtlCol="0">
+            <a:spAutoFit/>
+          </a:bodyPr>
+          <a:lstStyle/>
+          <a:p>
+            <a:r>
+              <a:rPr lang="vi-VN" sz="1200" smtClean="0">
+                <a:hlinkClick r:id="rId3"/>
+              </a:rPr>
+              <a:t>http://slides.html5rocks.com</a:t>
+            </a:r>
+            <a:r>
+              <a:rPr lang="vi-VN" sz="1200" smtClean="0">
+                <a:hlinkClick r:id="rId3"/>
+              </a:rPr>
+              <a:t>/#</a:t>
+            </a:r>
+            <a:r>
+              <a:rPr lang="vi-VN" sz="1200" smtClean="0">
+                <a:hlinkClick r:id="rId3"/>
+              </a:rPr>
+              <a:t>app-cache</a:t>
+            </a:r>
+            <a:endParaRPr lang="vi-VN" sz="1200"/>
+          </a:p>
+        </p:txBody>
+      </p:sp>
+      <p:pic>
+        <p:nvPicPr>
+          <p:cNvPr id="4098" name="Picture 2"/>
+          <p:cNvPicPr>
+            <a:picLocks noChangeAspect="1" noChangeArrowheads="1"/>
+          </p:cNvPicPr>
+          <p:nvPr/>
+        </p:nvPicPr>
+        <p:blipFill>
+          <a:blip r:embed="rId4" cstate="print"/>
+          <a:srcRect/>
+          <a:stretch>
+            <a:fillRect/>
+          </a:stretch>
+        </p:blipFill>
+        <p:spPr bwMode="auto">
+          <a:xfrm>
+            <a:off x="533400" y="2057400"/>
+            <a:ext cx="8096250" cy="4533900"/>
+          </a:xfrm>
+          <a:prstGeom prst="rect">
+            <a:avLst/>
+          </a:prstGeom>
+          <a:noFill/>
+          <a:ln w="9525">
+            <a:noFill/>
+            <a:miter lim="800000"/>
+            <a:headEnd/>
+            <a:tailEnd/>
+          </a:ln>
+        </p:spPr>
+      </p:pic>
+    </p:spTree>
+  </p:cSld>
+  <p:clrMapOvr>
+    <a:masterClrMapping/>
+  </p:clrMapOvr>
+  <p:timing>
+    <p:tnLst>
+      <p:par>
+        <p:cTn id="1" dur="indefinite" restart="never" nodeType="tmRoot"/>
+      </p:par>
+    </p:tnLst>
+  </p:timing>
+</p:sld>
+</file>
+
+<file path=ppt/slides/slide9.xml><?xml version="1.0" encoding="utf-8"?>
 <p:sld xmlns:a="http://schemas.openxmlformats.org/drawingml/2006/main" xmlns:r="http://schemas.openxmlformats.org/officeDocument/2006/relationships" xmlns:p="http://schemas.openxmlformats.org/presentationml/2006/main">
   <p:cSld>
     <p:spTree>
@@ -5232,221 +9414,6 @@
         <p:cTn id="1" dur="indefinite" restart="never" nodeType="tmRoot"/>
       </p:par>
     </p:tnLst>
-  </p:timing>
-</p:sld>
-</file>
-
-<file path=ppt/slides/slide5.xml><?xml version="1.0" encoding="utf-8"?>
-<p:sld xmlns:a="http://schemas.openxmlformats.org/drawingml/2006/main" xmlns:r="http://schemas.openxmlformats.org/officeDocument/2006/relationships" xmlns:p="http://schemas.openxmlformats.org/presentationml/2006/main">
-  <p:cSld>
-    <p:spTree>
-      <p:nvGrpSpPr>
-        <p:cNvPr id="1" name=""/>
-        <p:cNvGrpSpPr/>
-        <p:nvPr/>
-      </p:nvGrpSpPr>
-      <p:grpSpPr>
-        <a:xfrm>
-          <a:off x="0" y="0"/>
-          <a:ext cx="0" cy="0"/>
-          <a:chOff x="0" y="0"/>
-          <a:chExt cx="0" cy="0"/>
-        </a:xfrm>
-      </p:grpSpPr>
-      <p:sp>
-        <p:nvSpPr>
-          <p:cNvPr id="86021" name="WordArt 5"/>
-          <p:cNvSpPr>
-            <a:spLocks noChangeArrowheads="1" noChangeShapeType="1" noTextEdit="1"/>
-          </p:cNvSpPr>
-          <p:nvPr/>
-        </p:nvSpPr>
-        <p:spPr bwMode="invGray">
-          <a:xfrm>
-            <a:off x="457200" y="2343150"/>
-            <a:ext cx="5257800" cy="800100"/>
-          </a:xfrm>
-          <a:prstGeom prst="rect">
-            <a:avLst/>
-          </a:prstGeom>
-        </p:spPr>
-        <p:txBody>
-          <a:bodyPr wrap="none" fromWordArt="1">
-            <a:prstTxWarp prst="textDeflate">
-              <a:avLst>
-                <a:gd name="adj" fmla="val 0"/>
-              </a:avLst>
-            </a:prstTxWarp>
-          </a:bodyPr>
-          <a:lstStyle/>
-          <a:p>
-            <a:pPr algn="ctr"/>
-            <a:r>
-              <a:rPr lang="vi-VN" sz="3600" b="1" kern="10">
-                <a:ln w="18000">
-                  <a:solidFill>
-                    <a:schemeClr val="accent2">
-                      <a:satMod val="140000"/>
-                    </a:schemeClr>
-                  </a:solidFill>
-                  <a:prstDash val="solid"/>
-                  <a:miter lim="800000"/>
-                </a:ln>
-                <a:noFill/>
-                <a:effectLst>
-                  <a:outerShdw blurRad="25500" dist="23000" dir="7020000" algn="tl">
-                    <a:srgbClr val="000000">
-                      <a:alpha val="50000"/>
-                    </a:srgbClr>
-                  </a:outerShdw>
-                </a:effectLst>
-                <a:latin typeface="Arial"/>
-                <a:cs typeface="Arial"/>
-              </a:rPr>
-              <a:t>Thank You !</a:t>
-            </a:r>
-          </a:p>
-        </p:txBody>
-      </p:sp>
-    </p:spTree>
-  </p:cSld>
-  <p:clrMapOvr>
-    <a:masterClrMapping/>
-  </p:clrMapOvr>
-  <p:timing>
-    <p:tnLst>
-      <p:par>
-        <p:cTn id="1" dur="indefinite" restart="never" nodeType="tmRoot">
-          <p:childTnLst>
-            <p:seq concurrent="1" nextAc="seek">
-              <p:cTn id="2" dur="indefinite" nodeType="mainSeq">
-                <p:childTnLst>
-                  <p:par>
-                    <p:cTn id="3" fill="hold">
-                      <p:stCondLst>
-                        <p:cond delay="indefinite"/>
-                        <p:cond evt="onBegin" delay="0">
-                          <p:tn val="2"/>
-                        </p:cond>
-                      </p:stCondLst>
-                      <p:childTnLst>
-                        <p:par>
-                          <p:cTn id="4" fill="hold">
-                            <p:stCondLst>
-                              <p:cond delay="0"/>
-                            </p:stCondLst>
-                            <p:childTnLst>
-                              <p:par>
-                                <p:cTn id="5" presetID="53" presetClass="entr" presetSubtype="0" fill="hold" grpId="0" nodeType="afterEffect">
-                                  <p:stCondLst>
-                                    <p:cond delay="0"/>
-                                  </p:stCondLst>
-                                  <p:childTnLst>
-                                    <p:set>
-                                      <p:cBhvr>
-                                        <p:cTn id="6" dur="1" fill="hold">
-                                          <p:stCondLst>
-                                            <p:cond delay="0"/>
-                                          </p:stCondLst>
-                                        </p:cTn>
-                                        <p:tgtEl>
-                                          <p:spTgt spid="86021"/>
-                                        </p:tgtEl>
-                                        <p:attrNameLst>
-                                          <p:attrName>style.visibility</p:attrName>
-                                        </p:attrNameLst>
-                                      </p:cBhvr>
-                                      <p:to>
-                                        <p:strVal val="visible"/>
-                                      </p:to>
-                                    </p:set>
-                                    <p:anim calcmode="lin" valueType="num">
-                                      <p:cBhvr>
-                                        <p:cTn id="7" dur="500" fill="hold"/>
-                                        <p:tgtEl>
-                                          <p:spTgt spid="86021"/>
-                                        </p:tgtEl>
-                                        <p:attrNameLst>
-                                          <p:attrName>ppt_w</p:attrName>
-                                        </p:attrNameLst>
-                                      </p:cBhvr>
-                                      <p:tavLst>
-                                        <p:tav tm="0">
-                                          <p:val>
-                                            <p:fltVal val="0"/>
-                                          </p:val>
-                                        </p:tav>
-                                        <p:tav tm="100000">
-                                          <p:val>
-                                            <p:strVal val="#ppt_w"/>
-                                          </p:val>
-                                        </p:tav>
-                                      </p:tavLst>
-                                    </p:anim>
-                                    <p:anim calcmode="lin" valueType="num">
-                                      <p:cBhvr>
-                                        <p:cTn id="8" dur="500" fill="hold"/>
-                                        <p:tgtEl>
-                                          <p:spTgt spid="86021"/>
-                                        </p:tgtEl>
-                                        <p:attrNameLst>
-                                          <p:attrName>ppt_h</p:attrName>
-                                        </p:attrNameLst>
-                                      </p:cBhvr>
-                                      <p:tavLst>
-                                        <p:tav tm="0">
-                                          <p:val>
-                                            <p:fltVal val="0"/>
-                                          </p:val>
-                                        </p:tav>
-                                        <p:tav tm="100000">
-                                          <p:val>
-                                            <p:strVal val="#ppt_h"/>
-                                          </p:val>
-                                        </p:tav>
-                                      </p:tavLst>
-                                    </p:anim>
-                                    <p:animEffect transition="in" filter="fade">
-                                      <p:cBhvr>
-                                        <p:cTn id="9" dur="500"/>
-                                        <p:tgtEl>
-                                          <p:spTgt spid="86021"/>
-                                        </p:tgtEl>
-                                      </p:cBhvr>
-                                    </p:animEffect>
-                                  </p:childTnLst>
-                                </p:cTn>
-                              </p:par>
-                            </p:childTnLst>
-                          </p:cTn>
-                        </p:par>
-                      </p:childTnLst>
-                    </p:cTn>
-                  </p:par>
-                </p:childTnLst>
-              </p:cTn>
-              <p:prevCondLst>
-                <p:cond evt="onPrev" delay="0">
-                  <p:tgtEl>
-                    <p:sldTgt/>
-                  </p:tgtEl>
-                </p:cond>
-              </p:prevCondLst>
-              <p:nextCondLst>
-                <p:cond evt="onNext" delay="0">
-                  <p:tgtEl>
-                    <p:sldTgt/>
-                  </p:tgtEl>
-                </p:cond>
-              </p:nextCondLst>
-            </p:seq>
-          </p:childTnLst>
-        </p:cTn>
-      </p:par>
-    </p:tnLst>
-    <p:bldLst>
-      <p:bldP spid="86021" grpId="0" animBg="1"/>
-    </p:bldLst>
   </p:timing>
 </p:sld>
 </file>

</xml_diff>